<commit_message>
Mai Hoang Long - 1/4/2019
</commit_message>
<xml_diff>
--- a/GROUP PROJECT.pptx
+++ b/GROUP PROJECT.pptx
@@ -5,12 +5,16 @@
     <p:sldMasterId id="2147483648" r:id="rId1"/>
   </p:sldMasterIdLst>
   <p:sldIdLst>
-    <p:sldId id="256" r:id="rId3"/>
-    <p:sldId id="258" r:id="rId4"/>
-    <p:sldId id="257" r:id="rId5"/>
-    <p:sldId id="259" r:id="rId6"/>
-    <p:sldId id="262" r:id="rId7"/>
-    <p:sldId id="260" r:id="rId8"/>
+    <p:sldId id="256" r:id="rId2"/>
+    <p:sldId id="258" r:id="rId3"/>
+    <p:sldId id="257" r:id="rId4"/>
+    <p:sldId id="259" r:id="rId5"/>
+    <p:sldId id="263" r:id="rId6"/>
+    <p:sldId id="265" r:id="rId7"/>
+    <p:sldId id="264" r:id="rId8"/>
+    <p:sldId id="267" r:id="rId9"/>
+    <p:sldId id="266" r:id="rId10"/>
+    <p:sldId id="260" r:id="rId11"/>
   </p:sldIdLst>
   <p:sldSz cx="12192000" cy="6858000"/>
   <p:notesSz cx="6858000" cy="9144000"/>
@@ -109,6 +113,11 @@
       </a:defRPr>
     </a:lvl9pPr>
   </p:defaultTextStyle>
+  <p:extLst>
+    <p:ext uri="{EFAFB233-063F-42B5-8137-9DF3F51BA10A}">
+      <p15:sldGuideLst xmlns:p15="http://schemas.microsoft.com/office/powerpoint/2012/main"/>
+    </p:ext>
+  </p:extLst>
 </p:presentation>
 </file>
 
@@ -132,7 +141,7 @@
 </file>
 
 <file path=ppt/slideLayouts/slideLayout1.xml><?xml version="1.0" encoding="utf-8"?>
-<p:sldLayout xmlns:a="http://schemas.openxmlformats.org/drawingml/2006/main" xmlns:r="http://schemas.openxmlformats.org/officeDocument/2006/relationships" xmlns:p="http://schemas.openxmlformats.org/presentationml/2006/main" type="title" preserve="1" showMasterSp="0">
+<p:sldLayout xmlns:a="http://schemas.openxmlformats.org/drawingml/2006/main" xmlns:r="http://schemas.openxmlformats.org/officeDocument/2006/relationships" xmlns:p="http://schemas.openxmlformats.org/presentationml/2006/main" showMasterSp="0" type="title" preserve="1">
   <p:cSld name="Title Slide">
     <p:spTree>
       <p:nvGrpSpPr>
@@ -307,7 +316,7 @@
           </a:lstStyle>
           <a:p>
             <a:r>
-              <a:rPr lang="en-US" smtClean="0"/>
+              <a:rPr lang="en-US"/>
               <a:t>Click to edit Master title style</a:t>
             </a:r>
             <a:endParaRPr lang="en-US" dirty="0"/>
@@ -427,7 +436,7 @@
           </a:lstStyle>
           <a:p>
             <a:r>
-              <a:rPr lang="en-US" smtClean="0"/>
+              <a:rPr lang="en-US"/>
               <a:t>Click to edit Master subtitle style</a:t>
             </a:r>
             <a:endParaRPr lang="en-US" dirty="0"/>
@@ -466,6 +475,7 @@
           <a:p>
             <a:fld id="{5923F103-BC34-4FE4-A40E-EDDEECFDA5D0}" type="datetimeFigureOut">
               <a:rPr lang="en-US" dirty="0"/>
+              <a:t>4/1/2019</a:t>
             </a:fld>
             <a:endParaRPr lang="en-US" dirty="0"/>
           </a:p>
@@ -506,7 +516,6 @@
               <a:t>
               </a:t>
             </a:r>
-            <a:endParaRPr lang="en-US" dirty="0"/>
           </a:p>
         </p:txBody>
       </p:sp>
@@ -568,6 +577,7 @@
           <a:p>
             <a:fld id="{D57F1E4F-1CFF-5643-939E-217C01CDF565}" type="slidenum">
               <a:rPr lang="en-US" dirty="0"/>
+              <a:t>‹#›</a:t>
             </a:fld>
             <a:endParaRPr lang="en-US" dirty="0"/>
           </a:p>
@@ -1375,7 +1385,7 @@
           </a:lstStyle>
           <a:p>
             <a:r>
-              <a:rPr lang="en-US" smtClean="0"/>
+              <a:rPr lang="en-US"/>
               <a:t>Click to edit Master title style</a:t>
             </a:r>
             <a:endParaRPr lang="en-US" dirty="0"/>
@@ -1454,7 +1464,7 @@
           </a:lstStyle>
           <a:p>
             <a:r>
-              <a:rPr lang="en-US" smtClean="0"/>
+              <a:rPr lang="en-US"/>
               <a:t>Click icon to add picture</a:t>
             </a:r>
             <a:endParaRPr lang="en-US" dirty="0"/>
@@ -1529,10 +1539,9 @@
           <a:p>
             <a:pPr lvl="0"/>
             <a:r>
-              <a:rPr lang="en-US" smtClean="0"/>
+              <a:rPr lang="en-US"/>
               <a:t>Edit Master text styles</a:t>
             </a:r>
-            <a:endParaRPr lang="en-US" smtClean="0"/>
           </a:p>
         </p:txBody>
       </p:sp>
@@ -1553,6 +1562,7 @@
           <a:p>
             <a:fld id="{923A1CC3-2375-41D4-9E03-427CAF2A4C1A}" type="datetimeFigureOut">
               <a:rPr lang="en-US" dirty="0"/>
+              <a:t>4/1/2019</a:t>
             </a:fld>
             <a:endParaRPr lang="en-US" dirty="0"/>
           </a:p>
@@ -1578,7 +1588,6 @@
               <a:t>
               </a:t>
             </a:r>
-            <a:endParaRPr lang="en-US" dirty="0"/>
           </a:p>
         </p:txBody>
       </p:sp>
@@ -1635,6 +1644,7 @@
           <a:p>
             <a:fld id="{D57F1E4F-1CFF-5643-939E-217C01CDF565}" type="slidenum">
               <a:rPr lang="en-US" dirty="0"/>
+              <a:t>‹#›</a:t>
             </a:fld>
             <a:endParaRPr lang="en-US" dirty="0"/>
           </a:p>
@@ -1649,7 +1659,7 @@
 </file>
 
 <file path=ppt/slideLayouts/slideLayout11.xml><?xml version="1.0" encoding="utf-8"?>
-<p:sldLayout xmlns:a="http://schemas.openxmlformats.org/drawingml/2006/main" xmlns:r="http://schemas.openxmlformats.org/officeDocument/2006/relationships" xmlns:p="http://schemas.openxmlformats.org/presentationml/2006/main" preserve="1" showMasterSp="0">
+<p:sldLayout xmlns:a="http://schemas.openxmlformats.org/drawingml/2006/main" xmlns:r="http://schemas.openxmlformats.org/officeDocument/2006/relationships" xmlns:p="http://schemas.openxmlformats.org/presentationml/2006/main" showMasterSp="0" preserve="1">
   <p:cSld name="Title and Caption">
     <p:spTree>
       <p:nvGrpSpPr>
@@ -2440,7 +2450,7 @@
           </a:lstStyle>
           <a:p>
             <a:r>
-              <a:rPr lang="en-US" smtClean="0"/>
+              <a:rPr lang="en-US"/>
               <a:t>Click to edit Master title style</a:t>
             </a:r>
             <a:endParaRPr lang="en-US" dirty="0"/>
@@ -2508,10 +2518,9 @@
           <a:p>
             <a:pPr lvl="0"/>
             <a:r>
-              <a:rPr lang="en-US" smtClean="0"/>
+              <a:rPr lang="en-US"/>
               <a:t>Edit Master text styles</a:t>
             </a:r>
-            <a:endParaRPr lang="en-US" smtClean="0"/>
           </a:p>
         </p:txBody>
       </p:sp>
@@ -2532,6 +2541,7 @@
           <a:p>
             <a:fld id="{AFF16868-8199-4C2C-A5B1-63AEE139F88E}" type="datetimeFigureOut">
               <a:rPr lang="en-US" dirty="0"/>
+              <a:t>4/1/2019</a:t>
             </a:fld>
             <a:endParaRPr lang="en-US" dirty="0"/>
           </a:p>
@@ -2557,7 +2567,6 @@
               <a:t>
               </a:t>
             </a:r>
-            <a:endParaRPr lang="en-US" dirty="0"/>
           </a:p>
         </p:txBody>
       </p:sp>
@@ -2614,6 +2623,7 @@
           <a:p>
             <a:fld id="{D57F1E4F-1CFF-5643-939E-217C01CDF565}" type="slidenum">
               <a:rPr lang="en-US" dirty="0"/>
+              <a:t>‹#›</a:t>
             </a:fld>
             <a:endParaRPr lang="en-US" dirty="0"/>
           </a:p>
@@ -2628,7 +2638,7 @@
 </file>
 
 <file path=ppt/slideLayouts/slideLayout12.xml><?xml version="1.0" encoding="utf-8"?>
-<p:sldLayout xmlns:a="http://schemas.openxmlformats.org/drawingml/2006/main" xmlns:r="http://schemas.openxmlformats.org/officeDocument/2006/relationships" xmlns:p="http://schemas.openxmlformats.org/presentationml/2006/main" preserve="1" showMasterSp="0">
+<p:sldLayout xmlns:a="http://schemas.openxmlformats.org/drawingml/2006/main" xmlns:r="http://schemas.openxmlformats.org/officeDocument/2006/relationships" xmlns:p="http://schemas.openxmlformats.org/presentationml/2006/main" showMasterSp="0" preserve="1">
   <p:cSld name="Quote with Caption">
     <p:spTree>
       <p:nvGrpSpPr>
@@ -3430,16 +3440,6 @@
               </a:rPr>
               <a:t>“</a:t>
             </a:r>
-            <a:endParaRPr lang="en-US" sz="9600" b="0" i="0" dirty="0">
-              <a:solidFill>
-                <a:schemeClr val="accent1">
-                  <a:lumMod val="60000"/>
-                  <a:lumOff val="40000"/>
-                </a:schemeClr>
-              </a:solidFill>
-              <a:latin typeface="Arial" panose="020B0604020202020204"/>
-              <a:cs typeface="Arial" panose="020B0604020202020204"/>
-            </a:endParaRPr>
           </a:p>
         </p:txBody>
       </p:sp>
@@ -3479,16 +3479,6 @@
               </a:rPr>
               <a:t>”</a:t>
             </a:r>
-            <a:endParaRPr lang="en-US" sz="9600" b="0" i="0" dirty="0">
-              <a:solidFill>
-                <a:schemeClr val="accent1">
-                  <a:lumMod val="60000"/>
-                  <a:lumOff val="40000"/>
-                </a:schemeClr>
-              </a:solidFill>
-              <a:latin typeface="Arial" panose="020B0604020202020204"/>
-              <a:cs typeface="Arial" panose="020B0604020202020204"/>
-            </a:endParaRPr>
           </a:p>
         </p:txBody>
       </p:sp>
@@ -3517,7 +3507,7 @@
           </a:lstStyle>
           <a:p>
             <a:r>
-              <a:rPr lang="en-US" smtClean="0"/>
+              <a:rPr lang="en-US"/>
               <a:t>Click to edit Master title style</a:t>
             </a:r>
             <a:endParaRPr lang="en-US" dirty="0"/>
@@ -3594,10 +3584,9 @@
           <a:p>
             <a:pPr lvl="0"/>
             <a:r>
-              <a:rPr lang="en-US" smtClean="0"/>
+              <a:rPr lang="en-US"/>
               <a:t>Edit Master text styles</a:t>
             </a:r>
-            <a:endParaRPr lang="en-US" smtClean="0"/>
           </a:p>
         </p:txBody>
       </p:sp>
@@ -3662,10 +3651,9 @@
           <a:p>
             <a:pPr lvl="0"/>
             <a:r>
-              <a:rPr lang="en-US" smtClean="0"/>
+              <a:rPr lang="en-US"/>
               <a:t>Edit Master text styles</a:t>
             </a:r>
-            <a:endParaRPr lang="en-US" smtClean="0"/>
           </a:p>
         </p:txBody>
       </p:sp>
@@ -3686,6 +3674,7 @@
           <a:p>
             <a:fld id="{AAD9FF7F-6988-44CC-821B-644E70CD2F73}" type="datetimeFigureOut">
               <a:rPr lang="en-US" dirty="0"/>
+              <a:t>4/1/2019</a:t>
             </a:fld>
             <a:endParaRPr lang="en-US" dirty="0"/>
           </a:p>
@@ -3711,7 +3700,6 @@
               <a:t>
               </a:t>
             </a:r>
-            <a:endParaRPr lang="en-US" dirty="0"/>
           </a:p>
         </p:txBody>
       </p:sp>
@@ -3768,6 +3756,7 @@
           <a:p>
             <a:fld id="{D57F1E4F-1CFF-5643-939E-217C01CDF565}" type="slidenum">
               <a:rPr lang="en-US" dirty="0"/>
+              <a:t>‹#›</a:t>
             </a:fld>
             <a:endParaRPr lang="en-US" dirty="0"/>
           </a:p>
@@ -3782,7 +3771,7 @@
 </file>
 
 <file path=ppt/slideLayouts/slideLayout13.xml><?xml version="1.0" encoding="utf-8"?>
-<p:sldLayout xmlns:a="http://schemas.openxmlformats.org/drawingml/2006/main" xmlns:r="http://schemas.openxmlformats.org/officeDocument/2006/relationships" xmlns:p="http://schemas.openxmlformats.org/presentationml/2006/main" preserve="1" showMasterSp="0">
+<p:sldLayout xmlns:a="http://schemas.openxmlformats.org/drawingml/2006/main" xmlns:r="http://schemas.openxmlformats.org/officeDocument/2006/relationships" xmlns:p="http://schemas.openxmlformats.org/presentationml/2006/main" showMasterSp="0" preserve="1">
   <p:cSld name="Name Card">
     <p:spTree>
       <p:nvGrpSpPr>
@@ -4573,7 +4562,7 @@
           </a:lstStyle>
           <a:p>
             <a:r>
-              <a:rPr lang="en-US" smtClean="0"/>
+              <a:rPr lang="en-US"/>
               <a:t>Click to edit Master title style</a:t>
             </a:r>
             <a:endParaRPr lang="en-US" dirty="0"/>
@@ -4694,10 +4683,9 @@
           <a:p>
             <a:pPr lvl="0"/>
             <a:r>
-              <a:rPr lang="en-US" smtClean="0"/>
+              <a:rPr lang="en-US"/>
               <a:t>Edit Master text styles</a:t>
             </a:r>
-            <a:endParaRPr lang="en-US" smtClean="0"/>
           </a:p>
         </p:txBody>
       </p:sp>
@@ -4718,6 +4706,7 @@
           <a:p>
             <a:fld id="{5C12C299-16B2-4475-990D-751901EACC14}" type="datetimeFigureOut">
               <a:rPr lang="en-US" dirty="0"/>
+              <a:t>4/1/2019</a:t>
             </a:fld>
             <a:endParaRPr lang="en-US" dirty="0"/>
           </a:p>
@@ -4743,7 +4732,6 @@
               <a:t>
               </a:t>
             </a:r>
-            <a:endParaRPr lang="en-US" dirty="0"/>
           </a:p>
         </p:txBody>
       </p:sp>
@@ -4800,6 +4788,7 @@
           <a:p>
             <a:fld id="{D57F1E4F-1CFF-5643-939E-217C01CDF565}" type="slidenum">
               <a:rPr lang="en-US" dirty="0"/>
+              <a:t>‹#›</a:t>
             </a:fld>
             <a:endParaRPr lang="en-US" dirty="0"/>
           </a:p>
@@ -4855,7 +4844,7 @@
           </a:lstStyle>
           <a:p>
             <a:r>
-              <a:rPr lang="en-US" smtClean="0"/>
+              <a:rPr lang="en-US"/>
               <a:t>Click to edit Master title style</a:t>
             </a:r>
             <a:endParaRPr lang="en-US" dirty="0"/>
@@ -4930,10 +4919,9 @@
           <a:p>
             <a:pPr lvl="0"/>
             <a:r>
-              <a:rPr lang="en-US" smtClean="0"/>
+              <a:rPr lang="en-US"/>
               <a:t>Edit Master text styles</a:t>
             </a:r>
-            <a:endParaRPr lang="en-US" smtClean="0"/>
           </a:p>
         </p:txBody>
       </p:sp>
@@ -4998,10 +4986,9 @@
           <a:p>
             <a:pPr lvl="0"/>
             <a:r>
-              <a:rPr lang="en-US" smtClean="0"/>
+              <a:rPr lang="en-US"/>
               <a:t>Edit Master text styles</a:t>
             </a:r>
-            <a:endParaRPr lang="en-US" smtClean="0"/>
           </a:p>
         </p:txBody>
       </p:sp>
@@ -5073,10 +5060,9 @@
           <a:p>
             <a:pPr lvl="0"/>
             <a:r>
-              <a:rPr lang="en-US" smtClean="0"/>
+              <a:rPr lang="en-US"/>
               <a:t>Edit Master text styles</a:t>
             </a:r>
-            <a:endParaRPr lang="en-US" smtClean="0"/>
           </a:p>
         </p:txBody>
       </p:sp>
@@ -5141,10 +5127,9 @@
           <a:p>
             <a:pPr lvl="0"/>
             <a:r>
-              <a:rPr lang="en-US" smtClean="0"/>
+              <a:rPr lang="en-US"/>
               <a:t>Edit Master text styles</a:t>
             </a:r>
-            <a:endParaRPr lang="en-US" smtClean="0"/>
           </a:p>
         </p:txBody>
       </p:sp>
@@ -5216,10 +5201,9 @@
           <a:p>
             <a:pPr lvl="0"/>
             <a:r>
-              <a:rPr lang="en-US" smtClean="0"/>
+              <a:rPr lang="en-US"/>
               <a:t>Edit Master text styles</a:t>
             </a:r>
-            <a:endParaRPr lang="en-US" smtClean="0"/>
           </a:p>
         </p:txBody>
       </p:sp>
@@ -5284,10 +5268,9 @@
           <a:p>
             <a:pPr lvl="0"/>
             <a:r>
-              <a:rPr lang="en-US" smtClean="0"/>
+              <a:rPr lang="en-US"/>
               <a:t>Edit Master text styles</a:t>
             </a:r>
-            <a:endParaRPr lang="en-US" smtClean="0"/>
           </a:p>
         </p:txBody>
       </p:sp>
@@ -5382,6 +5365,7 @@
           <a:p>
             <a:fld id="{9FE86839-B9D8-4651-8783-F325ECE74E65}" type="datetimeFigureOut">
               <a:rPr lang="en-US" dirty="0"/>
+              <a:t>4/1/2019</a:t>
             </a:fld>
             <a:endParaRPr lang="en-US" dirty="0"/>
           </a:p>
@@ -5407,7 +5391,6 @@
               <a:t>
               </a:t>
             </a:r>
-            <a:endParaRPr lang="en-US" dirty="0"/>
           </a:p>
         </p:txBody>
       </p:sp>
@@ -5428,6 +5411,7 @@
           <a:p>
             <a:fld id="{D57F1E4F-1CFF-5643-939E-217C01CDF565}" type="slidenum">
               <a:rPr lang="en-US" dirty="0"/>
+              <a:t>‹#›</a:t>
             </a:fld>
             <a:endParaRPr lang="en-US" dirty="0"/>
           </a:p>
@@ -5483,7 +5467,7 @@
           </a:lstStyle>
           <a:p>
             <a:r>
-              <a:rPr lang="en-US" smtClean="0"/>
+              <a:rPr lang="en-US"/>
               <a:t>Click to edit Master title style</a:t>
             </a:r>
             <a:endParaRPr lang="en-US" dirty="0"/>
@@ -5558,10 +5542,9 @@
           <a:p>
             <a:pPr lvl="0"/>
             <a:r>
-              <a:rPr lang="en-US" smtClean="0"/>
+              <a:rPr lang="en-US"/>
               <a:t>Edit Master text styles</a:t>
             </a:r>
-            <a:endParaRPr lang="en-US" smtClean="0"/>
           </a:p>
         </p:txBody>
       </p:sp>
@@ -5637,7 +5620,7 @@
           </a:lstStyle>
           <a:p>
             <a:r>
-              <a:rPr lang="en-US" smtClean="0"/>
+              <a:rPr lang="en-US"/>
               <a:t>Click icon to add picture</a:t>
             </a:r>
             <a:endParaRPr lang="en-US" dirty="0"/>
@@ -5705,10 +5688,9 @@
           <a:p>
             <a:pPr lvl="0"/>
             <a:r>
-              <a:rPr lang="en-US" smtClean="0"/>
+              <a:rPr lang="en-US"/>
               <a:t>Edit Master text styles</a:t>
             </a:r>
-            <a:endParaRPr lang="en-US" smtClean="0"/>
           </a:p>
         </p:txBody>
       </p:sp>
@@ -5780,10 +5762,9 @@
           <a:p>
             <a:pPr lvl="0"/>
             <a:r>
-              <a:rPr lang="en-US" smtClean="0"/>
+              <a:rPr lang="en-US"/>
               <a:t>Edit Master text styles</a:t>
             </a:r>
-            <a:endParaRPr lang="en-US" smtClean="0"/>
           </a:p>
         </p:txBody>
       </p:sp>
@@ -5859,7 +5840,7 @@
           </a:lstStyle>
           <a:p>
             <a:r>
-              <a:rPr lang="en-US" smtClean="0"/>
+              <a:rPr lang="en-US"/>
               <a:t>Click icon to add picture</a:t>
             </a:r>
             <a:endParaRPr lang="en-US" dirty="0"/>
@@ -5927,10 +5908,9 @@
           <a:p>
             <a:pPr lvl="0"/>
             <a:r>
-              <a:rPr lang="en-US" smtClean="0"/>
+              <a:rPr lang="en-US"/>
               <a:t>Edit Master text styles</a:t>
             </a:r>
-            <a:endParaRPr lang="en-US" smtClean="0"/>
           </a:p>
         </p:txBody>
       </p:sp>
@@ -6002,10 +5982,9 @@
           <a:p>
             <a:pPr lvl="0"/>
             <a:r>
-              <a:rPr lang="en-US" smtClean="0"/>
+              <a:rPr lang="en-US"/>
               <a:t>Edit Master text styles</a:t>
             </a:r>
-            <a:endParaRPr lang="en-US" smtClean="0"/>
           </a:p>
         </p:txBody>
       </p:sp>
@@ -6081,7 +6060,7 @@
           </a:lstStyle>
           <a:p>
             <a:r>
-              <a:rPr lang="en-US" smtClean="0"/>
+              <a:rPr lang="en-US"/>
               <a:t>Click icon to add picture</a:t>
             </a:r>
             <a:endParaRPr lang="en-US" dirty="0"/>
@@ -6149,10 +6128,9 @@
           <a:p>
             <a:pPr lvl="0"/>
             <a:r>
-              <a:rPr lang="en-US" smtClean="0"/>
+              <a:rPr lang="en-US"/>
               <a:t>Edit Master text styles</a:t>
             </a:r>
-            <a:endParaRPr lang="en-US" smtClean="0"/>
           </a:p>
         </p:txBody>
       </p:sp>
@@ -6247,6 +6225,7 @@
           <a:p>
             <a:fld id="{FD484F64-32F6-45C5-931F-ADC1662401D0}" type="datetimeFigureOut">
               <a:rPr lang="en-US" dirty="0"/>
+              <a:t>4/1/2019</a:t>
             </a:fld>
             <a:endParaRPr lang="en-US" dirty="0"/>
           </a:p>
@@ -6277,7 +6256,6 @@
               <a:t>
               </a:t>
             </a:r>
-            <a:endParaRPr lang="en-US" dirty="0"/>
           </a:p>
         </p:txBody>
       </p:sp>
@@ -6298,6 +6276,7 @@
           <a:p>
             <a:fld id="{D57F1E4F-1CFF-5643-939E-217C01CDF565}" type="slidenum">
               <a:rPr lang="en-US" dirty="0"/>
+              <a:t>‹#›</a:t>
             </a:fld>
             <a:endParaRPr lang="en-US" dirty="0"/>
           </a:p>
@@ -6349,7 +6328,7 @@
           <a:lstStyle/>
           <a:p>
             <a:r>
-              <a:rPr lang="en-US" smtClean="0"/>
+              <a:rPr lang="en-US"/>
               <a:t>Click to edit Master title style</a:t>
             </a:r>
             <a:endParaRPr lang="en-US" dirty="0"/>
@@ -6378,39 +6357,35 @@
           <a:p>
             <a:pPr lvl="0"/>
             <a:r>
-              <a:rPr lang="en-US" smtClean="0"/>
+              <a:rPr lang="en-US"/>
               <a:t>Edit Master text styles</a:t>
             </a:r>
-            <a:endParaRPr lang="en-US" smtClean="0"/>
           </a:p>
           <a:p>
             <a:pPr lvl="1"/>
             <a:r>
-              <a:rPr lang="en-US" smtClean="0"/>
+              <a:rPr lang="en-US"/>
               <a:t>Second level</a:t>
             </a:r>
-            <a:endParaRPr lang="en-US" smtClean="0"/>
           </a:p>
           <a:p>
             <a:pPr lvl="2"/>
             <a:r>
-              <a:rPr lang="en-US" smtClean="0"/>
+              <a:rPr lang="en-US"/>
               <a:t>Third level</a:t>
             </a:r>
-            <a:endParaRPr lang="en-US" smtClean="0"/>
           </a:p>
           <a:p>
             <a:pPr lvl="3"/>
             <a:r>
-              <a:rPr lang="en-US" smtClean="0"/>
+              <a:rPr lang="en-US"/>
               <a:t>Fourth level</a:t>
             </a:r>
-            <a:endParaRPr lang="en-US" smtClean="0"/>
           </a:p>
           <a:p>
             <a:pPr lvl="4"/>
             <a:r>
-              <a:rPr lang="en-US" smtClean="0"/>
+              <a:rPr lang="en-US"/>
               <a:t>Fifth level</a:t>
             </a:r>
             <a:endParaRPr lang="en-US" dirty="0"/>
@@ -6439,6 +6414,7 @@
           <a:p>
             <a:fld id="{53086D93-FCAC-47E0-A2EE-787E62CA814C}" type="datetimeFigureOut">
               <a:rPr lang="en-US" dirty="0"/>
+              <a:t>4/1/2019</a:t>
             </a:fld>
             <a:endParaRPr lang="en-US" dirty="0"/>
           </a:p>
@@ -6464,7 +6440,6 @@
               <a:t>
               </a:t>
             </a:r>
-            <a:endParaRPr lang="en-US" dirty="0"/>
           </a:p>
         </p:txBody>
       </p:sp>
@@ -6485,6 +6460,7 @@
           <a:p>
             <a:fld id="{D57F1E4F-1CFF-5643-939E-217C01CDF565}" type="slidenum">
               <a:rPr lang="en-US" dirty="0"/>
+              <a:t>‹#›</a:t>
             </a:fld>
             <a:endParaRPr lang="en-US" dirty="0"/>
           </a:p>
@@ -6499,7 +6475,7 @@
 </file>
 
 <file path=ppt/slideLayouts/slideLayout17.xml><?xml version="1.0" encoding="utf-8"?>
-<p:sldLayout xmlns:a="http://schemas.openxmlformats.org/drawingml/2006/main" xmlns:r="http://schemas.openxmlformats.org/officeDocument/2006/relationships" xmlns:p="http://schemas.openxmlformats.org/presentationml/2006/main" type="vertTitleAndTx" preserve="1" showMasterSp="0">
+<p:sldLayout xmlns:a="http://schemas.openxmlformats.org/drawingml/2006/main" xmlns:r="http://schemas.openxmlformats.org/officeDocument/2006/relationships" xmlns:p="http://schemas.openxmlformats.org/presentationml/2006/main" showMasterSp="0" type="vertTitleAndTx" preserve="1">
   <p:cSld name="Vertical Title and Text">
     <p:spTree>
       <p:nvGrpSpPr>
@@ -7323,7 +7299,7 @@
           <a:lstStyle/>
           <a:p>
             <a:r>
-              <a:rPr lang="en-US" smtClean="0"/>
+              <a:rPr lang="en-US"/>
               <a:t>Click to edit Master title style</a:t>
             </a:r>
             <a:endParaRPr lang="en-US" dirty="0"/>
@@ -7352,39 +7328,35 @@
           <a:p>
             <a:pPr lvl="0"/>
             <a:r>
-              <a:rPr lang="en-US" smtClean="0"/>
+              <a:rPr lang="en-US"/>
               <a:t>Edit Master text styles</a:t>
             </a:r>
-            <a:endParaRPr lang="en-US" smtClean="0"/>
           </a:p>
           <a:p>
             <a:pPr lvl="1"/>
             <a:r>
-              <a:rPr lang="en-US" smtClean="0"/>
+              <a:rPr lang="en-US"/>
               <a:t>Second level</a:t>
             </a:r>
-            <a:endParaRPr lang="en-US" smtClean="0"/>
           </a:p>
           <a:p>
             <a:pPr lvl="2"/>
             <a:r>
-              <a:rPr lang="en-US" smtClean="0"/>
+              <a:rPr lang="en-US"/>
               <a:t>Third level</a:t>
             </a:r>
-            <a:endParaRPr lang="en-US" smtClean="0"/>
           </a:p>
           <a:p>
             <a:pPr lvl="3"/>
             <a:r>
-              <a:rPr lang="en-US" smtClean="0"/>
+              <a:rPr lang="en-US"/>
               <a:t>Fourth level</a:t>
             </a:r>
-            <a:endParaRPr lang="en-US" smtClean="0"/>
           </a:p>
           <a:p>
             <a:pPr lvl="4"/>
             <a:r>
-              <a:rPr lang="en-US" smtClean="0"/>
+              <a:rPr lang="en-US"/>
               <a:t>Fifth level</a:t>
             </a:r>
             <a:endParaRPr lang="en-US" dirty="0"/>
@@ -7413,6 +7385,7 @@
           <a:p>
             <a:fld id="{CDA879A6-0FD0-4734-A311-86BFCA472E6E}" type="datetimeFigureOut">
               <a:rPr lang="en-US" dirty="0"/>
+              <a:t>4/1/2019</a:t>
             </a:fld>
             <a:endParaRPr lang="en-US" dirty="0"/>
           </a:p>
@@ -7438,7 +7411,6 @@
               <a:t>
               </a:t>
             </a:r>
-            <a:endParaRPr lang="en-US" dirty="0"/>
           </a:p>
         </p:txBody>
       </p:sp>
@@ -7495,6 +7467,7 @@
           <a:p>
             <a:fld id="{D57F1E4F-1CFF-5643-939E-217C01CDF565}" type="slidenum">
               <a:rPr lang="en-US" dirty="0"/>
+              <a:t>‹#›</a:t>
             </a:fld>
             <a:endParaRPr lang="en-US" dirty="0"/>
           </a:p>
@@ -7541,7 +7514,7 @@
           <a:lstStyle/>
           <a:p>
             <a:r>
-              <a:rPr lang="en-US" smtClean="0"/>
+              <a:rPr lang="en-US"/>
               <a:t>Click to edit Master title style</a:t>
             </a:r>
             <a:endParaRPr lang="en-US" dirty="0"/>
@@ -7570,39 +7543,35 @@
           <a:p>
             <a:pPr lvl="0"/>
             <a:r>
-              <a:rPr lang="en-US" smtClean="0"/>
+              <a:rPr lang="en-US"/>
               <a:t>Edit Master text styles</a:t>
             </a:r>
-            <a:endParaRPr lang="en-US" smtClean="0"/>
           </a:p>
           <a:p>
             <a:pPr lvl="1"/>
             <a:r>
-              <a:rPr lang="en-US" smtClean="0"/>
+              <a:rPr lang="en-US"/>
               <a:t>Second level</a:t>
             </a:r>
-            <a:endParaRPr lang="en-US" smtClean="0"/>
           </a:p>
           <a:p>
             <a:pPr lvl="2"/>
             <a:r>
-              <a:rPr lang="en-US" smtClean="0"/>
+              <a:rPr lang="en-US"/>
               <a:t>Third level</a:t>
             </a:r>
-            <a:endParaRPr lang="en-US" smtClean="0"/>
           </a:p>
           <a:p>
             <a:pPr lvl="3"/>
             <a:r>
-              <a:rPr lang="en-US" smtClean="0"/>
+              <a:rPr lang="en-US"/>
               <a:t>Fourth level</a:t>
             </a:r>
-            <a:endParaRPr lang="en-US" smtClean="0"/>
           </a:p>
           <a:p>
             <a:pPr lvl="4"/>
             <a:r>
-              <a:rPr lang="en-US" smtClean="0"/>
+              <a:rPr lang="en-US"/>
               <a:t>Fifth level</a:t>
             </a:r>
             <a:endParaRPr lang="en-US" dirty="0"/>
@@ -7626,6 +7595,7 @@
           <a:p>
             <a:fld id="{19C9CA7B-DFD4-44B5-8C60-D14B8CD1FB59}" type="datetimeFigureOut">
               <a:rPr lang="en-US" dirty="0"/>
+              <a:t>4/1/2019</a:t>
             </a:fld>
             <a:endParaRPr lang="en-US" dirty="0"/>
           </a:p>
@@ -7651,7 +7621,6 @@
               <a:t>
               </a:t>
             </a:r>
-            <a:endParaRPr lang="en-US" dirty="0"/>
           </a:p>
         </p:txBody>
       </p:sp>
@@ -7672,6 +7641,7 @@
           <a:p>
             <a:fld id="{D57F1E4F-1CFF-5643-939E-217C01CDF565}" type="slidenum">
               <a:rPr lang="en-US" dirty="0"/>
+              <a:t>‹#›</a:t>
             </a:fld>
             <a:endParaRPr lang="en-US" dirty="0"/>
           </a:p>
@@ -7686,7 +7656,7 @@
 </file>
 
 <file path=ppt/slideLayouts/slideLayout3.xml><?xml version="1.0" encoding="utf-8"?>
-<p:sldLayout xmlns:a="http://schemas.openxmlformats.org/drawingml/2006/main" xmlns:r="http://schemas.openxmlformats.org/officeDocument/2006/relationships" xmlns:p="http://schemas.openxmlformats.org/presentationml/2006/main" type="secHead" preserve="1" showMasterSp="0">
+<p:sldLayout xmlns:a="http://schemas.openxmlformats.org/drawingml/2006/main" xmlns:r="http://schemas.openxmlformats.org/officeDocument/2006/relationships" xmlns:p="http://schemas.openxmlformats.org/presentationml/2006/main" showMasterSp="0" type="secHead" preserve="1">
   <p:cSld name="Section Header">
     <p:spTree>
       <p:nvGrpSpPr>
@@ -8514,7 +8484,7 @@
           </a:lstStyle>
           <a:p>
             <a:r>
-              <a:rPr lang="en-US" smtClean="0"/>
+              <a:rPr lang="en-US"/>
               <a:t>Click to edit Master title style</a:t>
             </a:r>
             <a:endParaRPr lang="en-US" dirty="0"/>
@@ -8635,10 +8605,9 @@
           <a:p>
             <a:pPr lvl="0"/>
             <a:r>
-              <a:rPr lang="en-US" smtClean="0"/>
+              <a:rPr lang="en-US"/>
               <a:t>Edit Master text styles</a:t>
             </a:r>
-            <a:endParaRPr lang="en-US" smtClean="0"/>
           </a:p>
         </p:txBody>
       </p:sp>
@@ -8659,6 +8628,7 @@
           <a:p>
             <a:fld id="{F34E6425-0181-43F2-84FC-787E803FD2F8}" type="datetimeFigureOut">
               <a:rPr lang="en-US" dirty="0"/>
+              <a:t>4/1/2019</a:t>
             </a:fld>
             <a:endParaRPr lang="en-US" dirty="0"/>
           </a:p>
@@ -8684,7 +8654,6 @@
               <a:t>
               </a:t>
             </a:r>
-            <a:endParaRPr lang="en-US" dirty="0"/>
           </a:p>
         </p:txBody>
       </p:sp>
@@ -8741,6 +8710,7 @@
           <a:p>
             <a:fld id="{D57F1E4F-1CFF-5643-939E-217C01CDF565}" type="slidenum">
               <a:rPr lang="en-US" dirty="0"/>
+              <a:t>‹#›</a:t>
             </a:fld>
             <a:endParaRPr lang="en-US" dirty="0"/>
           </a:p>
@@ -8787,7 +8757,7 @@
           <a:lstStyle/>
           <a:p>
             <a:r>
-              <a:rPr lang="en-US" smtClean="0"/>
+              <a:rPr lang="en-US"/>
               <a:t>Click to edit Master title style</a:t>
             </a:r>
             <a:endParaRPr lang="en-US" dirty="0"/>
@@ -8818,39 +8788,35 @@
           <a:p>
             <a:pPr lvl="0"/>
             <a:r>
-              <a:rPr lang="en-US" smtClean="0"/>
+              <a:rPr lang="en-US"/>
               <a:t>Edit Master text styles</a:t>
             </a:r>
-            <a:endParaRPr lang="en-US" smtClean="0"/>
           </a:p>
           <a:p>
             <a:pPr lvl="1"/>
             <a:r>
-              <a:rPr lang="en-US" smtClean="0"/>
+              <a:rPr lang="en-US"/>
               <a:t>Second level</a:t>
             </a:r>
-            <a:endParaRPr lang="en-US" smtClean="0"/>
           </a:p>
           <a:p>
             <a:pPr lvl="2"/>
             <a:r>
-              <a:rPr lang="en-US" smtClean="0"/>
+              <a:rPr lang="en-US"/>
               <a:t>Third level</a:t>
             </a:r>
-            <a:endParaRPr lang="en-US" smtClean="0"/>
           </a:p>
           <a:p>
             <a:pPr lvl="3"/>
             <a:r>
-              <a:rPr lang="en-US" smtClean="0"/>
+              <a:rPr lang="en-US"/>
               <a:t>Fourth level</a:t>
             </a:r>
-            <a:endParaRPr lang="en-US" smtClean="0"/>
           </a:p>
           <a:p>
             <a:pPr lvl="4"/>
             <a:r>
-              <a:rPr lang="en-US" smtClean="0"/>
+              <a:rPr lang="en-US"/>
               <a:t>Fifth level</a:t>
             </a:r>
             <a:endParaRPr lang="en-US" dirty="0"/>
@@ -8881,39 +8847,35 @@
           <a:p>
             <a:pPr lvl="0"/>
             <a:r>
-              <a:rPr lang="en-US" smtClean="0"/>
+              <a:rPr lang="en-US"/>
               <a:t>Edit Master text styles</a:t>
             </a:r>
-            <a:endParaRPr lang="en-US" smtClean="0"/>
           </a:p>
           <a:p>
             <a:pPr lvl="1"/>
             <a:r>
-              <a:rPr lang="en-US" smtClean="0"/>
+              <a:rPr lang="en-US"/>
               <a:t>Second level</a:t>
             </a:r>
-            <a:endParaRPr lang="en-US" smtClean="0"/>
           </a:p>
           <a:p>
             <a:pPr lvl="2"/>
             <a:r>
-              <a:rPr lang="en-US" smtClean="0"/>
+              <a:rPr lang="en-US"/>
               <a:t>Third level</a:t>
             </a:r>
-            <a:endParaRPr lang="en-US" smtClean="0"/>
           </a:p>
           <a:p>
             <a:pPr lvl="3"/>
             <a:r>
-              <a:rPr lang="en-US" smtClean="0"/>
+              <a:rPr lang="en-US"/>
               <a:t>Fourth level</a:t>
             </a:r>
-            <a:endParaRPr lang="en-US" smtClean="0"/>
           </a:p>
           <a:p>
             <a:pPr lvl="4"/>
             <a:r>
-              <a:rPr lang="en-US" smtClean="0"/>
+              <a:rPr lang="en-US"/>
               <a:t>Fifth level</a:t>
             </a:r>
             <a:endParaRPr lang="en-US" dirty="0"/>
@@ -8937,6 +8899,7 @@
           <a:p>
             <a:fld id="{3BDB8791-F1B0-41E7-B7FD-A781E65C4266}" type="datetimeFigureOut">
               <a:rPr lang="en-US" dirty="0"/>
+              <a:t>4/1/2019</a:t>
             </a:fld>
             <a:endParaRPr lang="en-US" dirty="0"/>
           </a:p>
@@ -8962,7 +8925,6 @@
               <a:t>
               </a:t>
             </a:r>
-            <a:endParaRPr lang="en-US" dirty="0"/>
           </a:p>
         </p:txBody>
       </p:sp>
@@ -8983,6 +8945,7 @@
           <a:p>
             <a:fld id="{D57F1E4F-1CFF-5643-939E-217C01CDF565}" type="slidenum">
               <a:rPr lang="en-US" dirty="0"/>
+              <a:t>‹#›</a:t>
             </a:fld>
             <a:endParaRPr lang="en-US" dirty="0"/>
           </a:p>
@@ -9033,7 +8996,7 @@
           </a:lstStyle>
           <a:p>
             <a:r>
-              <a:rPr lang="en-US" smtClean="0"/>
+              <a:rPr lang="en-US"/>
               <a:t>Click to edit Master title style</a:t>
             </a:r>
             <a:endParaRPr lang="en-US" dirty="0"/>
@@ -9105,10 +9068,9 @@
           <a:p>
             <a:pPr lvl="0"/>
             <a:r>
-              <a:rPr lang="en-US" smtClean="0"/>
+              <a:rPr lang="en-US"/>
               <a:t>Edit Master text styles</a:t>
             </a:r>
-            <a:endParaRPr lang="en-US" smtClean="0"/>
           </a:p>
         </p:txBody>
       </p:sp>
@@ -9136,39 +9098,35 @@
           <a:p>
             <a:pPr lvl="0"/>
             <a:r>
-              <a:rPr lang="en-US" smtClean="0"/>
+              <a:rPr lang="en-US"/>
               <a:t>Edit Master text styles</a:t>
             </a:r>
-            <a:endParaRPr lang="en-US" smtClean="0"/>
           </a:p>
           <a:p>
             <a:pPr lvl="1"/>
             <a:r>
-              <a:rPr lang="en-US" smtClean="0"/>
+              <a:rPr lang="en-US"/>
               <a:t>Second level</a:t>
             </a:r>
-            <a:endParaRPr lang="en-US" smtClean="0"/>
           </a:p>
           <a:p>
             <a:pPr lvl="2"/>
             <a:r>
-              <a:rPr lang="en-US" smtClean="0"/>
+              <a:rPr lang="en-US"/>
               <a:t>Third level</a:t>
             </a:r>
-            <a:endParaRPr lang="en-US" smtClean="0"/>
           </a:p>
           <a:p>
             <a:pPr lvl="3"/>
             <a:r>
-              <a:rPr lang="en-US" smtClean="0"/>
+              <a:rPr lang="en-US"/>
               <a:t>Fourth level</a:t>
             </a:r>
-            <a:endParaRPr lang="en-US" smtClean="0"/>
           </a:p>
           <a:p>
             <a:pPr lvl="4"/>
             <a:r>
-              <a:rPr lang="en-US" smtClean="0"/>
+              <a:rPr lang="en-US"/>
               <a:t>Fifth level</a:t>
             </a:r>
             <a:endParaRPr lang="en-US" dirty="0"/>
@@ -9240,10 +9198,9 @@
           <a:p>
             <a:pPr lvl="0"/>
             <a:r>
-              <a:rPr lang="en-US" smtClean="0"/>
+              <a:rPr lang="en-US"/>
               <a:t>Edit Master text styles</a:t>
             </a:r>
-            <a:endParaRPr lang="en-US" smtClean="0"/>
           </a:p>
         </p:txBody>
       </p:sp>
@@ -9299,39 +9256,35 @@
           <a:p>
             <a:pPr lvl="0"/>
             <a:r>
-              <a:rPr lang="en-US" smtClean="0"/>
+              <a:rPr lang="en-US"/>
               <a:t>Edit Master text styles</a:t>
             </a:r>
-            <a:endParaRPr lang="en-US" smtClean="0"/>
           </a:p>
           <a:p>
             <a:pPr lvl="1"/>
             <a:r>
-              <a:rPr lang="en-US" smtClean="0"/>
+              <a:rPr lang="en-US"/>
               <a:t>Second level</a:t>
             </a:r>
-            <a:endParaRPr lang="en-US" smtClean="0"/>
           </a:p>
           <a:p>
             <a:pPr lvl="2"/>
             <a:r>
-              <a:rPr lang="en-US" smtClean="0"/>
+              <a:rPr lang="en-US"/>
               <a:t>Third level</a:t>
             </a:r>
-            <a:endParaRPr lang="en-US" smtClean="0"/>
           </a:p>
           <a:p>
             <a:pPr lvl="3"/>
             <a:r>
-              <a:rPr lang="en-US" smtClean="0"/>
+              <a:rPr lang="en-US"/>
               <a:t>Fourth level</a:t>
             </a:r>
-            <a:endParaRPr lang="en-US" smtClean="0"/>
           </a:p>
           <a:p>
             <a:pPr lvl="4"/>
             <a:r>
-              <a:rPr lang="en-US" smtClean="0"/>
+              <a:rPr lang="en-US"/>
               <a:t>Fifth level</a:t>
             </a:r>
             <a:endParaRPr lang="en-US" dirty="0"/>
@@ -9355,6 +9308,7 @@
           <a:p>
             <a:fld id="{5FDD63B2-E120-4ED8-B27B-C685F510A5FE}" type="datetimeFigureOut">
               <a:rPr lang="en-US" dirty="0"/>
+              <a:t>4/1/2019</a:t>
             </a:fld>
             <a:endParaRPr lang="en-US" dirty="0"/>
           </a:p>
@@ -9380,7 +9334,6 @@
               <a:t>
               </a:t>
             </a:r>
-            <a:endParaRPr lang="en-US" dirty="0"/>
           </a:p>
         </p:txBody>
       </p:sp>
@@ -9401,6 +9354,7 @@
           <a:p>
             <a:fld id="{D57F1E4F-1CFF-5643-939E-217C01CDF565}" type="slidenum">
               <a:rPr lang="en-US" dirty="0"/>
+              <a:t>‹#›</a:t>
             </a:fld>
             <a:endParaRPr lang="en-US" dirty="0"/>
           </a:p>
@@ -9456,7 +9410,7 @@
           </a:lstStyle>
           <a:p>
             <a:r>
-              <a:rPr lang="en-US" smtClean="0"/>
+              <a:rPr lang="en-US"/>
               <a:t>Click to edit Master title style</a:t>
             </a:r>
             <a:endParaRPr lang="en-US" dirty="0"/>
@@ -9480,6 +9434,7 @@
           <a:p>
             <a:fld id="{7AA18ACC-A947-437B-A130-35BD54FDF1E9}" type="datetimeFigureOut">
               <a:rPr lang="en-US" dirty="0"/>
+              <a:t>4/1/2019</a:t>
             </a:fld>
             <a:endParaRPr lang="en-US" dirty="0"/>
           </a:p>
@@ -9505,7 +9460,6 @@
               <a:t>
               </a:t>
             </a:r>
-            <a:endParaRPr lang="en-US" dirty="0"/>
           </a:p>
         </p:txBody>
       </p:sp>
@@ -9526,6 +9480,7 @@
           <a:p>
             <a:fld id="{D57F1E4F-1CFF-5643-939E-217C01CDF565}" type="slidenum">
               <a:rPr lang="en-US" dirty="0"/>
+              <a:t>‹#›</a:t>
             </a:fld>
             <a:endParaRPr lang="en-US" dirty="0"/>
           </a:p>
@@ -9540,7 +9495,7 @@
 </file>
 
 <file path=ppt/slideLayouts/slideLayout7.xml><?xml version="1.0" encoding="utf-8"?>
-<p:sldLayout xmlns:a="http://schemas.openxmlformats.org/drawingml/2006/main" xmlns:r="http://schemas.openxmlformats.org/officeDocument/2006/relationships" xmlns:p="http://schemas.openxmlformats.org/presentationml/2006/main" type="blank" preserve="1" showMasterSp="0">
+<p:sldLayout xmlns:a="http://schemas.openxmlformats.org/drawingml/2006/main" xmlns:r="http://schemas.openxmlformats.org/officeDocument/2006/relationships" xmlns:p="http://schemas.openxmlformats.org/presentationml/2006/main" showMasterSp="0" type="blank" preserve="1">
   <p:cSld name="Blank">
     <p:spTree>
       <p:nvGrpSpPr>
@@ -9573,6 +9528,7 @@
           <a:p>
             <a:fld id="{7C8D7E02-BCB8-4D50-A234-369438C08659}" type="datetimeFigureOut">
               <a:rPr lang="en-US" dirty="0"/>
+              <a:t>4/1/2019</a:t>
             </a:fld>
             <a:endParaRPr lang="en-US" dirty="0"/>
           </a:p>
@@ -9598,7 +9554,6 @@
               <a:t>
               </a:t>
             </a:r>
-            <a:endParaRPr lang="en-US" dirty="0"/>
           </a:p>
         </p:txBody>
       </p:sp>
@@ -9655,6 +9610,7 @@
           <a:p>
             <a:fld id="{D57F1E4F-1CFF-5643-939E-217C01CDF565}" type="slidenum">
               <a:rPr lang="en-US" dirty="0"/>
+              <a:t>‹#›</a:t>
             </a:fld>
             <a:endParaRPr lang="en-US" dirty="0"/>
           </a:p>
@@ -9669,7 +9625,7 @@
 </file>
 
 <file path=ppt/slideLayouts/slideLayout8.xml><?xml version="1.0" encoding="utf-8"?>
-<p:sldLayout xmlns:a="http://schemas.openxmlformats.org/drawingml/2006/main" xmlns:r="http://schemas.openxmlformats.org/officeDocument/2006/relationships" xmlns:p="http://schemas.openxmlformats.org/presentationml/2006/main" type="objTx" preserve="1" showMasterSp="0">
+<p:sldLayout xmlns:a="http://schemas.openxmlformats.org/drawingml/2006/main" xmlns:r="http://schemas.openxmlformats.org/officeDocument/2006/relationships" xmlns:p="http://schemas.openxmlformats.org/presentationml/2006/main" showMasterSp="0" type="objTx" preserve="1">
   <p:cSld name="Content with Caption">
     <p:spTree>
       <p:nvGrpSpPr>
@@ -10497,7 +10453,7 @@
           </a:lstStyle>
           <a:p>
             <a:r>
-              <a:rPr lang="en-US" smtClean="0"/>
+              <a:rPr lang="en-US"/>
               <a:t>Click to edit Master title style</a:t>
             </a:r>
             <a:endParaRPr lang="en-US" dirty="0"/>
@@ -10528,39 +10484,35 @@
           <a:p>
             <a:pPr lvl="0"/>
             <a:r>
-              <a:rPr lang="en-US" smtClean="0"/>
+              <a:rPr lang="en-US"/>
               <a:t>Edit Master text styles</a:t>
             </a:r>
-            <a:endParaRPr lang="en-US" smtClean="0"/>
           </a:p>
           <a:p>
             <a:pPr lvl="1"/>
             <a:r>
-              <a:rPr lang="en-US" smtClean="0"/>
+              <a:rPr lang="en-US"/>
               <a:t>Second level</a:t>
             </a:r>
-            <a:endParaRPr lang="en-US" smtClean="0"/>
           </a:p>
           <a:p>
             <a:pPr lvl="2"/>
             <a:r>
-              <a:rPr lang="en-US" smtClean="0"/>
+              <a:rPr lang="en-US"/>
               <a:t>Third level</a:t>
             </a:r>
-            <a:endParaRPr lang="en-US" smtClean="0"/>
           </a:p>
           <a:p>
             <a:pPr lvl="3"/>
             <a:r>
-              <a:rPr lang="en-US" smtClean="0"/>
+              <a:rPr lang="en-US"/>
               <a:t>Fourth level</a:t>
             </a:r>
-            <a:endParaRPr lang="en-US" smtClean="0"/>
           </a:p>
           <a:p>
             <a:pPr lvl="4"/>
             <a:r>
-              <a:rPr lang="en-US" smtClean="0"/>
+              <a:rPr lang="en-US"/>
               <a:t>Fifth level</a:t>
             </a:r>
             <a:endParaRPr lang="en-US" dirty="0"/>
@@ -10633,10 +10585,9 @@
           <a:p>
             <a:pPr lvl="0"/>
             <a:r>
-              <a:rPr lang="en-US" smtClean="0"/>
+              <a:rPr lang="en-US"/>
               <a:t>Edit Master text styles</a:t>
             </a:r>
-            <a:endParaRPr lang="en-US" smtClean="0"/>
           </a:p>
         </p:txBody>
       </p:sp>
@@ -10657,6 +10608,7 @@
           <a:p>
             <a:fld id="{76E86A4C-8E40-4F87-A4F0-01A0687C5742}" type="datetimeFigureOut">
               <a:rPr lang="en-US" dirty="0"/>
+              <a:t>4/1/2019</a:t>
             </a:fld>
             <a:endParaRPr lang="en-US" dirty="0"/>
           </a:p>
@@ -10682,7 +10634,6 @@
               <a:t>
               </a:t>
             </a:r>
-            <a:endParaRPr lang="en-US" dirty="0"/>
           </a:p>
         </p:txBody>
       </p:sp>
@@ -10739,6 +10690,7 @@
           <a:p>
             <a:fld id="{D57F1E4F-1CFF-5643-939E-217C01CDF565}" type="slidenum">
               <a:rPr lang="en-US" dirty="0"/>
+              <a:t>‹#›</a:t>
             </a:fld>
             <a:endParaRPr lang="en-US" dirty="0"/>
           </a:p>
@@ -10753,7 +10705,7 @@
 </file>
 
 <file path=ppt/slideLayouts/slideLayout9.xml><?xml version="1.0" encoding="utf-8"?>
-<p:sldLayout xmlns:a="http://schemas.openxmlformats.org/drawingml/2006/main" xmlns:r="http://schemas.openxmlformats.org/officeDocument/2006/relationships" xmlns:p="http://schemas.openxmlformats.org/presentationml/2006/main" type="picTx" preserve="1" showMasterSp="0">
+<p:sldLayout xmlns:a="http://schemas.openxmlformats.org/drawingml/2006/main" xmlns:r="http://schemas.openxmlformats.org/officeDocument/2006/relationships" xmlns:p="http://schemas.openxmlformats.org/presentationml/2006/main" showMasterSp="0" type="picTx" preserve="1">
   <p:cSld name="Picture with Caption">
     <p:spTree>
       <p:nvGrpSpPr>
@@ -11583,7 +11535,7 @@
           </a:lstStyle>
           <a:p>
             <a:r>
-              <a:rPr lang="en-US" smtClean="0"/>
+              <a:rPr lang="en-US"/>
               <a:t>Click to edit Master title style</a:t>
             </a:r>
             <a:endParaRPr lang="en-US" dirty="0"/>
@@ -11665,7 +11617,7 @@
               <a:buNone/>
             </a:pPr>
             <a:r>
-              <a:rPr lang="en-US" smtClean="0"/>
+              <a:rPr lang="en-US"/>
               <a:t>Click icon to add picture</a:t>
             </a:r>
             <a:endParaRPr lang="en-US" dirty="0"/>
@@ -11740,10 +11692,9 @@
           <a:p>
             <a:pPr lvl="0"/>
             <a:r>
-              <a:rPr lang="en-US" smtClean="0"/>
+              <a:rPr lang="en-US"/>
               <a:t>Edit Master text styles</a:t>
             </a:r>
-            <a:endParaRPr lang="en-US" smtClean="0"/>
           </a:p>
         </p:txBody>
       </p:sp>
@@ -11764,6 +11715,7 @@
           <a:p>
             <a:fld id="{35E72C73-2D91-4E12-BA25-F0AA0C03599B}" type="datetimeFigureOut">
               <a:rPr lang="en-US" dirty="0"/>
+              <a:t>4/1/2019</a:t>
             </a:fld>
             <a:endParaRPr lang="en-US" dirty="0"/>
           </a:p>
@@ -11789,7 +11741,6 @@
               <a:t>
               </a:t>
             </a:r>
-            <a:endParaRPr lang="en-US" dirty="0"/>
           </a:p>
         </p:txBody>
       </p:sp>
@@ -11846,6 +11797,7 @@
           <a:p>
             <a:fld id="{D57F1E4F-1CFF-5643-939E-217C01CDF565}" type="slidenum">
               <a:rPr lang="en-US" dirty="0"/>
+              <a:t>‹#›</a:t>
             </a:fld>
             <a:endParaRPr lang="en-US" dirty="0"/>
           </a:p>
@@ -11910,7 +11862,7 @@
               <a:avLst/>
             </a:prstGeom>
             <a:blipFill>
-              <a:blip r:embed="rId18">
+              <a:blip r:embed="rId19">
                 <a:duotone>
                   <a:schemeClr val="dk2">
                     <a:shade val="69000"/>
@@ -12657,7 +12609,7 @@
           <a:lstStyle/>
           <a:p>
             <a:r>
-              <a:rPr lang="en-US" smtClean="0"/>
+              <a:rPr lang="en-US"/>
               <a:t>Click to edit Master title style</a:t>
             </a:r>
             <a:endParaRPr lang="en-US" dirty="0"/>
@@ -12691,39 +12643,35 @@
           <a:p>
             <a:pPr lvl="0"/>
             <a:r>
-              <a:rPr lang="en-US" smtClean="0"/>
+              <a:rPr lang="en-US"/>
               <a:t>Edit Master text styles</a:t>
             </a:r>
-            <a:endParaRPr lang="en-US" smtClean="0"/>
           </a:p>
           <a:p>
             <a:pPr lvl="1"/>
             <a:r>
-              <a:rPr lang="en-US" smtClean="0"/>
+              <a:rPr lang="en-US"/>
               <a:t>Second level</a:t>
             </a:r>
-            <a:endParaRPr lang="en-US" smtClean="0"/>
           </a:p>
           <a:p>
             <a:pPr lvl="2"/>
             <a:r>
-              <a:rPr lang="en-US" smtClean="0"/>
+              <a:rPr lang="en-US"/>
               <a:t>Third level</a:t>
             </a:r>
-            <a:endParaRPr lang="en-US" smtClean="0"/>
           </a:p>
           <a:p>
             <a:pPr lvl="3"/>
             <a:r>
-              <a:rPr lang="en-US" smtClean="0"/>
+              <a:rPr lang="en-US"/>
               <a:t>Fourth level</a:t>
             </a:r>
-            <a:endParaRPr lang="en-US" smtClean="0"/>
           </a:p>
           <a:p>
             <a:pPr lvl="4"/>
             <a:r>
-              <a:rPr lang="en-US" smtClean="0"/>
+              <a:rPr lang="en-US"/>
               <a:t>Fifth level</a:t>
             </a:r>
             <a:endParaRPr lang="en-US" dirty="0"/>
@@ -12763,6 +12711,7 @@
           <a:p>
             <a:fld id="{2BE451C3-0FF4-47C4-B829-773ADF60F88C}" type="datetimeFigureOut">
               <a:rPr lang="en-US" dirty="0"/>
+              <a:t>4/1/2019</a:t>
             </a:fld>
             <a:endParaRPr lang="en-US" dirty="0"/>
           </a:p>
@@ -12804,7 +12753,6 @@
               <a:t>
               </a:t>
             </a:r>
-            <a:endParaRPr lang="en-US" dirty="0"/>
           </a:p>
         </p:txBody>
       </p:sp>
@@ -12877,6 +12825,7 @@
           <a:p>
             <a:fld id="{D57F1E4F-1CFF-5643-939E-217C01CDF565}" type="slidenum">
               <a:rPr lang="en-US" dirty="0"/>
+              <a:t>‹#›</a:t>
             </a:fld>
             <a:endParaRPr lang="en-US" dirty="0"/>
           </a:p>
@@ -13342,7 +13291,7 @@
           <a:lstStyle/>
           <a:p>
             <a:r>
-              <a:rPr lang="en-US" sz="8000" b="1" dirty="0" smtClean="0"/>
+              <a:rPr lang="en-US" sz="8000" b="1" dirty="0"/>
               <a:t>GROUP PROJECT</a:t>
             </a:r>
             <a:br>
@@ -13350,40 +13299,35 @@
             </a:br>
             <a:r>
               <a:rPr lang="en-US" sz="3200" b="1" dirty="0"/>
-              <a:t>C</a:t>
+              <a:t>Course</a:t>
             </a:r>
             <a:r>
-              <a:rPr lang="en-US" sz="3200" b="1" dirty="0" smtClean="0"/>
-              <a:t>ourse</a:t>
-            </a:r>
-            <a:r>
-              <a:rPr lang="en-US" sz="3200" dirty="0" smtClean="0"/>
+              <a:rPr lang="en-US" sz="3200" dirty="0"/>
               <a:t>: Data Structures &amp; Algorithms</a:t>
             </a:r>
             <a:br>
-              <a:rPr lang="en-US" sz="3200" dirty="0" smtClean="0"/>
+              <a:rPr lang="en-US" sz="3200" dirty="0"/>
             </a:br>
             <a:r>
-              <a:rPr lang="en-US" sz="3200" dirty="0" smtClean="0"/>
+              <a:rPr lang="en-US" sz="3200" dirty="0"/>
               <a:t>				</a:t>
             </a:r>
             <a:r>
-              <a:rPr lang="en-US" sz="3200" dirty="0" err="1" smtClean="0"/>
+              <a:rPr lang="en-US" sz="3200" dirty="0" err="1"/>
               <a:t>Dr</a:t>
             </a:r>
             <a:r>
-              <a:rPr lang="en-US" sz="3200" dirty="0" smtClean="0"/>
+              <a:rPr lang="en-US" sz="3200" dirty="0"/>
               <a:t>: Tran </a:t>
             </a:r>
             <a:r>
-              <a:rPr lang="en-US" sz="3200" dirty="0" err="1" smtClean="0"/>
+              <a:rPr lang="en-US" sz="3200" dirty="0" err="1"/>
               <a:t>Thanh</a:t>
             </a:r>
             <a:r>
-              <a:rPr lang="en-US" sz="3200" dirty="0" smtClean="0"/>
+              <a:rPr lang="en-US" sz="3200" dirty="0"/>
               <a:t> Tung</a:t>
             </a:r>
-            <a:endParaRPr lang="en-US" sz="3200" dirty="0"/>
           </a:p>
         </p:txBody>
       </p:sp>
@@ -13410,7 +13354,7 @@
           <a:lstStyle/>
           <a:p>
             <a:r>
-              <a:rPr lang="en-US" sz="2400" dirty="0" smtClean="0">
+              <a:rPr lang="en-US" sz="2400" dirty="0">
                 <a:solidFill>
                   <a:schemeClr val="bg1">
                     <a:lumMod val="95000"/>
@@ -13419,7 +13363,69 @@
               </a:rPr>
               <a:t>Member:</a:t>
             </a:r>
-            <a:endParaRPr lang="en-US" sz="2400" dirty="0" smtClean="0">
+          </a:p>
+          <a:p>
+            <a:r>
+              <a:rPr lang="en-US" sz="2400" dirty="0">
+                <a:solidFill>
+                  <a:schemeClr val="bg1">
+                    <a:lumMod val="95000"/>
+                  </a:schemeClr>
+                </a:solidFill>
+              </a:rPr>
+              <a:t>	</a:t>
+            </a:r>
+            <a:r>
+              <a:rPr lang="en-US" sz="2400" dirty="0" err="1">
+                <a:solidFill>
+                  <a:schemeClr val="bg1">
+                    <a:lumMod val="95000"/>
+                  </a:schemeClr>
+                </a:solidFill>
+              </a:rPr>
+              <a:t>đặng</a:t>
+            </a:r>
+            <a:r>
+              <a:rPr lang="en-US" sz="2400" dirty="0">
+                <a:solidFill>
+                  <a:schemeClr val="bg1">
+                    <a:lumMod val="95000"/>
+                  </a:schemeClr>
+                </a:solidFill>
+              </a:rPr>
+              <a:t> </a:t>
+            </a:r>
+            <a:r>
+              <a:rPr lang="en-US" sz="2400" dirty="0" err="1">
+                <a:solidFill>
+                  <a:schemeClr val="bg1">
+                    <a:lumMod val="95000"/>
+                  </a:schemeClr>
+                </a:solidFill>
+              </a:rPr>
+              <a:t>quốc</a:t>
+            </a:r>
+            <a:r>
+              <a:rPr lang="en-US" sz="2400" dirty="0">
+                <a:solidFill>
+                  <a:schemeClr val="bg1">
+                    <a:lumMod val="95000"/>
+                  </a:schemeClr>
+                </a:solidFill>
+              </a:rPr>
+              <a:t> </a:t>
+            </a:r>
+            <a:r>
+              <a:rPr lang="en-US" sz="2400" dirty="0" err="1">
+                <a:solidFill>
+                  <a:schemeClr val="bg1">
+                    <a:lumMod val="95000"/>
+                  </a:schemeClr>
+                </a:solidFill>
+              </a:rPr>
+              <a:t>cường</a:t>
+            </a:r>
+            <a:endParaRPr lang="en-US" sz="2400" dirty="0">
               <a:solidFill>
                 <a:schemeClr val="bg1">
                   <a:lumMod val="95000"/>
@@ -13429,7 +13435,7 @@
           </a:p>
           <a:p>
             <a:r>
-              <a:rPr lang="en-US" sz="2400" dirty="0" smtClean="0">
+              <a:rPr lang="en-US" sz="2400" dirty="0">
                 <a:solidFill>
                   <a:schemeClr val="bg1">
                     <a:lumMod val="95000"/>
@@ -13439,17 +13445,17 @@
               <a:t>	</a:t>
             </a:r>
             <a:r>
-              <a:rPr lang="en-US" sz="2400" dirty="0" err="1" smtClean="0">
+              <a:rPr lang="en-US" sz="2400" dirty="0" err="1">
                 <a:solidFill>
                   <a:schemeClr val="bg1">
                     <a:lumMod val="95000"/>
                   </a:schemeClr>
                 </a:solidFill>
               </a:rPr>
-              <a:t>đặng</a:t>
+              <a:t>mai</a:t>
             </a:r>
             <a:r>
-              <a:rPr lang="en-US" sz="2400" dirty="0" smtClean="0">
+              <a:rPr lang="en-US" sz="2400" dirty="0">
                 <a:solidFill>
                   <a:schemeClr val="bg1">
                     <a:lumMod val="95000"/>
@@ -13459,17 +13465,49 @@
               <a:t> </a:t>
             </a:r>
             <a:r>
-              <a:rPr lang="en-US" sz="2400" dirty="0" err="1" smtClean="0">
+              <a:rPr lang="en-US" sz="2400" dirty="0" err="1">
                 <a:solidFill>
                   <a:schemeClr val="bg1">
                     <a:lumMod val="95000"/>
                   </a:schemeClr>
                 </a:solidFill>
               </a:rPr>
-              <a:t>quốc</a:t>
+              <a:t>hoàng</a:t>
             </a:r>
             <a:r>
-              <a:rPr lang="en-US" sz="2400" dirty="0" smtClean="0">
+              <a:rPr lang="en-US" sz="2400" dirty="0">
+                <a:solidFill>
+                  <a:schemeClr val="bg1">
+                    <a:lumMod val="95000"/>
+                  </a:schemeClr>
+                </a:solidFill>
+              </a:rPr>
+              <a:t> long</a:t>
+            </a:r>
+          </a:p>
+          <a:p>
+            <a:r>
+              <a:rPr lang="en-US" sz="2400" dirty="0">
+                <a:solidFill>
+                  <a:schemeClr val="bg1">
+                    <a:lumMod val="95000"/>
+                  </a:schemeClr>
+                </a:solidFill>
+              </a:rPr>
+              <a:t>	</a:t>
+            </a:r>
+            <a:r>
+              <a:rPr lang="en-US" sz="2400" dirty="0" err="1">
+                <a:solidFill>
+                  <a:schemeClr val="bg1">
+                    <a:lumMod val="95000"/>
+                  </a:schemeClr>
+                </a:solidFill>
+              </a:rPr>
+              <a:t>nguyễn</a:t>
+            </a:r>
+            <a:r>
+              <a:rPr lang="en-US" sz="2400" dirty="0">
                 <a:solidFill>
                   <a:schemeClr val="bg1">
                     <a:lumMod val="95000"/>
@@ -13479,16 +13517,16 @@
               <a:t> </a:t>
             </a:r>
             <a:r>
-              <a:rPr lang="en-US" sz="2400" dirty="0" err="1" smtClean="0">
+              <a:rPr lang="en-US" sz="2400" dirty="0" err="1">
                 <a:solidFill>
                   <a:schemeClr val="bg1">
                     <a:lumMod val="95000"/>
                   </a:schemeClr>
                 </a:solidFill>
               </a:rPr>
-              <a:t>cường</a:t>
+              <a:t>lộc</a:t>
             </a:r>
-            <a:endParaRPr lang="en-US" sz="2400" dirty="0" smtClean="0">
+            <a:endParaRPr lang="en-US" sz="2400" dirty="0">
               <a:solidFill>
                 <a:schemeClr val="bg1">
                   <a:lumMod val="95000"/>
@@ -13498,7 +13536,7 @@
           </a:p>
           <a:p>
             <a:r>
-              <a:rPr lang="en-US" sz="2400" dirty="0" smtClean="0">
+              <a:rPr lang="en-US" sz="2400" dirty="0">
                 <a:solidFill>
                   <a:schemeClr val="bg1">
                     <a:lumMod val="95000"/>
@@ -13508,17 +13546,17 @@
               <a:t>	</a:t>
             </a:r>
             <a:r>
-              <a:rPr lang="en-US" sz="2400" dirty="0" err="1" smtClean="0">
+              <a:rPr lang="en-US" sz="2400" dirty="0" err="1">
                 <a:solidFill>
                   <a:schemeClr val="bg1">
                     <a:lumMod val="95000"/>
                   </a:schemeClr>
                 </a:solidFill>
               </a:rPr>
-              <a:t>mai</a:t>
+              <a:t>nguyễn</a:t>
             </a:r>
             <a:r>
-              <a:rPr lang="en-US" sz="2400" dirty="0" smtClean="0">
+              <a:rPr lang="en-US" sz="2400" dirty="0">
                 <a:solidFill>
                   <a:schemeClr val="bg1">
                     <a:lumMod val="95000"/>
@@ -13528,56 +13566,17 @@
               <a:t> </a:t>
             </a:r>
             <a:r>
-              <a:rPr lang="en-US" sz="2400" dirty="0" err="1" smtClean="0">
+              <a:rPr lang="en-US" sz="2400" dirty="0" err="1">
                 <a:solidFill>
                   <a:schemeClr val="bg1">
                     <a:lumMod val="95000"/>
                   </a:schemeClr>
                 </a:solidFill>
               </a:rPr>
-              <a:t>hoàng</a:t>
+              <a:t>tiến</a:t>
             </a:r>
             <a:r>
-              <a:rPr lang="en-US" sz="2400" dirty="0" smtClean="0">
-                <a:solidFill>
-                  <a:schemeClr val="bg1">
-                    <a:lumMod val="95000"/>
-                  </a:schemeClr>
-                </a:solidFill>
-              </a:rPr>
-              <a:t> long</a:t>
-            </a:r>
-            <a:endParaRPr lang="en-US" sz="2400" dirty="0" smtClean="0">
-              <a:solidFill>
-                <a:schemeClr val="bg1">
-                  <a:lumMod val="95000"/>
-                </a:schemeClr>
-              </a:solidFill>
-            </a:endParaRPr>
-          </a:p>
-          <a:p>
-            <a:r>
-              <a:rPr lang="en-US" sz="2400" dirty="0" smtClean="0">
-                <a:solidFill>
-                  <a:schemeClr val="bg1">
-                    <a:lumMod val="95000"/>
-                  </a:schemeClr>
-                </a:solidFill>
-              </a:rPr>
-              <a:t>	</a:t>
-            </a:r>
-            <a:r>
-              <a:rPr lang="en-US" sz="2400" dirty="0" err="1" smtClean="0">
-                <a:solidFill>
-                  <a:schemeClr val="bg1">
-                    <a:lumMod val="95000"/>
-                  </a:schemeClr>
-                </a:solidFill>
-              </a:rPr>
-              <a:t>nguyễn</a:t>
-            </a:r>
-            <a:r>
-              <a:rPr lang="en-US" sz="2400" dirty="0" smtClean="0">
+              <a:rPr lang="en-US" sz="2400" dirty="0">
                 <a:solidFill>
                   <a:schemeClr val="bg1">
                     <a:lumMod val="95000"/>
@@ -13587,76 +13586,7 @@
               <a:t> </a:t>
             </a:r>
             <a:r>
-              <a:rPr lang="en-US" sz="2400" dirty="0" err="1" smtClean="0">
-                <a:solidFill>
-                  <a:schemeClr val="bg1">
-                    <a:lumMod val="95000"/>
-                  </a:schemeClr>
-                </a:solidFill>
-              </a:rPr>
-              <a:t>lộc</a:t>
-            </a:r>
-            <a:endParaRPr lang="en-US" sz="2400" dirty="0" smtClean="0">
-              <a:solidFill>
-                <a:schemeClr val="bg1">
-                  <a:lumMod val="95000"/>
-                </a:schemeClr>
-              </a:solidFill>
-            </a:endParaRPr>
-          </a:p>
-          <a:p>
-            <a:r>
-              <a:rPr lang="en-US" sz="2400" dirty="0" smtClean="0">
-                <a:solidFill>
-                  <a:schemeClr val="bg1">
-                    <a:lumMod val="95000"/>
-                  </a:schemeClr>
-                </a:solidFill>
-              </a:rPr>
-              <a:t>	</a:t>
-            </a:r>
-            <a:r>
-              <a:rPr lang="en-US" sz="2400" dirty="0" err="1" smtClean="0">
-                <a:solidFill>
-                  <a:schemeClr val="bg1">
-                    <a:lumMod val="95000"/>
-                  </a:schemeClr>
-                </a:solidFill>
-              </a:rPr>
-              <a:t>nguyễn</a:t>
-            </a:r>
-            <a:r>
-              <a:rPr lang="en-US" sz="2400" dirty="0" smtClean="0">
-                <a:solidFill>
-                  <a:schemeClr val="bg1">
-                    <a:lumMod val="95000"/>
-                  </a:schemeClr>
-                </a:solidFill>
-              </a:rPr>
-              <a:t> </a:t>
-            </a:r>
-            <a:r>
-              <a:rPr lang="en-US" sz="2400" dirty="0" err="1" smtClean="0">
-                <a:solidFill>
-                  <a:schemeClr val="bg1">
-                    <a:lumMod val="95000"/>
-                  </a:schemeClr>
-                </a:solidFill>
-              </a:rPr>
-              <a:t>tiến</a:t>
-            </a:r>
-            <a:r>
-              <a:rPr lang="en-US" sz="2400" dirty="0" smtClean="0">
-                <a:solidFill>
-                  <a:schemeClr val="bg1">
-                    <a:lumMod val="95000"/>
-                  </a:schemeClr>
-                </a:solidFill>
-              </a:rPr>
-              <a:t> </a:t>
-            </a:r>
-            <a:r>
-              <a:rPr lang="en-US" sz="2400" dirty="0" err="1" smtClean="0">
+              <a:rPr lang="en-US" sz="2400" dirty="0" err="1">
                 <a:solidFill>
                   <a:schemeClr val="bg1">
                     <a:lumMod val="95000"/>
@@ -13665,7 +13595,7 @@
               </a:rPr>
               <a:t>dũng</a:t>
             </a:r>
-            <a:endParaRPr lang="en-US" sz="2400" dirty="0" smtClean="0">
+            <a:endParaRPr lang="en-US" sz="2400" dirty="0">
               <a:solidFill>
                 <a:schemeClr val="bg1">
                   <a:lumMod val="95000"/>
@@ -14224,6 +14154,79 @@
 </p:sld>
 </file>
 
+<file path=ppt/slides/slide10.xml><?xml version="1.0" encoding="utf-8"?>
+<p:sld xmlns:a="http://schemas.openxmlformats.org/drawingml/2006/main" xmlns:r="http://schemas.openxmlformats.org/officeDocument/2006/relationships" xmlns:p="http://schemas.openxmlformats.org/presentationml/2006/main">
+  <p:cSld>
+    <p:spTree>
+      <p:nvGrpSpPr>
+        <p:cNvPr id="1" name=""/>
+        <p:cNvGrpSpPr/>
+        <p:nvPr/>
+      </p:nvGrpSpPr>
+      <p:grpSpPr>
+        <a:xfrm>
+          <a:off x="0" y="0"/>
+          <a:ext cx="0" cy="0"/>
+          <a:chOff x="0" y="0"/>
+          <a:chExt cx="0" cy="0"/>
+        </a:xfrm>
+      </p:grpSpPr>
+      <p:sp>
+        <p:nvSpPr>
+          <p:cNvPr id="2" name="Title 1"/>
+          <p:cNvSpPr>
+            <a:spLocks noGrp="1"/>
+          </p:cNvSpPr>
+          <p:nvPr>
+            <p:ph type="title"/>
+          </p:nvPr>
+        </p:nvSpPr>
+        <p:spPr/>
+        <p:txBody>
+          <a:bodyPr/>
+          <a:lstStyle/>
+          <a:p>
+            <a:endParaRPr lang="en-US"/>
+          </a:p>
+        </p:txBody>
+      </p:sp>
+      <p:pic>
+        <p:nvPicPr>
+          <p:cNvPr id="4" name="Content Placeholder 3"/>
+          <p:cNvPicPr>
+            <a:picLocks noGrp="1" noChangeAspect="1"/>
+          </p:cNvPicPr>
+          <p:nvPr>
+            <p:ph idx="1"/>
+          </p:nvPr>
+        </p:nvPicPr>
+        <p:blipFill>
+          <a:blip r:embed="rId2">
+            <a:extLst>
+              <a:ext uri="{28A0092B-C50C-407E-A947-70E740481C1C}">
+                <a14:useLocalDpi xmlns:a14="http://schemas.microsoft.com/office/drawing/2010/main" val="0"/>
+              </a:ext>
+            </a:extLst>
+          </a:blip>
+          <a:stretch>
+            <a:fillRect/>
+          </a:stretch>
+        </p:blipFill>
+        <p:spPr>
+          <a:xfrm>
+            <a:off x="-9525" y="635"/>
+            <a:ext cx="12195810" cy="6846570"/>
+          </a:xfrm>
+        </p:spPr>
+      </p:pic>
+    </p:spTree>
+  </p:cSld>
+  <p:clrMapOvr>
+    <a:masterClrMapping/>
+  </p:clrMapOvr>
+</p:sld>
+</file>
+
 <file path=ppt/slides/slide2.xml><?xml version="1.0" encoding="utf-8"?>
 <p:sld xmlns:a="http://schemas.openxmlformats.org/drawingml/2006/main" xmlns:r="http://schemas.openxmlformats.org/officeDocument/2006/relationships" xmlns:p="http://schemas.openxmlformats.org/presentationml/2006/main">
   <p:cSld>
@@ -14262,10 +14265,9 @@
           <a:lstStyle/>
           <a:p>
             <a:r>
-              <a:rPr lang="en-US" sz="9600" b="1" dirty="0" smtClean="0"/>
+              <a:rPr lang="en-US" sz="9600" b="1" dirty="0"/>
               <a:t>GAME</a:t>
             </a:r>
-            <a:endParaRPr lang="en-US" sz="9600" b="1" dirty="0"/>
           </a:p>
         </p:txBody>
       </p:sp>
@@ -14280,7 +14282,7 @@
           </p:nvPr>
         </p:nvPicPr>
         <p:blipFill>
-          <a:blip r:embed="rId1">
+          <a:blip r:embed="rId2">
             <a:extLst>
               <a:ext uri="{28A0092B-C50C-407E-A947-70E740481C1C}">
                 <a14:useLocalDpi xmlns:a14="http://schemas.microsoft.com/office/drawing/2010/main" val="0"/>
@@ -14303,13 +14305,13 @@
   <p:clrMapOvr>
     <a:masterClrMapping/>
   </p:clrMapOvr>
-  <mc:AlternateContent xmlns:mc="http://schemas.openxmlformats.org/markup-compatibility/2006">
-    <mc:Choice xmlns:p14="http://schemas.microsoft.com/office/powerpoint/2010/main" Requires="p14">
+  <mc:AlternateContent xmlns:mc="http://schemas.openxmlformats.org/markup-compatibility/2006" xmlns:p14="http://schemas.microsoft.com/office/powerpoint/2010/main">
+    <mc:Choice Requires="p14">
       <p:transition spd="slow" p14:dur="1500">
         <p:split orient="vert"/>
       </p:transition>
     </mc:Choice>
-    <mc:Fallback>
+    <mc:Fallback xmlns="">
       <p:transition spd="slow">
         <p:split orient="vert"/>
       </p:transition>
@@ -14525,10 +14527,9 @@
           <a:lstStyle/>
           <a:p>
             <a:r>
-              <a:rPr lang="en-US" sz="9600" b="1" dirty="0" smtClean="0"/>
+              <a:rPr lang="en-US" sz="9600" b="1" dirty="0"/>
               <a:t>GAME PLAY </a:t>
             </a:r>
-            <a:endParaRPr lang="en-US" sz="9600" b="1" dirty="0"/>
           </a:p>
         </p:txBody>
       </p:sp>
@@ -14558,103 +14559,45 @@
             </a:r>
             <a:r>
               <a:rPr lang="en-US" dirty="0"/>
-              <a:t> is played on a gray 4×4 grid, with numbered tiles that slide smoothly when a player moves them using the four arrow keys</a:t>
+              <a:t> is played on a gray 4×4 grid, with numbered tiles that slide smoothly when a player moves them using the four arrow keys. Every turn, a new tile will randomly appear in an empty spot on the board with a value of either 2 or 4. Tiles slide as far as possible in the chosen direction until they are stopped by either another tile or the edge of the grid. If two tiles of the same number collide while moving, they will merge into a tile with the total value of the two tiles that collided.</a:t>
             </a:r>
             <a:r>
-              <a:rPr lang="en-US" dirty="0" smtClean="0"/>
-              <a:t>.</a:t>
+              <a:rPr lang="en-US" baseline="30000" dirty="0"/>
+              <a:t>[</a:t>
             </a:r>
             <a:r>
               <a:rPr lang="en-US" dirty="0"/>
-              <a:t> Every turn, a new tile will randomly appear in an empty spot on the board with a value of either 2 or 4</a:t>
+              <a:t>The resulting tile cannot merge with another tile again in the same move. Higher-scoring tiles emit a soft glow.</a:t>
+            </a:r>
+            <a:endParaRPr lang="en-US" baseline="30000" dirty="0"/>
+          </a:p>
+          <a:p>
+            <a:r>
+              <a:rPr lang="en-US" dirty="0"/>
+              <a:t> A scoreboard on the upper-right keeps track of the user's score. The user's score starts at zero, and is incremented whenever two tiles combine, by the value of the new </a:t>
             </a:r>
             <a:r>
-              <a:rPr lang="en-US" dirty="0" smtClean="0"/>
-              <a:t>.</a:t>
+              <a:rPr lang="en-US" dirty="0" err="1"/>
+              <a:t>tile.As</a:t>
             </a:r>
             <a:r>
               <a:rPr lang="en-US" dirty="0"/>
-              <a:t> Tiles slide as far as possible in the chosen direction until they are stopped by either another tile or the edge of the grid. If two tiles of the same number collide while moving, they will merge into a tile with the total value of the two tiles that collided</a:t>
+              <a:t> with many arcade games, the user's best score is shown alongside the current score.</a:t>
+            </a:r>
+          </a:p>
+          <a:p>
+            <a:r>
+              <a:rPr lang="en-US" dirty="0"/>
+              <a:t>The game is won when a tile with a value of 2048 appears on the board, hence the name of the game. After reaching the 2048 tile, players can continue to play (beyond the 2048 tile) to reach higher scores.</a:t>
             </a:r>
             <a:r>
-              <a:rPr lang="en-US" dirty="0" smtClean="0"/>
-              <a:t>.</a:t>
-            </a:r>
-            <a:r>
-              <a:rPr lang="en-US" baseline="30000" dirty="0" smtClean="0"/>
+              <a:rPr lang="en-US" baseline="30000" dirty="0"/>
               <a:t>[</a:t>
             </a:r>
             <a:r>
-              <a:rPr lang="en-US" dirty="0" smtClean="0"/>
-              <a:t>The </a:t>
+              <a:rPr lang="en-US" dirty="0"/>
+              <a:t>When the player has no legal moves (there are no empty spaces and no adjacent tiles with the same value), the game ends.</a:t>
             </a:r>
-            <a:r>
-              <a:rPr lang="en-US" dirty="0"/>
-              <a:t>resulting tile cannot merge with another tile again in the same move. Higher-scoring tiles emit a soft glow</a:t>
-            </a:r>
-            <a:r>
-              <a:rPr lang="en-US" dirty="0" smtClean="0"/>
-              <a:t>.</a:t>
-            </a:r>
-            <a:endParaRPr lang="en-US" baseline="30000" dirty="0"/>
-          </a:p>
-          <a:p>
-            <a:r>
-              <a:rPr lang="en-US" dirty="0" smtClean="0"/>
-              <a:t> </a:t>
-            </a:r>
-            <a:r>
-              <a:rPr lang="en-US" dirty="0"/>
-              <a:t>A scoreboard on the upper-right keeps track of the user's score. The user's score starts at zero, and is incremented whenever two tiles combine, by the value of the new </a:t>
-            </a:r>
-            <a:r>
-              <a:rPr lang="en-US" dirty="0" err="1" smtClean="0"/>
-              <a:t>tile.As</a:t>
-            </a:r>
-            <a:r>
-              <a:rPr lang="en-US" dirty="0" smtClean="0"/>
-              <a:t> </a:t>
-            </a:r>
-            <a:r>
-              <a:rPr lang="en-US" dirty="0"/>
-              <a:t>with many arcade games, the user's best score is shown alongside the </a:t>
-            </a:r>
-            <a:r>
-              <a:rPr lang="en-US" dirty="0" smtClean="0"/>
-              <a:t>current </a:t>
-            </a:r>
-            <a:r>
-              <a:rPr lang="en-US" dirty="0"/>
-              <a:t>score</a:t>
-            </a:r>
-            <a:r>
-              <a:rPr lang="en-US" dirty="0" smtClean="0"/>
-              <a:t>.</a:t>
-            </a:r>
-            <a:endParaRPr lang="en-US" dirty="0" smtClean="0"/>
-          </a:p>
-          <a:p>
-            <a:r>
-              <a:rPr lang="en-US" dirty="0"/>
-              <a:t>The game is won when a tile with a value of 2048 appears on the board, hence the name of the game. After reaching the 2048 tile, players can continue to play (beyond the 2048 tile) to reach higher scores</a:t>
-            </a:r>
-            <a:r>
-              <a:rPr lang="en-US" dirty="0" smtClean="0"/>
-              <a:t>.</a:t>
-            </a:r>
-            <a:r>
-              <a:rPr lang="en-US" baseline="30000" dirty="0" smtClean="0"/>
-              <a:t>[</a:t>
-            </a:r>
-            <a:r>
-              <a:rPr lang="en-US" dirty="0" smtClean="0"/>
-              <a:t>When </a:t>
-            </a:r>
-            <a:r>
-              <a:rPr lang="en-US" dirty="0"/>
-              <a:t>the player has no legal moves (there are no empty spaces and no adjacent tiles with the same value), the game ends.</a:t>
-            </a:r>
-            <a:endParaRPr lang="en-US" dirty="0"/>
           </a:p>
         </p:txBody>
       </p:sp>
@@ -15149,10 +15092,9 @@
           <a:lstStyle/>
           <a:p>
             <a:r>
-              <a:rPr lang="en-US" sz="9600" b="1" dirty="0" smtClean="0"/>
+              <a:rPr lang="en-US" sz="9600" b="1" dirty="0"/>
               <a:t>GAME PLAY </a:t>
             </a:r>
-            <a:endParaRPr lang="en-US" sz="9600" b="1" dirty="0"/>
           </a:p>
         </p:txBody>
       </p:sp>
@@ -15167,7 +15109,7 @@
           </p:nvPr>
         </p:nvPicPr>
         <p:blipFill>
-          <a:blip r:embed="rId1"/>
+          <a:blip r:embed="rId2"/>
           <a:stretch>
             <a:fillRect/>
           </a:stretch>
@@ -15188,7 +15130,7 @@
           <p:nvPr/>
         </p:nvPicPr>
         <p:blipFill>
-          <a:blip r:embed="rId2"/>
+          <a:blip r:embed="rId3"/>
           <a:stretch>
             <a:fillRect/>
           </a:stretch>
@@ -15208,13 +15150,13 @@
   <p:clrMapOvr>
     <a:masterClrMapping/>
   </p:clrMapOvr>
-  <mc:AlternateContent xmlns:mc="http://schemas.openxmlformats.org/markup-compatibility/2006">
-    <mc:Choice xmlns:p14="http://schemas.microsoft.com/office/powerpoint/2010/main" Requires="p14">
+  <mc:AlternateContent xmlns:mc="http://schemas.openxmlformats.org/markup-compatibility/2006" xmlns:p14="http://schemas.microsoft.com/office/powerpoint/2010/main">
+    <mc:Choice Requires="p14">
       <p:transition spd="med" p14:dur="700">
         <p:fade/>
       </p:transition>
     </mc:Choice>
-    <mc:Fallback>
+    <mc:Fallback xmlns="">
       <p:transition spd="med">
         <p:fade/>
       </p:transition>
@@ -15420,16 +15362,103 @@
 <file path=ppt/slides/slide5.xml><?xml version="1.0" encoding="utf-8"?>
 <p:sld xmlns:a="http://schemas.openxmlformats.org/drawingml/2006/main" xmlns:r="http://schemas.openxmlformats.org/officeDocument/2006/relationships" xmlns:p="http://schemas.openxmlformats.org/presentationml/2006/main">
   <p:cSld>
+    <p:bg>
+      <p:bgPr>
+        <a:solidFill>
+          <a:schemeClr val="bg1"/>
+        </a:solidFill>
+        <a:effectLst/>
+      </p:bgPr>
+    </p:bg>
     <p:spTree>
       <p:nvGrpSpPr>
         <p:cNvPr id="1" name=""/>
         <p:cNvGrpSpPr/>
         <p:nvPr/>
       </p:nvGrpSpPr>
-      <p:grpSpPr/>
+      <p:grpSpPr>
+        <a:xfrm>
+          <a:off x="0" y="0"/>
+          <a:ext cx="0" cy="0"/>
+          <a:chOff x="0" y="0"/>
+          <a:chExt cx="0" cy="0"/>
+        </a:xfrm>
+      </p:grpSpPr>
       <p:sp>
         <p:nvSpPr>
-          <p:cNvPr id="2" name="Title 1"/>
+          <p:cNvPr id="30" name="Rectangle 29">
+            <a:extLst>
+              <a:ext uri="{FF2B5EF4-FFF2-40B4-BE49-F238E27FC236}">
+                <a16:creationId xmlns:a16="http://schemas.microsoft.com/office/drawing/2014/main" id="{C0B27210-D0CA-4654-B3E3-9ABB4F178EA1}"/>
+              </a:ext>
+              <a:ext uri="{C183D7F6-B498-43B3-948B-1728B52AA6E4}">
+                <adec:decorative xmlns:adec="http://schemas.microsoft.com/office/drawing/2017/decorative" val="1"/>
+              </a:ext>
+            </a:extLst>
+          </p:cNvPr>
+          <p:cNvSpPr>
+            <a:spLocks noGrp="1" noRot="1" noChangeAspect="1" noMove="1" noResize="1" noEditPoints="1" noAdjustHandles="1" noChangeArrowheads="1" noChangeShapeType="1" noTextEdit="1"/>
+          </p:cNvSpPr>
+          <p:nvPr>
+            <p:extLst>
+              <p:ext uri="{386F3935-93C4-4BCD-93E2-E3B085C9AB24}">
+                <p16:designElem xmlns:p16="http://schemas.microsoft.com/office/powerpoint/2015/main" val="1"/>
+              </p:ext>
+            </p:extLst>
+          </p:nvPr>
+        </p:nvSpPr>
+        <p:spPr>
+          <a:xfrm>
+            <a:off x="0" y="0"/>
+            <a:ext cx="12192000" cy="6858000"/>
+          </a:xfrm>
+          <a:prstGeom prst="rect">
+            <a:avLst/>
+          </a:prstGeom>
+          <a:solidFill>
+            <a:schemeClr val="tx1">
+              <a:lumMod val="75000"/>
+              <a:lumOff val="25000"/>
+            </a:schemeClr>
+          </a:solidFill>
+          <a:ln>
+            <a:noFill/>
+          </a:ln>
+        </p:spPr>
+        <p:style>
+          <a:lnRef idx="2">
+            <a:schemeClr val="accent1">
+              <a:shade val="50000"/>
+            </a:schemeClr>
+          </a:lnRef>
+          <a:fillRef idx="1">
+            <a:schemeClr val="accent1"/>
+          </a:fillRef>
+          <a:effectRef idx="0">
+            <a:schemeClr val="accent1"/>
+          </a:effectRef>
+          <a:fontRef idx="minor">
+            <a:schemeClr val="lt1"/>
+          </a:fontRef>
+        </p:style>
+        <p:txBody>
+          <a:bodyPr rtlCol="0" anchor="ctr"/>
+          <a:lstStyle/>
+          <a:p>
+            <a:pPr algn="ctr"/>
+            <a:endParaRPr lang="en-US"/>
+          </a:p>
+        </p:txBody>
+      </p:sp>
+      <p:sp>
+        <p:nvSpPr>
+          <p:cNvPr id="2" name="Title 1">
+            <a:extLst>
+              <a:ext uri="{FF2B5EF4-FFF2-40B4-BE49-F238E27FC236}">
+                <a16:creationId xmlns:a16="http://schemas.microsoft.com/office/drawing/2014/main" id="{7F92CFC2-3020-4BBD-B590-39A11ACFA88C}"/>
+              </a:ext>
+            </a:extLst>
+          </p:cNvPr>
           <p:cNvSpPr>
             <a:spLocks noGrp="1"/>
           </p:cNvSpPr>
@@ -15439,37 +15468,390 @@
         </p:nvSpPr>
         <p:spPr>
           <a:xfrm>
-            <a:off x="3426984" y="2563708"/>
-            <a:ext cx="8761413" cy="706964"/>
+            <a:off x="6746628" y="1783959"/>
+            <a:ext cx="4645250" cy="2889114"/>
           </a:xfrm>
         </p:spPr>
         <p:txBody>
-          <a:bodyPr/>
-          <a:p>
-            <a:endParaRPr lang="en-US"/>
+          <a:bodyPr vert="horz" lIns="91440" tIns="45720" rIns="91440" bIns="45720" rtlCol="0" anchor="b">
+            <a:normAutofit/>
+          </a:bodyPr>
+          <a:lstStyle/>
+          <a:p>
+            <a:pPr defTabSz="914400">
+              <a:lnSpc>
+                <a:spcPct val="90000"/>
+              </a:lnSpc>
+            </a:pPr>
+            <a:r>
+              <a:rPr lang="en-US" sz="6000" kern="1200">
+                <a:solidFill>
+                  <a:schemeClr val="bg1"/>
+                </a:solidFill>
+                <a:latin typeface="+mj-lt"/>
+                <a:ea typeface="+mj-ea"/>
+                <a:cs typeface="+mj-cs"/>
+              </a:rPr>
+              <a:t>Language</a:t>
+            </a:r>
+          </a:p>
+        </p:txBody>
+      </p:sp>
+      <p:sp>
+        <p:nvSpPr>
+          <p:cNvPr id="32" name="Freeform: Shape 31">
+            <a:extLst>
+              <a:ext uri="{FF2B5EF4-FFF2-40B4-BE49-F238E27FC236}">
+                <a16:creationId xmlns:a16="http://schemas.microsoft.com/office/drawing/2014/main" id="{1DB7C82F-AB7E-4F0C-B829-FA1B9C415180}"/>
+              </a:ext>
+              <a:ext uri="{C183D7F6-B498-43B3-948B-1728B52AA6E4}">
+                <adec:decorative xmlns:adec="http://schemas.microsoft.com/office/drawing/2017/decorative" val="1"/>
+              </a:ext>
+            </a:extLst>
+          </p:cNvPr>
+          <p:cNvSpPr>
+            <a:spLocks noGrp="1" noRot="1" noChangeAspect="1" noMove="1" noResize="1" noEditPoints="1" noAdjustHandles="1" noChangeArrowheads="1" noChangeShapeType="1" noTextEdit="1"/>
+          </p:cNvSpPr>
+          <p:nvPr>
+            <p:extLst>
+              <p:ext uri="{386F3935-93C4-4BCD-93E2-E3B085C9AB24}">
+                <p16:designElem xmlns:p16="http://schemas.microsoft.com/office/powerpoint/2015/main" val="1"/>
+              </p:ext>
+            </p:extLst>
+          </p:nvPr>
+        </p:nvSpPr>
+        <p:spPr>
+          <a:xfrm flipH="1">
+            <a:off x="0" y="0"/>
+            <a:ext cx="6172782" cy="6858000"/>
+          </a:xfrm>
+          <a:custGeom>
+            <a:avLst/>
+            <a:gdLst>
+              <a:gd name="connsiteX0" fmla="*/ 6172782 w 6172782"/>
+              <a:gd name="connsiteY0" fmla="*/ 0 h 6858000"/>
+              <a:gd name="connsiteX1" fmla="*/ 69075 w 6172782"/>
+              <a:gd name="connsiteY1" fmla="*/ 0 h 6858000"/>
+              <a:gd name="connsiteX2" fmla="*/ 35131 w 6172782"/>
+              <a:gd name="connsiteY2" fmla="*/ 267128 h 6858000"/>
+              <a:gd name="connsiteX3" fmla="*/ 0 w 6172782"/>
+              <a:gd name="connsiteY3" fmla="*/ 962845 h 6858000"/>
+              <a:gd name="connsiteX4" fmla="*/ 3276103 w 6172782"/>
+              <a:gd name="connsiteY4" fmla="*/ 6782205 h 6858000"/>
+              <a:gd name="connsiteX5" fmla="*/ 3407923 w 6172782"/>
+              <a:gd name="connsiteY5" fmla="*/ 6858000 h 6858000"/>
+              <a:gd name="connsiteX6" fmla="*/ 6172782 w 6172782"/>
+              <a:gd name="connsiteY6" fmla="*/ 6858000 h 6858000"/>
+            </a:gdLst>
+            <a:ahLst/>
+            <a:cxnLst>
+              <a:cxn ang="0">
+                <a:pos x="connsiteX0" y="connsiteY0"/>
+              </a:cxn>
+              <a:cxn ang="0">
+                <a:pos x="connsiteX1" y="connsiteY1"/>
+              </a:cxn>
+              <a:cxn ang="0">
+                <a:pos x="connsiteX2" y="connsiteY2"/>
+              </a:cxn>
+              <a:cxn ang="0">
+                <a:pos x="connsiteX3" y="connsiteY3"/>
+              </a:cxn>
+              <a:cxn ang="0">
+                <a:pos x="connsiteX4" y="connsiteY4"/>
+              </a:cxn>
+              <a:cxn ang="0">
+                <a:pos x="connsiteX5" y="connsiteY5"/>
+              </a:cxn>
+              <a:cxn ang="0">
+                <a:pos x="connsiteX6" y="connsiteY6"/>
+              </a:cxn>
+            </a:cxnLst>
+            <a:rect l="l" t="t" r="r" b="b"/>
+            <a:pathLst>
+              <a:path w="6172782" h="6858000">
+                <a:moveTo>
+                  <a:pt x="6172782" y="0"/>
+                </a:moveTo>
+                <a:lnTo>
+                  <a:pt x="69075" y="0"/>
+                </a:lnTo>
+                <a:lnTo>
+                  <a:pt x="35131" y="267128"/>
+                </a:lnTo>
+                <a:cubicBezTo>
+                  <a:pt x="11901" y="495874"/>
+                  <a:pt x="0" y="727970"/>
+                  <a:pt x="0" y="962845"/>
+                </a:cubicBezTo>
+                <a:cubicBezTo>
+                  <a:pt x="0" y="3429034"/>
+                  <a:pt x="1312002" y="5588789"/>
+                  <a:pt x="3276103" y="6782205"/>
+                </a:cubicBezTo>
+                <a:lnTo>
+                  <a:pt x="3407923" y="6858000"/>
+                </a:lnTo>
+                <a:lnTo>
+                  <a:pt x="6172782" y="6858000"/>
+                </a:lnTo>
+                <a:close/>
+              </a:path>
+            </a:pathLst>
+          </a:custGeom>
+          <a:solidFill>
+            <a:schemeClr val="bg1">
+              <a:alpha val="80000"/>
+            </a:schemeClr>
+          </a:solidFill>
+          <a:ln>
+            <a:noFill/>
+          </a:ln>
+        </p:spPr>
+        <p:style>
+          <a:lnRef idx="2">
+            <a:schemeClr val="accent1">
+              <a:shade val="50000"/>
+            </a:schemeClr>
+          </a:lnRef>
+          <a:fillRef idx="1">
+            <a:schemeClr val="accent1"/>
+          </a:fillRef>
+          <a:effectRef idx="0">
+            <a:schemeClr val="accent1"/>
+          </a:effectRef>
+          <a:fontRef idx="minor">
+            <a:schemeClr val="lt1"/>
+          </a:fontRef>
+        </p:style>
+        <p:txBody>
+          <a:bodyPr wrap="square" rtlCol="0" anchor="ctr">
+            <a:noAutofit/>
+          </a:bodyPr>
+          <a:lstStyle/>
+          <a:p>
+            <a:pPr marL="0" marR="0" lvl="0" indent="0" algn="ctr" defTabSz="914400" rtl="0" eaLnBrk="1" fontAlgn="auto" latinLnBrk="0" hangingPunct="1">
+              <a:lnSpc>
+                <a:spcPct val="100000"/>
+              </a:lnSpc>
+              <a:spcBef>
+                <a:spcPts val="0"/>
+              </a:spcBef>
+              <a:spcAft>
+                <a:spcPts val="0"/>
+              </a:spcAft>
+              <a:buClrTx/>
+              <a:buSzTx/>
+              <a:buFontTx/>
+              <a:buNone/>
+              <a:tabLst/>
+              <a:defRPr/>
+            </a:pPr>
+            <a:endParaRPr kumimoji="0" lang="en-US" sz="1800" b="0" i="0" u="none" strike="noStrike" kern="1200" cap="none" spc="0" normalizeH="0" baseline="0" noProof="0">
+              <a:ln>
+                <a:noFill/>
+              </a:ln>
+              <a:solidFill>
+                <a:prstClr val="white"/>
+              </a:solidFill>
+              <a:effectLst/>
+              <a:uLnTx/>
+              <a:uFillTx/>
+              <a:latin typeface="Calibri" panose="020F0502020204030204"/>
+              <a:ea typeface="+mn-ea"/>
+              <a:cs typeface="+mn-cs"/>
+            </a:endParaRPr>
+          </a:p>
+        </p:txBody>
+      </p:sp>
+      <p:sp>
+        <p:nvSpPr>
+          <p:cNvPr id="34" name="Freeform: Shape 33">
+            <a:extLst>
+              <a:ext uri="{FF2B5EF4-FFF2-40B4-BE49-F238E27FC236}">
+                <a16:creationId xmlns:a16="http://schemas.microsoft.com/office/drawing/2014/main" id="{70B66945-4967-4040-926D-DCA44313CDAB}"/>
+              </a:ext>
+              <a:ext uri="{C183D7F6-B498-43B3-948B-1728B52AA6E4}">
+                <adec:decorative xmlns:adec="http://schemas.microsoft.com/office/drawing/2017/decorative" val="1"/>
+              </a:ext>
+            </a:extLst>
+          </p:cNvPr>
+          <p:cNvSpPr>
+            <a:spLocks noGrp="1" noRot="1" noChangeAspect="1" noMove="1" noResize="1" noEditPoints="1" noAdjustHandles="1" noChangeArrowheads="1" noChangeShapeType="1" noTextEdit="1"/>
+          </p:cNvSpPr>
+          <p:nvPr>
+            <p:extLst>
+              <p:ext uri="{386F3935-93C4-4BCD-93E2-E3B085C9AB24}">
+                <p16:designElem xmlns:p16="http://schemas.microsoft.com/office/powerpoint/2015/main" val="1"/>
+              </p:ext>
+            </p:extLst>
+          </p:nvPr>
+        </p:nvSpPr>
+        <p:spPr>
+          <a:xfrm>
+            <a:off x="0" y="0"/>
+            <a:ext cx="6024154" cy="6858000"/>
+          </a:xfrm>
+          <a:custGeom>
+            <a:avLst/>
+            <a:gdLst>
+              <a:gd name="connsiteX0" fmla="*/ 0 w 6024154"/>
+              <a:gd name="connsiteY0" fmla="*/ 0 h 6858000"/>
+              <a:gd name="connsiteX1" fmla="*/ 5953780 w 6024154"/>
+              <a:gd name="connsiteY1" fmla="*/ 0 h 6858000"/>
+              <a:gd name="connsiteX2" fmla="*/ 5989880 w 6024154"/>
+              <a:gd name="connsiteY2" fmla="*/ 284091 h 6858000"/>
+              <a:gd name="connsiteX3" fmla="*/ 6024154 w 6024154"/>
+              <a:gd name="connsiteY3" fmla="*/ 962844 h 6858000"/>
+              <a:gd name="connsiteX4" fmla="*/ 2549934 w 6024154"/>
+              <a:gd name="connsiteY4" fmla="*/ 6800152 h 6858000"/>
+              <a:gd name="connsiteX5" fmla="*/ 2436987 w 6024154"/>
+              <a:gd name="connsiteY5" fmla="*/ 6858000 h 6858000"/>
+              <a:gd name="connsiteX6" fmla="*/ 0 w 6024154"/>
+              <a:gd name="connsiteY6" fmla="*/ 6858000 h 6858000"/>
+            </a:gdLst>
+            <a:ahLst/>
+            <a:cxnLst>
+              <a:cxn ang="0">
+                <a:pos x="connsiteX0" y="connsiteY0"/>
+              </a:cxn>
+              <a:cxn ang="0">
+                <a:pos x="connsiteX1" y="connsiteY1"/>
+              </a:cxn>
+              <a:cxn ang="0">
+                <a:pos x="connsiteX2" y="connsiteY2"/>
+              </a:cxn>
+              <a:cxn ang="0">
+                <a:pos x="connsiteX3" y="connsiteY3"/>
+              </a:cxn>
+              <a:cxn ang="0">
+                <a:pos x="connsiteX4" y="connsiteY4"/>
+              </a:cxn>
+              <a:cxn ang="0">
+                <a:pos x="connsiteX5" y="connsiteY5"/>
+              </a:cxn>
+              <a:cxn ang="0">
+                <a:pos x="connsiteX6" y="connsiteY6"/>
+              </a:cxn>
+            </a:cxnLst>
+            <a:rect l="l" t="t" r="r" b="b"/>
+            <a:pathLst>
+              <a:path w="6024154" h="6858000">
+                <a:moveTo>
+                  <a:pt x="0" y="0"/>
+                </a:moveTo>
+                <a:lnTo>
+                  <a:pt x="5953780" y="0"/>
+                </a:lnTo>
+                <a:lnTo>
+                  <a:pt x="5989880" y="284091"/>
+                </a:lnTo>
+                <a:cubicBezTo>
+                  <a:pt x="6012544" y="507260"/>
+                  <a:pt x="6024154" y="733696"/>
+                  <a:pt x="6024154" y="962844"/>
+                </a:cubicBezTo>
+                <a:cubicBezTo>
+                  <a:pt x="6024154" y="3483472"/>
+                  <a:pt x="4619336" y="5675986"/>
+                  <a:pt x="2549934" y="6800152"/>
+                </a:cubicBezTo>
+                <a:lnTo>
+                  <a:pt x="2436987" y="6858000"/>
+                </a:lnTo>
+                <a:lnTo>
+                  <a:pt x="0" y="6858000"/>
+                </a:lnTo>
+                <a:close/>
+              </a:path>
+            </a:pathLst>
+          </a:custGeom>
+          <a:solidFill>
+            <a:schemeClr val="bg1"/>
+          </a:solidFill>
+          <a:ln>
+            <a:noFill/>
+          </a:ln>
+        </p:spPr>
+        <p:style>
+          <a:lnRef idx="2">
+            <a:schemeClr val="accent1">
+              <a:shade val="50000"/>
+            </a:schemeClr>
+          </a:lnRef>
+          <a:fillRef idx="1">
+            <a:schemeClr val="accent1"/>
+          </a:fillRef>
+          <a:effectRef idx="0">
+            <a:schemeClr val="accent1"/>
+          </a:effectRef>
+          <a:fontRef idx="minor">
+            <a:schemeClr val="lt1"/>
+          </a:fontRef>
+        </p:style>
+        <p:txBody>
+          <a:bodyPr wrap="square" rtlCol="0" anchor="ctr">
+            <a:noAutofit/>
+          </a:bodyPr>
+          <a:lstStyle/>
+          <a:p>
+            <a:pPr marL="0" marR="0" lvl="0" indent="0" algn="ctr" defTabSz="914400" rtl="0" eaLnBrk="1" fontAlgn="auto" latinLnBrk="0" hangingPunct="1">
+              <a:lnSpc>
+                <a:spcPct val="100000"/>
+              </a:lnSpc>
+              <a:spcBef>
+                <a:spcPts val="0"/>
+              </a:spcBef>
+              <a:spcAft>
+                <a:spcPts val="0"/>
+              </a:spcAft>
+              <a:buClrTx/>
+              <a:buSzTx/>
+              <a:buFontTx/>
+              <a:buNone/>
+              <a:tabLst/>
+              <a:defRPr/>
+            </a:pPr>
+            <a:endParaRPr kumimoji="0" lang="en-US" sz="1800" b="0" i="0" u="none" strike="noStrike" kern="1200" cap="none" spc="0" normalizeH="0" baseline="0" noProof="0">
+              <a:ln>
+                <a:noFill/>
+              </a:ln>
+              <a:solidFill>
+                <a:prstClr val="white"/>
+              </a:solidFill>
+              <a:effectLst/>
+              <a:uLnTx/>
+              <a:uFillTx/>
+              <a:latin typeface="Calibri" panose="020F0502020204030204"/>
+              <a:ea typeface="+mn-ea"/>
+              <a:cs typeface="+mn-cs"/>
+            </a:endParaRPr>
           </a:p>
         </p:txBody>
       </p:sp>
       <p:pic>
         <p:nvPicPr>
-          <p:cNvPr id="4" name="Content Placeholder 3" descr="Untitled"/>
+          <p:cNvPr id="5" name="Picture 4">
+            <a:extLst>
+              <a:ext uri="{FF2B5EF4-FFF2-40B4-BE49-F238E27FC236}">
+                <a16:creationId xmlns:a16="http://schemas.microsoft.com/office/drawing/2014/main" id="{C806A070-B2B0-4BBD-A94A-FEF48701CA94}"/>
+              </a:ext>
+            </a:extLst>
+          </p:cNvPr>
           <p:cNvPicPr>
             <a:picLocks noChangeAspect="1"/>
           </p:cNvPicPr>
-          <p:nvPr>
-            <p:ph idx="1"/>
-          </p:nvPr>
+          <p:nvPr/>
         </p:nvPicPr>
-        <p:blipFill>
-          <a:blip r:embed="rId1"/>
-          <a:stretch>
-            <a:fillRect/>
-          </a:stretch>
+        <p:blipFill rotWithShape="1">
+          <a:blip r:embed="rId2"/>
+          <a:srcRect l="3485" r="8493" b="-1"/>
+          <a:stretch/>
         </p:blipFill>
         <p:spPr>
           <a:xfrm>
-            <a:off x="1684655" y="2324735"/>
-            <a:ext cx="7751445" cy="4503420"/>
+            <a:off x="542127" y="489204"/>
+            <a:ext cx="4276616" cy="4511421"/>
           </a:xfrm>
           <a:prstGeom prst="rect">
             <a:avLst/>
@@ -15477,6 +15859,617 @@
         </p:spPr>
       </p:pic>
     </p:spTree>
+    <p:extLst>
+      <p:ext uri="{BB962C8B-B14F-4D97-AF65-F5344CB8AC3E}">
+        <p14:creationId xmlns:p14="http://schemas.microsoft.com/office/powerpoint/2010/main" val="239771740"/>
+      </p:ext>
+    </p:extLst>
+  </p:cSld>
+  <p:clrMapOvr>
+    <a:overrideClrMapping bg1="lt1" tx1="dk1" bg2="lt2" tx2="dk2" accent1="accent1" accent2="accent2" accent3="accent3" accent4="accent4" accent5="accent5" accent6="accent6" hlink="hlink" folHlink="folHlink"/>
+  </p:clrMapOvr>
+</p:sld>
+</file>
+
+<file path=ppt/slides/slide6.xml><?xml version="1.0" encoding="utf-8"?>
+<p:sld xmlns:a="http://schemas.openxmlformats.org/drawingml/2006/main" xmlns:r="http://schemas.openxmlformats.org/officeDocument/2006/relationships" xmlns:p="http://schemas.openxmlformats.org/presentationml/2006/main">
+  <p:cSld>
+    <p:bg>
+      <p:bgPr>
+        <a:solidFill>
+          <a:schemeClr val="bg1">
+            <a:tint val="95000"/>
+            <a:satMod val="170000"/>
+          </a:schemeClr>
+        </a:solidFill>
+        <a:effectLst/>
+      </p:bgPr>
+    </p:bg>
+    <p:spTree>
+      <p:nvGrpSpPr>
+        <p:cNvPr id="1" name=""/>
+        <p:cNvGrpSpPr/>
+        <p:nvPr/>
+      </p:nvGrpSpPr>
+      <p:grpSpPr>
+        <a:xfrm>
+          <a:off x="0" y="0"/>
+          <a:ext cx="0" cy="0"/>
+          <a:chOff x="0" y="0"/>
+          <a:chExt cx="0" cy="0"/>
+        </a:xfrm>
+      </p:grpSpPr>
+      <p:sp>
+        <p:nvSpPr>
+          <p:cNvPr id="2" name="Title 1">
+            <a:extLst>
+              <a:ext uri="{FF2B5EF4-FFF2-40B4-BE49-F238E27FC236}">
+                <a16:creationId xmlns:a16="http://schemas.microsoft.com/office/drawing/2014/main" id="{E9F408BA-D0D1-4EAC-A3B8-088217B1230C}"/>
+              </a:ext>
+            </a:extLst>
+          </p:cNvPr>
+          <p:cNvSpPr>
+            <a:spLocks noGrp="1"/>
+          </p:cNvSpPr>
+          <p:nvPr>
+            <p:ph type="title"/>
+          </p:nvPr>
+        </p:nvSpPr>
+        <p:spPr>
+          <a:xfrm>
+            <a:off x="6746628" y="1783959"/>
+            <a:ext cx="4645250" cy="2889114"/>
+          </a:xfrm>
+        </p:spPr>
+        <p:txBody>
+          <a:bodyPr vert="horz" lIns="91440" tIns="45720" rIns="91440" bIns="45720" rtlCol="0" anchor="b">
+            <a:normAutofit/>
+          </a:bodyPr>
+          <a:lstStyle/>
+          <a:p>
+            <a:pPr defTabSz="914400">
+              <a:lnSpc>
+                <a:spcPct val="90000"/>
+              </a:lnSpc>
+            </a:pPr>
+            <a:r>
+              <a:rPr lang="en-US" sz="6000">
+                <a:solidFill>
+                  <a:schemeClr val="tx1"/>
+                </a:solidFill>
+              </a:rPr>
+              <a:t>Engine</a:t>
+            </a:r>
+          </a:p>
+        </p:txBody>
+      </p:sp>
+      <p:sp>
+        <p:nvSpPr>
+          <p:cNvPr id="10" name="Freeform: Shape 9">
+            <a:extLst>
+              <a:ext uri="{FF2B5EF4-FFF2-40B4-BE49-F238E27FC236}">
+                <a16:creationId xmlns:a16="http://schemas.microsoft.com/office/drawing/2014/main" id="{1DB7C82F-AB7E-4F0C-B829-FA1B9C415180}"/>
+              </a:ext>
+              <a:ext uri="{C183D7F6-B498-43B3-948B-1728B52AA6E4}">
+                <adec:decorative xmlns:adec="http://schemas.microsoft.com/office/drawing/2017/decorative" val="1"/>
+              </a:ext>
+            </a:extLst>
+          </p:cNvPr>
+          <p:cNvSpPr>
+            <a:spLocks noGrp="1" noRot="1" noChangeAspect="1" noMove="1" noResize="1" noEditPoints="1" noAdjustHandles="1" noChangeArrowheads="1" noChangeShapeType="1" noTextEdit="1"/>
+          </p:cNvSpPr>
+          <p:nvPr>
+            <p:extLst>
+              <p:ext uri="{386F3935-93C4-4BCD-93E2-E3B085C9AB24}">
+                <p16:designElem xmlns:p16="http://schemas.microsoft.com/office/powerpoint/2015/main" val="1"/>
+              </p:ext>
+            </p:extLst>
+          </p:nvPr>
+        </p:nvSpPr>
+        <p:spPr>
+          <a:xfrm flipH="1">
+            <a:off x="0" y="0"/>
+            <a:ext cx="6172782" cy="6858000"/>
+          </a:xfrm>
+          <a:custGeom>
+            <a:avLst/>
+            <a:gdLst>
+              <a:gd name="connsiteX0" fmla="*/ 6172782 w 6172782"/>
+              <a:gd name="connsiteY0" fmla="*/ 0 h 6858000"/>
+              <a:gd name="connsiteX1" fmla="*/ 69075 w 6172782"/>
+              <a:gd name="connsiteY1" fmla="*/ 0 h 6858000"/>
+              <a:gd name="connsiteX2" fmla="*/ 35131 w 6172782"/>
+              <a:gd name="connsiteY2" fmla="*/ 267128 h 6858000"/>
+              <a:gd name="connsiteX3" fmla="*/ 0 w 6172782"/>
+              <a:gd name="connsiteY3" fmla="*/ 962845 h 6858000"/>
+              <a:gd name="connsiteX4" fmla="*/ 3276103 w 6172782"/>
+              <a:gd name="connsiteY4" fmla="*/ 6782205 h 6858000"/>
+              <a:gd name="connsiteX5" fmla="*/ 3407923 w 6172782"/>
+              <a:gd name="connsiteY5" fmla="*/ 6858000 h 6858000"/>
+              <a:gd name="connsiteX6" fmla="*/ 6172782 w 6172782"/>
+              <a:gd name="connsiteY6" fmla="*/ 6858000 h 6858000"/>
+            </a:gdLst>
+            <a:ahLst/>
+            <a:cxnLst>
+              <a:cxn ang="0">
+                <a:pos x="connsiteX0" y="connsiteY0"/>
+              </a:cxn>
+              <a:cxn ang="0">
+                <a:pos x="connsiteX1" y="connsiteY1"/>
+              </a:cxn>
+              <a:cxn ang="0">
+                <a:pos x="connsiteX2" y="connsiteY2"/>
+              </a:cxn>
+              <a:cxn ang="0">
+                <a:pos x="connsiteX3" y="connsiteY3"/>
+              </a:cxn>
+              <a:cxn ang="0">
+                <a:pos x="connsiteX4" y="connsiteY4"/>
+              </a:cxn>
+              <a:cxn ang="0">
+                <a:pos x="connsiteX5" y="connsiteY5"/>
+              </a:cxn>
+              <a:cxn ang="0">
+                <a:pos x="connsiteX6" y="connsiteY6"/>
+              </a:cxn>
+            </a:cxnLst>
+            <a:rect l="l" t="t" r="r" b="b"/>
+            <a:pathLst>
+              <a:path w="6172782" h="6858000">
+                <a:moveTo>
+                  <a:pt x="6172782" y="0"/>
+                </a:moveTo>
+                <a:lnTo>
+                  <a:pt x="69075" y="0"/>
+                </a:lnTo>
+                <a:lnTo>
+                  <a:pt x="35131" y="267128"/>
+                </a:lnTo>
+                <a:cubicBezTo>
+                  <a:pt x="11901" y="495874"/>
+                  <a:pt x="0" y="727970"/>
+                  <a:pt x="0" y="962845"/>
+                </a:cubicBezTo>
+                <a:cubicBezTo>
+                  <a:pt x="0" y="3429034"/>
+                  <a:pt x="1312002" y="5588789"/>
+                  <a:pt x="3276103" y="6782205"/>
+                </a:cubicBezTo>
+                <a:lnTo>
+                  <a:pt x="3407923" y="6858000"/>
+                </a:lnTo>
+                <a:lnTo>
+                  <a:pt x="6172782" y="6858000"/>
+                </a:lnTo>
+                <a:close/>
+              </a:path>
+            </a:pathLst>
+          </a:custGeom>
+          <a:solidFill>
+            <a:srgbClr val="FFFFFF">
+              <a:alpha val="80000"/>
+            </a:srgbClr>
+          </a:solidFill>
+          <a:ln>
+            <a:noFill/>
+          </a:ln>
+        </p:spPr>
+        <p:style>
+          <a:lnRef idx="2">
+            <a:schemeClr val="accent1">
+              <a:shade val="50000"/>
+            </a:schemeClr>
+          </a:lnRef>
+          <a:fillRef idx="1">
+            <a:schemeClr val="accent1"/>
+          </a:fillRef>
+          <a:effectRef idx="0">
+            <a:schemeClr val="accent1"/>
+          </a:effectRef>
+          <a:fontRef idx="minor">
+            <a:schemeClr val="lt1"/>
+          </a:fontRef>
+        </p:style>
+        <p:txBody>
+          <a:bodyPr wrap="square" rtlCol="0" anchor="ctr">
+            <a:noAutofit/>
+          </a:bodyPr>
+          <a:lstStyle/>
+          <a:p>
+            <a:pPr marL="0" marR="0" lvl="0" indent="0" algn="ctr" defTabSz="914400" rtl="0" eaLnBrk="1" fontAlgn="auto" latinLnBrk="0" hangingPunct="1">
+              <a:lnSpc>
+                <a:spcPct val="100000"/>
+              </a:lnSpc>
+              <a:spcBef>
+                <a:spcPts val="0"/>
+              </a:spcBef>
+              <a:spcAft>
+                <a:spcPts val="0"/>
+              </a:spcAft>
+              <a:buClrTx/>
+              <a:buSzTx/>
+              <a:buFontTx/>
+              <a:buNone/>
+              <a:tabLst/>
+              <a:defRPr/>
+            </a:pPr>
+            <a:endParaRPr kumimoji="0" lang="en-US" sz="1800" b="0" i="0" u="none" strike="noStrike" kern="1200" cap="none" spc="0" normalizeH="0" baseline="0" noProof="0">
+              <a:ln>
+                <a:noFill/>
+              </a:ln>
+              <a:solidFill>
+                <a:prstClr val="white"/>
+              </a:solidFill>
+              <a:effectLst/>
+              <a:uLnTx/>
+              <a:uFillTx/>
+              <a:latin typeface="Calibri" panose="020F0502020204030204"/>
+              <a:ea typeface="+mn-ea"/>
+              <a:cs typeface="+mn-cs"/>
+            </a:endParaRPr>
+          </a:p>
+        </p:txBody>
+      </p:sp>
+      <p:pic>
+        <p:nvPicPr>
+          <p:cNvPr id="5" name="Content Placeholder 4">
+            <a:extLst>
+              <a:ext uri="{FF2B5EF4-FFF2-40B4-BE49-F238E27FC236}">
+                <a16:creationId xmlns:a16="http://schemas.microsoft.com/office/drawing/2014/main" id="{A2E89130-BFE5-418D-B17B-3A534EA75332}"/>
+              </a:ext>
+            </a:extLst>
+          </p:cNvPr>
+          <p:cNvPicPr>
+            <a:picLocks noGrp="1" noChangeAspect="1"/>
+          </p:cNvPicPr>
+          <p:nvPr>
+            <p:ph idx="1"/>
+          </p:nvPr>
+        </p:nvPicPr>
+        <p:blipFill rotWithShape="1">
+          <a:blip r:embed="rId2"/>
+          <a:srcRect l="33749" r="16840"/>
+          <a:stretch/>
+        </p:blipFill>
+        <p:spPr>
+          <a:xfrm>
+            <a:off x="20" y="10"/>
+            <a:ext cx="6024134" cy="6857990"/>
+          </a:xfrm>
+          <a:custGeom>
+            <a:avLst/>
+            <a:gdLst>
+              <a:gd name="connsiteX0" fmla="*/ 0 w 6024154"/>
+              <a:gd name="connsiteY0" fmla="*/ 0 h 6858000"/>
+              <a:gd name="connsiteX1" fmla="*/ 5953780 w 6024154"/>
+              <a:gd name="connsiteY1" fmla="*/ 0 h 6858000"/>
+              <a:gd name="connsiteX2" fmla="*/ 5989880 w 6024154"/>
+              <a:gd name="connsiteY2" fmla="*/ 284091 h 6858000"/>
+              <a:gd name="connsiteX3" fmla="*/ 6024154 w 6024154"/>
+              <a:gd name="connsiteY3" fmla="*/ 962844 h 6858000"/>
+              <a:gd name="connsiteX4" fmla="*/ 2549934 w 6024154"/>
+              <a:gd name="connsiteY4" fmla="*/ 6800152 h 6858000"/>
+              <a:gd name="connsiteX5" fmla="*/ 2436987 w 6024154"/>
+              <a:gd name="connsiteY5" fmla="*/ 6858000 h 6858000"/>
+              <a:gd name="connsiteX6" fmla="*/ 0 w 6024154"/>
+              <a:gd name="connsiteY6" fmla="*/ 6858000 h 6858000"/>
+            </a:gdLst>
+            <a:ahLst/>
+            <a:cxnLst>
+              <a:cxn ang="0">
+                <a:pos x="connsiteX0" y="connsiteY0"/>
+              </a:cxn>
+              <a:cxn ang="0">
+                <a:pos x="connsiteX1" y="connsiteY1"/>
+              </a:cxn>
+              <a:cxn ang="0">
+                <a:pos x="connsiteX2" y="connsiteY2"/>
+              </a:cxn>
+              <a:cxn ang="0">
+                <a:pos x="connsiteX3" y="connsiteY3"/>
+              </a:cxn>
+              <a:cxn ang="0">
+                <a:pos x="connsiteX4" y="connsiteY4"/>
+              </a:cxn>
+              <a:cxn ang="0">
+                <a:pos x="connsiteX5" y="connsiteY5"/>
+              </a:cxn>
+              <a:cxn ang="0">
+                <a:pos x="connsiteX6" y="connsiteY6"/>
+              </a:cxn>
+            </a:cxnLst>
+            <a:rect l="l" t="t" r="r" b="b"/>
+            <a:pathLst>
+              <a:path w="6024154" h="6858000">
+                <a:moveTo>
+                  <a:pt x="0" y="0"/>
+                </a:moveTo>
+                <a:lnTo>
+                  <a:pt x="5953780" y="0"/>
+                </a:lnTo>
+                <a:lnTo>
+                  <a:pt x="5989880" y="284091"/>
+                </a:lnTo>
+                <a:cubicBezTo>
+                  <a:pt x="6012544" y="507260"/>
+                  <a:pt x="6024154" y="733696"/>
+                  <a:pt x="6024154" y="962844"/>
+                </a:cubicBezTo>
+                <a:cubicBezTo>
+                  <a:pt x="6024154" y="3483472"/>
+                  <a:pt x="4619336" y="5675986"/>
+                  <a:pt x="2549934" y="6800152"/>
+                </a:cubicBezTo>
+                <a:lnTo>
+                  <a:pt x="2436987" y="6858000"/>
+                </a:lnTo>
+                <a:lnTo>
+                  <a:pt x="0" y="6858000"/>
+                </a:lnTo>
+                <a:close/>
+              </a:path>
+            </a:pathLst>
+          </a:custGeom>
+        </p:spPr>
+      </p:pic>
+    </p:spTree>
+    <p:extLst>
+      <p:ext uri="{BB962C8B-B14F-4D97-AF65-F5344CB8AC3E}">
+        <p14:creationId xmlns:p14="http://schemas.microsoft.com/office/powerpoint/2010/main" val="257123260"/>
+      </p:ext>
+    </p:extLst>
+  </p:cSld>
+  <p:clrMapOvr>
+    <a:overrideClrMapping bg1="dk1" tx1="lt1" bg2="dk2" tx2="lt2" accent1="accent1" accent2="accent2" accent3="accent3" accent4="accent4" accent5="accent5" accent6="accent6" hlink="hlink" folHlink="folHlink"/>
+  </p:clrMapOvr>
+</p:sld>
+</file>
+
+<file path=ppt/slides/slide7.xml><?xml version="1.0" encoding="utf-8"?>
+<p:sld xmlns:a="http://schemas.openxmlformats.org/drawingml/2006/main" xmlns:r="http://schemas.openxmlformats.org/officeDocument/2006/relationships" xmlns:p="http://schemas.openxmlformats.org/presentationml/2006/main">
+  <p:cSld>
+    <p:bg>
+      <p:bgPr>
+        <a:solidFill>
+          <a:schemeClr val="bg1"/>
+        </a:solidFill>
+        <a:effectLst/>
+      </p:bgPr>
+    </p:bg>
+    <p:spTree>
+      <p:nvGrpSpPr>
+        <p:cNvPr id="1" name=""/>
+        <p:cNvGrpSpPr/>
+        <p:nvPr/>
+      </p:nvGrpSpPr>
+      <p:grpSpPr>
+        <a:xfrm>
+          <a:off x="0" y="0"/>
+          <a:ext cx="0" cy="0"/>
+          <a:chOff x="0" y="0"/>
+          <a:chExt cx="0" cy="0"/>
+        </a:xfrm>
+      </p:grpSpPr>
+      <p:sp>
+        <p:nvSpPr>
+          <p:cNvPr id="12" name="Rectangle 11">
+            <a:extLst>
+              <a:ext uri="{FF2B5EF4-FFF2-40B4-BE49-F238E27FC236}">
+                <a16:creationId xmlns:a16="http://schemas.microsoft.com/office/drawing/2014/main" id="{6753252F-4873-4F63-801D-CC719279A7D5}"/>
+              </a:ext>
+              <a:ext uri="{C183D7F6-B498-43B3-948B-1728B52AA6E4}">
+                <adec:decorative xmlns:adec="http://schemas.microsoft.com/office/drawing/2017/decorative" val="1"/>
+              </a:ext>
+            </a:extLst>
+          </p:cNvPr>
+          <p:cNvSpPr>
+            <a:spLocks noGrp="1" noRot="1" noChangeAspect="1" noMove="1" noResize="1" noEditPoints="1" noAdjustHandles="1" noChangeArrowheads="1" noChangeShapeType="1" noTextEdit="1"/>
+          </p:cNvSpPr>
+          <p:nvPr>
+            <p:extLst>
+              <p:ext uri="{386F3935-93C4-4BCD-93E2-E3B085C9AB24}">
+                <p16:designElem xmlns:p16="http://schemas.microsoft.com/office/powerpoint/2015/main" val="1"/>
+              </p:ext>
+            </p:extLst>
+          </p:nvPr>
+        </p:nvSpPr>
+        <p:spPr>
+          <a:xfrm>
+            <a:off x="0" y="0"/>
+            <a:ext cx="12192000" cy="6858000"/>
+          </a:xfrm>
+          <a:prstGeom prst="rect">
+            <a:avLst/>
+          </a:prstGeom>
+          <a:solidFill>
+            <a:srgbClr val="FFFFFF"/>
+          </a:solidFill>
+          <a:ln>
+            <a:noFill/>
+          </a:ln>
+        </p:spPr>
+        <p:style>
+          <a:lnRef idx="2">
+            <a:schemeClr val="accent1">
+              <a:shade val="50000"/>
+            </a:schemeClr>
+          </a:lnRef>
+          <a:fillRef idx="1">
+            <a:schemeClr val="accent1"/>
+          </a:fillRef>
+          <a:effectRef idx="0">
+            <a:schemeClr val="accent1"/>
+          </a:effectRef>
+          <a:fontRef idx="minor">
+            <a:schemeClr val="lt1"/>
+          </a:fontRef>
+        </p:style>
+        <p:txBody>
+          <a:bodyPr rtlCol="0" anchor="ctr"/>
+          <a:lstStyle/>
+          <a:p>
+            <a:pPr algn="ctr"/>
+            <a:endParaRPr lang="en-US"/>
+          </a:p>
+        </p:txBody>
+      </p:sp>
+      <p:sp>
+        <p:nvSpPr>
+          <p:cNvPr id="14" name="Rectangle 13">
+            <a:extLst>
+              <a:ext uri="{FF2B5EF4-FFF2-40B4-BE49-F238E27FC236}">
+                <a16:creationId xmlns:a16="http://schemas.microsoft.com/office/drawing/2014/main" id="{047C8CCB-F95D-4249-92DD-651249D3535A}"/>
+              </a:ext>
+              <a:ext uri="{C183D7F6-B498-43B3-948B-1728B52AA6E4}">
+                <adec:decorative xmlns:adec="http://schemas.microsoft.com/office/drawing/2017/decorative" val="1"/>
+              </a:ext>
+            </a:extLst>
+          </p:cNvPr>
+          <p:cNvSpPr>
+            <a:spLocks noGrp="1" noRot="1" noChangeAspect="1" noMove="1" noResize="1" noEditPoints="1" noAdjustHandles="1" noChangeArrowheads="1" noChangeShapeType="1" noTextEdit="1"/>
+          </p:cNvSpPr>
+          <p:nvPr>
+            <p:extLst>
+              <p:ext uri="{386F3935-93C4-4BCD-93E2-E3B085C9AB24}">
+                <p16:designElem xmlns:p16="http://schemas.microsoft.com/office/powerpoint/2015/main" val="1"/>
+              </p:ext>
+            </p:extLst>
+          </p:nvPr>
+        </p:nvSpPr>
+        <p:spPr>
+          <a:xfrm>
+            <a:off x="0" y="0"/>
+            <a:ext cx="2013557" cy="6858000"/>
+          </a:xfrm>
+          <a:prstGeom prst="rect">
+            <a:avLst/>
+          </a:prstGeom>
+          <a:solidFill>
+            <a:srgbClr val="7F7F7F"/>
+          </a:solidFill>
+          <a:ln>
+            <a:noFill/>
+          </a:ln>
+        </p:spPr>
+        <p:style>
+          <a:lnRef idx="2">
+            <a:schemeClr val="accent1">
+              <a:shade val="50000"/>
+            </a:schemeClr>
+          </a:lnRef>
+          <a:fillRef idx="1">
+            <a:schemeClr val="accent1"/>
+          </a:fillRef>
+          <a:effectRef idx="0">
+            <a:schemeClr val="accent1"/>
+          </a:effectRef>
+          <a:fontRef idx="minor">
+            <a:schemeClr val="lt1"/>
+          </a:fontRef>
+        </p:style>
+        <p:txBody>
+          <a:bodyPr rtlCol="0" anchor="ctr"/>
+          <a:lstStyle/>
+          <a:p>
+            <a:pPr algn="ctr"/>
+            <a:endParaRPr lang="en-US"/>
+          </a:p>
+        </p:txBody>
+      </p:sp>
+      <p:sp>
+        <p:nvSpPr>
+          <p:cNvPr id="2" name="Title 1">
+            <a:extLst>
+              <a:ext uri="{FF2B5EF4-FFF2-40B4-BE49-F238E27FC236}">
+                <a16:creationId xmlns:a16="http://schemas.microsoft.com/office/drawing/2014/main" id="{9A745DD3-6174-4337-A41B-2484E5845B3C}"/>
+              </a:ext>
+            </a:extLst>
+          </p:cNvPr>
+          <p:cNvSpPr>
+            <a:spLocks noGrp="1"/>
+          </p:cNvSpPr>
+          <p:nvPr>
+            <p:ph type="title"/>
+          </p:nvPr>
+        </p:nvSpPr>
+        <p:spPr>
+          <a:xfrm>
+            <a:off x="640080" y="2074363"/>
+            <a:ext cx="2752354" cy="2709275"/>
+          </a:xfrm>
+          <a:prstGeom prst="ellipse">
+            <a:avLst/>
+          </a:prstGeom>
+          <a:solidFill>
+            <a:srgbClr val="262626"/>
+          </a:solidFill>
+          <a:ln w="174625" cmpd="thinThick">
+            <a:solidFill>
+              <a:srgbClr val="262626"/>
+            </a:solidFill>
+          </a:ln>
+        </p:spPr>
+        <p:txBody>
+          <a:bodyPr vert="horz" lIns="91440" tIns="45720" rIns="91440" bIns="45720" rtlCol="0" anchor="ctr">
+            <a:normAutofit/>
+          </a:bodyPr>
+          <a:lstStyle/>
+          <a:p>
+            <a:pPr algn="ctr" defTabSz="914400">
+              <a:lnSpc>
+                <a:spcPct val="90000"/>
+              </a:lnSpc>
+            </a:pPr>
+            <a:r>
+              <a:rPr lang="en-US" sz="2600" kern="1200">
+                <a:solidFill>
+                  <a:srgbClr val="FFFFFF"/>
+                </a:solidFill>
+                <a:latin typeface="+mj-lt"/>
+                <a:ea typeface="+mj-ea"/>
+                <a:cs typeface="+mj-cs"/>
+              </a:rPr>
+              <a:t>Scene</a:t>
+            </a:r>
+          </a:p>
+        </p:txBody>
+      </p:sp>
+      <p:pic>
+        <p:nvPicPr>
+          <p:cNvPr id="7" name="Picture 6">
+            <a:extLst>
+              <a:ext uri="{FF2B5EF4-FFF2-40B4-BE49-F238E27FC236}">
+                <a16:creationId xmlns:a16="http://schemas.microsoft.com/office/drawing/2014/main" id="{F67B5695-F342-4DE1-8527-F706028B971F}"/>
+              </a:ext>
+            </a:extLst>
+          </p:cNvPr>
+          <p:cNvPicPr>
+            <a:picLocks noChangeAspect="1"/>
+          </p:cNvPicPr>
+          <p:nvPr/>
+        </p:nvPicPr>
+        <p:blipFill>
+          <a:blip r:embed="rId2"/>
+          <a:stretch>
+            <a:fillRect/>
+          </a:stretch>
+        </p:blipFill>
+        <p:spPr>
+          <a:xfrm>
+            <a:off x="5506211" y="961812"/>
+            <a:ext cx="4252976" cy="4930987"/>
+          </a:xfrm>
+          <a:prstGeom prst="rect">
+            <a:avLst/>
+          </a:prstGeom>
+        </p:spPr>
+      </p:pic>
+    </p:spTree>
+    <p:extLst>
+      <p:ext uri="{BB962C8B-B14F-4D97-AF65-F5344CB8AC3E}">
+        <p14:creationId xmlns:p14="http://schemas.microsoft.com/office/powerpoint/2010/main" val="456647392"/>
+      </p:ext>
+    </p:extLst>
   </p:cSld>
   <p:clrMapOvr>
     <a:masterClrMapping/>
@@ -15484,7 +16477,261 @@
 </p:sld>
 </file>
 
-<file path=ppt/slides/slide6.xml><?xml version="1.0" encoding="utf-8"?>
+<file path=ppt/slides/slide8.xml><?xml version="1.0" encoding="utf-8"?>
+<p:sld xmlns:a="http://schemas.openxmlformats.org/drawingml/2006/main" xmlns:r="http://schemas.openxmlformats.org/officeDocument/2006/relationships" xmlns:p="http://schemas.openxmlformats.org/presentationml/2006/main">
+  <p:cSld>
+    <p:bg>
+      <p:bgPr>
+        <a:solidFill>
+          <a:schemeClr val="bg1"/>
+        </a:solidFill>
+        <a:effectLst/>
+      </p:bgPr>
+    </p:bg>
+    <p:spTree>
+      <p:nvGrpSpPr>
+        <p:cNvPr id="1" name=""/>
+        <p:cNvGrpSpPr/>
+        <p:nvPr/>
+      </p:nvGrpSpPr>
+      <p:grpSpPr>
+        <a:xfrm>
+          <a:off x="0" y="0"/>
+          <a:ext cx="0" cy="0"/>
+          <a:chOff x="0" y="0"/>
+          <a:chExt cx="0" cy="0"/>
+        </a:xfrm>
+      </p:grpSpPr>
+      <p:sp>
+        <p:nvSpPr>
+          <p:cNvPr id="12" name="Rectangle 11">
+            <a:extLst>
+              <a:ext uri="{FF2B5EF4-FFF2-40B4-BE49-F238E27FC236}">
+                <a16:creationId xmlns:a16="http://schemas.microsoft.com/office/drawing/2014/main" id="{6753252F-4873-4F63-801D-CC719279A7D5}"/>
+              </a:ext>
+              <a:ext uri="{C183D7F6-B498-43B3-948B-1728B52AA6E4}">
+                <adec:decorative xmlns:adec="http://schemas.microsoft.com/office/drawing/2017/decorative" val="1"/>
+              </a:ext>
+            </a:extLst>
+          </p:cNvPr>
+          <p:cNvSpPr>
+            <a:spLocks noGrp="1" noRot="1" noChangeAspect="1" noMove="1" noResize="1" noEditPoints="1" noAdjustHandles="1" noChangeArrowheads="1" noChangeShapeType="1" noTextEdit="1"/>
+          </p:cNvSpPr>
+          <p:nvPr>
+            <p:extLst>
+              <p:ext uri="{386F3935-93C4-4BCD-93E2-E3B085C9AB24}">
+                <p16:designElem xmlns:p16="http://schemas.microsoft.com/office/powerpoint/2015/main" val="1"/>
+              </p:ext>
+            </p:extLst>
+          </p:nvPr>
+        </p:nvSpPr>
+        <p:spPr>
+          <a:xfrm>
+            <a:off x="0" y="0"/>
+            <a:ext cx="12192000" cy="6858000"/>
+          </a:xfrm>
+          <a:prstGeom prst="rect">
+            <a:avLst/>
+          </a:prstGeom>
+          <a:solidFill>
+            <a:srgbClr val="FFFFFF"/>
+          </a:solidFill>
+          <a:ln>
+            <a:noFill/>
+          </a:ln>
+        </p:spPr>
+        <p:style>
+          <a:lnRef idx="2">
+            <a:schemeClr val="accent1">
+              <a:shade val="50000"/>
+            </a:schemeClr>
+          </a:lnRef>
+          <a:fillRef idx="1">
+            <a:schemeClr val="accent1"/>
+          </a:fillRef>
+          <a:effectRef idx="0">
+            <a:schemeClr val="accent1"/>
+          </a:effectRef>
+          <a:fontRef idx="minor">
+            <a:schemeClr val="lt1"/>
+          </a:fontRef>
+        </p:style>
+        <p:txBody>
+          <a:bodyPr rtlCol="0" anchor="ctr"/>
+          <a:lstStyle/>
+          <a:p>
+            <a:pPr algn="ctr"/>
+            <a:endParaRPr lang="en-US"/>
+          </a:p>
+        </p:txBody>
+      </p:sp>
+      <p:sp>
+        <p:nvSpPr>
+          <p:cNvPr id="14" name="Rectangle 13">
+            <a:extLst>
+              <a:ext uri="{FF2B5EF4-FFF2-40B4-BE49-F238E27FC236}">
+                <a16:creationId xmlns:a16="http://schemas.microsoft.com/office/drawing/2014/main" id="{047C8CCB-F95D-4249-92DD-651249D3535A}"/>
+              </a:ext>
+              <a:ext uri="{C183D7F6-B498-43B3-948B-1728B52AA6E4}">
+                <adec:decorative xmlns:adec="http://schemas.microsoft.com/office/drawing/2017/decorative" val="1"/>
+              </a:ext>
+            </a:extLst>
+          </p:cNvPr>
+          <p:cNvSpPr>
+            <a:spLocks noGrp="1" noRot="1" noChangeAspect="1" noMove="1" noResize="1" noEditPoints="1" noAdjustHandles="1" noChangeArrowheads="1" noChangeShapeType="1" noTextEdit="1"/>
+          </p:cNvSpPr>
+          <p:nvPr>
+            <p:extLst>
+              <p:ext uri="{386F3935-93C4-4BCD-93E2-E3B085C9AB24}">
+                <p16:designElem xmlns:p16="http://schemas.microsoft.com/office/powerpoint/2015/main" val="1"/>
+              </p:ext>
+            </p:extLst>
+          </p:nvPr>
+        </p:nvSpPr>
+        <p:spPr>
+          <a:xfrm>
+            <a:off x="0" y="0"/>
+            <a:ext cx="2013557" cy="6858000"/>
+          </a:xfrm>
+          <a:prstGeom prst="rect">
+            <a:avLst/>
+          </a:prstGeom>
+          <a:solidFill>
+            <a:srgbClr val="563128"/>
+          </a:solidFill>
+          <a:ln>
+            <a:noFill/>
+          </a:ln>
+        </p:spPr>
+        <p:style>
+          <a:lnRef idx="2">
+            <a:schemeClr val="accent1">
+              <a:shade val="50000"/>
+            </a:schemeClr>
+          </a:lnRef>
+          <a:fillRef idx="1">
+            <a:schemeClr val="accent1"/>
+          </a:fillRef>
+          <a:effectRef idx="0">
+            <a:schemeClr val="accent1"/>
+          </a:effectRef>
+          <a:fontRef idx="minor">
+            <a:schemeClr val="lt1"/>
+          </a:fontRef>
+        </p:style>
+        <p:txBody>
+          <a:bodyPr rtlCol="0" anchor="ctr"/>
+          <a:lstStyle/>
+          <a:p>
+            <a:pPr algn="ctr"/>
+            <a:endParaRPr lang="en-US"/>
+          </a:p>
+        </p:txBody>
+      </p:sp>
+      <p:sp>
+        <p:nvSpPr>
+          <p:cNvPr id="2" name="Title 1">
+            <a:extLst>
+              <a:ext uri="{FF2B5EF4-FFF2-40B4-BE49-F238E27FC236}">
+                <a16:creationId xmlns:a16="http://schemas.microsoft.com/office/drawing/2014/main" id="{A7540790-1147-40EC-B709-02CE8B459A10}"/>
+              </a:ext>
+            </a:extLst>
+          </p:cNvPr>
+          <p:cNvSpPr>
+            <a:spLocks noGrp="1"/>
+          </p:cNvSpPr>
+          <p:nvPr>
+            <p:ph type="title"/>
+          </p:nvPr>
+        </p:nvSpPr>
+        <p:spPr>
+          <a:xfrm>
+            <a:off x="640080" y="2074363"/>
+            <a:ext cx="2752354" cy="2709275"/>
+          </a:xfrm>
+          <a:prstGeom prst="ellipse">
+            <a:avLst/>
+          </a:prstGeom>
+          <a:solidFill>
+            <a:srgbClr val="262626"/>
+          </a:solidFill>
+          <a:ln w="174625" cmpd="thinThick">
+            <a:solidFill>
+              <a:srgbClr val="262626"/>
+            </a:solidFill>
+          </a:ln>
+        </p:spPr>
+        <p:txBody>
+          <a:bodyPr vert="horz" lIns="91440" tIns="45720" rIns="91440" bIns="45720" rtlCol="0" anchor="ctr">
+            <a:normAutofit/>
+          </a:bodyPr>
+          <a:lstStyle/>
+          <a:p>
+            <a:pPr algn="ctr" defTabSz="914400">
+              <a:lnSpc>
+                <a:spcPct val="90000"/>
+              </a:lnSpc>
+            </a:pPr>
+            <a:r>
+              <a:rPr lang="en-US" sz="2400" kern="1200">
+                <a:solidFill>
+                  <a:srgbClr val="FFFFFF"/>
+                </a:solidFill>
+                <a:latin typeface="+mj-lt"/>
+                <a:ea typeface="+mj-ea"/>
+                <a:cs typeface="+mj-cs"/>
+              </a:rPr>
+              <a:t>SpriteSheet</a:t>
+            </a:r>
+          </a:p>
+        </p:txBody>
+      </p:sp>
+      <p:pic>
+        <p:nvPicPr>
+          <p:cNvPr id="7" name="Content Placeholder 6">
+            <a:extLst>
+              <a:ext uri="{FF2B5EF4-FFF2-40B4-BE49-F238E27FC236}">
+                <a16:creationId xmlns:a16="http://schemas.microsoft.com/office/drawing/2014/main" id="{6FA9DAC5-84C6-482E-BD9C-4D5F31BECD1E}"/>
+              </a:ext>
+            </a:extLst>
+          </p:cNvPr>
+          <p:cNvPicPr>
+            <a:picLocks noGrp="1" noChangeAspect="1"/>
+          </p:cNvPicPr>
+          <p:nvPr>
+            <p:ph idx="1"/>
+          </p:nvPr>
+        </p:nvPicPr>
+        <p:blipFill>
+          <a:blip r:embed="rId2"/>
+          <a:stretch>
+            <a:fillRect/>
+          </a:stretch>
+        </p:blipFill>
+        <p:spPr>
+          <a:xfrm>
+            <a:off x="5678796" y="961812"/>
+            <a:ext cx="3907806" cy="4930987"/>
+          </a:xfrm>
+          <a:prstGeom prst="rect">
+            <a:avLst/>
+          </a:prstGeom>
+        </p:spPr>
+      </p:pic>
+    </p:spTree>
+    <p:extLst>
+      <p:ext uri="{BB962C8B-B14F-4D97-AF65-F5344CB8AC3E}">
+        <p14:creationId xmlns:p14="http://schemas.microsoft.com/office/powerpoint/2010/main" val="4054281425"/>
+      </p:ext>
+    </p:extLst>
+  </p:cSld>
+  <p:clrMapOvr>
+    <a:masterClrMapping/>
+  </p:clrMapOvr>
+</p:sld>
+</file>
+
+<file path=ppt/slides/slide9.xml><?xml version="1.0" encoding="utf-8"?>
 <p:sld xmlns:a="http://schemas.openxmlformats.org/drawingml/2006/main" xmlns:r="http://schemas.openxmlformats.org/officeDocument/2006/relationships" xmlns:p="http://schemas.openxmlformats.org/presentationml/2006/main">
   <p:cSld>
     <p:spTree>
@@ -15503,7 +16750,13 @@
       </p:grpSpPr>
       <p:sp>
         <p:nvSpPr>
-          <p:cNvPr id="2" name="Title 1"/>
+          <p:cNvPr id="2" name="Title 1">
+            <a:extLst>
+              <a:ext uri="{FF2B5EF4-FFF2-40B4-BE49-F238E27FC236}">
+                <a16:creationId xmlns:a16="http://schemas.microsoft.com/office/drawing/2014/main" id="{26F523D5-74C3-4CB7-8FEB-7E5ECC9B842E}"/>
+              </a:ext>
+            </a:extLst>
+          </p:cNvPr>
           <p:cNvSpPr>
             <a:spLocks noGrp="1"/>
           </p:cNvSpPr>
@@ -15516,51 +16769,61 @@
           <a:bodyPr/>
           <a:lstStyle/>
           <a:p>
-            <a:endParaRPr lang="en-US"/>
+            <a:r>
+              <a:rPr lang="en-US" dirty="0"/>
+              <a:t>Reference	</a:t>
+            </a:r>
+            <a:endParaRPr lang="en-GB" dirty="0"/>
           </a:p>
         </p:txBody>
       </p:sp>
-      <p:pic>
-        <p:nvPicPr>
-          <p:cNvPr id="4" name="Content Placeholder 3"/>
-          <p:cNvPicPr>
-            <a:picLocks noGrp="1" noChangeAspect="1"/>
-          </p:cNvPicPr>
+      <p:sp>
+        <p:nvSpPr>
+          <p:cNvPr id="3" name="Content Placeholder 2">
+            <a:extLst>
+              <a:ext uri="{FF2B5EF4-FFF2-40B4-BE49-F238E27FC236}">
+                <a16:creationId xmlns:a16="http://schemas.microsoft.com/office/drawing/2014/main" id="{8ADB21E4-2938-4CD0-ACC3-454AE3688805}"/>
+              </a:ext>
+            </a:extLst>
+          </p:cNvPr>
+          <p:cNvSpPr>
+            <a:spLocks noGrp="1"/>
+          </p:cNvSpPr>
           <p:nvPr>
             <p:ph idx="1"/>
           </p:nvPr>
-        </p:nvPicPr>
-        <p:blipFill>
-          <a:blip r:embed="rId1">
-            <a:extLst>
-              <a:ext uri="{28A0092B-C50C-407E-A947-70E740481C1C}">
-                <a14:useLocalDpi xmlns:a14="http://schemas.microsoft.com/office/drawing/2010/main" val="0"/>
-              </a:ext>
-            </a:extLst>
-          </a:blip>
-          <a:stretch>
-            <a:fillRect/>
-          </a:stretch>
-        </p:blipFill>
-        <p:spPr>
-          <a:xfrm>
-            <a:off x="-9525" y="635"/>
-            <a:ext cx="12195810" cy="6846570"/>
-          </a:xfrm>
-        </p:spPr>
-      </p:pic>
+        </p:nvSpPr>
+        <p:spPr/>
+        <p:txBody>
+          <a:bodyPr/>
+          <a:lstStyle/>
+          <a:p>
+            <a:r>
+              <a:rPr lang="en-US" dirty="0"/>
+              <a:t>Scene: bloghoanglong.com/scene</a:t>
+            </a:r>
+          </a:p>
+          <a:p>
+            <a:r>
+              <a:rPr lang="en-US" dirty="0"/>
+              <a:t>Image: gameart2d.com, google.com</a:t>
+            </a:r>
+          </a:p>
+          <a:p>
+            <a:endParaRPr lang="en-GB" dirty="0"/>
+          </a:p>
+        </p:txBody>
+      </p:sp>
     </p:spTree>
+    <p:extLst>
+      <p:ext uri="{BB962C8B-B14F-4D97-AF65-F5344CB8AC3E}">
+        <p14:creationId xmlns:p14="http://schemas.microsoft.com/office/powerpoint/2010/main" val="593220978"/>
+      </p:ext>
+    </p:extLst>
   </p:cSld>
   <p:clrMapOvr>
     <a:masterClrMapping/>
   </p:clrMapOvr>
-  <p:timing>
-    <p:tnLst>
-      <p:par>
-        <p:cTn id="1" dur="indefinite" restart="never" nodeType="tmRoot"/>
-      </p:par>
-    </p:tnLst>
-  </p:timing>
 </p:sld>
 </file>
 
@@ -15820,6 +17083,8 @@
       </a:bgFillStyleLst>
     </a:fmtScheme>
   </a:themeElements>
+  <a:objectDefaults/>
+  <a:extraClrSchemeLst/>
   <a:extLst>
     <a:ext uri="{05A4C25C-085E-4340-85A3-A5531E510DB2}">
       <thm15:themeFamily xmlns:thm15="http://schemas.microsoft.com/office/thememl/2012/main" name="Office Theme" id="{62F939B6-93AF-4DB8-9C6B-D6C7DFDC589F}" vid="{4A3C46E8-61CC-4603-A589-7422A47A8E4A}"/>

</xml_diff>

<commit_message>
Adding mode, mode1, mode2
</commit_message>
<xml_diff>
--- a/GROUP PROJECT.pptx
+++ b/GROUP PROJECT.pptx
@@ -5,12 +5,15 @@
     <p:sldMasterId id="2147483648" r:id="rId1"/>
   </p:sldMasterIdLst>
   <p:sldIdLst>
-    <p:sldId id="256" r:id="rId3"/>
-    <p:sldId id="258" r:id="rId4"/>
-    <p:sldId id="257" r:id="rId5"/>
-    <p:sldId id="259" r:id="rId6"/>
-    <p:sldId id="262" r:id="rId7"/>
-    <p:sldId id="260" r:id="rId8"/>
+    <p:sldId id="256" r:id="rId2"/>
+    <p:sldId id="258" r:id="rId3"/>
+    <p:sldId id="257" r:id="rId4"/>
+    <p:sldId id="259" r:id="rId5"/>
+    <p:sldId id="263" r:id="rId6"/>
+    <p:sldId id="264" r:id="rId7"/>
+    <p:sldId id="265" r:id="rId8"/>
+    <p:sldId id="266" r:id="rId9"/>
+    <p:sldId id="260" r:id="rId10"/>
   </p:sldIdLst>
   <p:sldSz cx="12192000" cy="6858000"/>
   <p:notesSz cx="6858000" cy="9144000"/>
@@ -109,6 +112,11 @@
       </a:defRPr>
     </a:lvl9pPr>
   </p:defaultTextStyle>
+  <p:extLst>
+    <p:ext uri="{EFAFB233-063F-42B5-8137-9DF3F51BA10A}">
+      <p15:sldGuideLst xmlns:p15="http://schemas.microsoft.com/office/powerpoint/2012/main"/>
+    </p:ext>
+  </p:extLst>
 </p:presentation>
 </file>
 
@@ -132,7 +140,7 @@
 </file>
 
 <file path=ppt/slideLayouts/slideLayout1.xml><?xml version="1.0" encoding="utf-8"?>
-<p:sldLayout xmlns:a="http://schemas.openxmlformats.org/drawingml/2006/main" xmlns:r="http://schemas.openxmlformats.org/officeDocument/2006/relationships" xmlns:p="http://schemas.openxmlformats.org/presentationml/2006/main" type="title" preserve="1" showMasterSp="0">
+<p:sldLayout xmlns:a="http://schemas.openxmlformats.org/drawingml/2006/main" xmlns:r="http://schemas.openxmlformats.org/officeDocument/2006/relationships" xmlns:p="http://schemas.openxmlformats.org/presentationml/2006/main" showMasterSp="0" type="title" preserve="1">
   <p:cSld name="Title Slide">
     <p:spTree>
       <p:nvGrpSpPr>
@@ -307,7 +315,7 @@
           </a:lstStyle>
           <a:p>
             <a:r>
-              <a:rPr lang="en-US" smtClean="0"/>
+              <a:rPr lang="en-US"/>
               <a:t>Click to edit Master title style</a:t>
             </a:r>
             <a:endParaRPr lang="en-US" dirty="0"/>
@@ -427,7 +435,7 @@
           </a:lstStyle>
           <a:p>
             <a:r>
-              <a:rPr lang="en-US" smtClean="0"/>
+              <a:rPr lang="en-US"/>
               <a:t>Click to edit Master subtitle style</a:t>
             </a:r>
             <a:endParaRPr lang="en-US" dirty="0"/>
@@ -466,6 +474,7 @@
           <a:p>
             <a:fld id="{5923F103-BC34-4FE4-A40E-EDDEECFDA5D0}" type="datetimeFigureOut">
               <a:rPr lang="en-US" dirty="0"/>
+              <a:t>6/6/2019</a:t>
             </a:fld>
             <a:endParaRPr lang="en-US" dirty="0"/>
           </a:p>
@@ -506,7 +515,6 @@
               <a:t>
               </a:t>
             </a:r>
-            <a:endParaRPr lang="en-US" dirty="0"/>
           </a:p>
         </p:txBody>
       </p:sp>
@@ -568,6 +576,7 @@
           <a:p>
             <a:fld id="{D57F1E4F-1CFF-5643-939E-217C01CDF565}" type="slidenum">
               <a:rPr lang="en-US" dirty="0"/>
+              <a:t>‹#›</a:t>
             </a:fld>
             <a:endParaRPr lang="en-US" dirty="0"/>
           </a:p>
@@ -1375,7 +1384,7 @@
           </a:lstStyle>
           <a:p>
             <a:r>
-              <a:rPr lang="en-US" smtClean="0"/>
+              <a:rPr lang="en-US"/>
               <a:t>Click to edit Master title style</a:t>
             </a:r>
             <a:endParaRPr lang="en-US" dirty="0"/>
@@ -1454,7 +1463,7 @@
           </a:lstStyle>
           <a:p>
             <a:r>
-              <a:rPr lang="en-US" smtClean="0"/>
+              <a:rPr lang="en-US"/>
               <a:t>Click icon to add picture</a:t>
             </a:r>
             <a:endParaRPr lang="en-US" dirty="0"/>
@@ -1529,10 +1538,9 @@
           <a:p>
             <a:pPr lvl="0"/>
             <a:r>
-              <a:rPr lang="en-US" smtClean="0"/>
+              <a:rPr lang="en-US"/>
               <a:t>Edit Master text styles</a:t>
             </a:r>
-            <a:endParaRPr lang="en-US" smtClean="0"/>
           </a:p>
         </p:txBody>
       </p:sp>
@@ -1553,6 +1561,7 @@
           <a:p>
             <a:fld id="{923A1CC3-2375-41D4-9E03-427CAF2A4C1A}" type="datetimeFigureOut">
               <a:rPr lang="en-US" dirty="0"/>
+              <a:t>6/6/2019</a:t>
             </a:fld>
             <a:endParaRPr lang="en-US" dirty="0"/>
           </a:p>
@@ -1578,7 +1587,6 @@
               <a:t>
               </a:t>
             </a:r>
-            <a:endParaRPr lang="en-US" dirty="0"/>
           </a:p>
         </p:txBody>
       </p:sp>
@@ -1635,6 +1643,7 @@
           <a:p>
             <a:fld id="{D57F1E4F-1CFF-5643-939E-217C01CDF565}" type="slidenum">
               <a:rPr lang="en-US" dirty="0"/>
+              <a:t>‹#›</a:t>
             </a:fld>
             <a:endParaRPr lang="en-US" dirty="0"/>
           </a:p>
@@ -1649,7 +1658,7 @@
 </file>
 
 <file path=ppt/slideLayouts/slideLayout11.xml><?xml version="1.0" encoding="utf-8"?>
-<p:sldLayout xmlns:a="http://schemas.openxmlformats.org/drawingml/2006/main" xmlns:r="http://schemas.openxmlformats.org/officeDocument/2006/relationships" xmlns:p="http://schemas.openxmlformats.org/presentationml/2006/main" preserve="1" showMasterSp="0">
+<p:sldLayout xmlns:a="http://schemas.openxmlformats.org/drawingml/2006/main" xmlns:r="http://schemas.openxmlformats.org/officeDocument/2006/relationships" xmlns:p="http://schemas.openxmlformats.org/presentationml/2006/main" showMasterSp="0" preserve="1">
   <p:cSld name="Title and Caption">
     <p:spTree>
       <p:nvGrpSpPr>
@@ -2440,7 +2449,7 @@
           </a:lstStyle>
           <a:p>
             <a:r>
-              <a:rPr lang="en-US" smtClean="0"/>
+              <a:rPr lang="en-US"/>
               <a:t>Click to edit Master title style</a:t>
             </a:r>
             <a:endParaRPr lang="en-US" dirty="0"/>
@@ -2508,10 +2517,9 @@
           <a:p>
             <a:pPr lvl="0"/>
             <a:r>
-              <a:rPr lang="en-US" smtClean="0"/>
+              <a:rPr lang="en-US"/>
               <a:t>Edit Master text styles</a:t>
             </a:r>
-            <a:endParaRPr lang="en-US" smtClean="0"/>
           </a:p>
         </p:txBody>
       </p:sp>
@@ -2532,6 +2540,7 @@
           <a:p>
             <a:fld id="{AFF16868-8199-4C2C-A5B1-63AEE139F88E}" type="datetimeFigureOut">
               <a:rPr lang="en-US" dirty="0"/>
+              <a:t>6/6/2019</a:t>
             </a:fld>
             <a:endParaRPr lang="en-US" dirty="0"/>
           </a:p>
@@ -2557,7 +2566,6 @@
               <a:t>
               </a:t>
             </a:r>
-            <a:endParaRPr lang="en-US" dirty="0"/>
           </a:p>
         </p:txBody>
       </p:sp>
@@ -2614,6 +2622,7 @@
           <a:p>
             <a:fld id="{D57F1E4F-1CFF-5643-939E-217C01CDF565}" type="slidenum">
               <a:rPr lang="en-US" dirty="0"/>
+              <a:t>‹#›</a:t>
             </a:fld>
             <a:endParaRPr lang="en-US" dirty="0"/>
           </a:p>
@@ -2628,7 +2637,7 @@
 </file>
 
 <file path=ppt/slideLayouts/slideLayout12.xml><?xml version="1.0" encoding="utf-8"?>
-<p:sldLayout xmlns:a="http://schemas.openxmlformats.org/drawingml/2006/main" xmlns:r="http://schemas.openxmlformats.org/officeDocument/2006/relationships" xmlns:p="http://schemas.openxmlformats.org/presentationml/2006/main" preserve="1" showMasterSp="0">
+<p:sldLayout xmlns:a="http://schemas.openxmlformats.org/drawingml/2006/main" xmlns:r="http://schemas.openxmlformats.org/officeDocument/2006/relationships" xmlns:p="http://schemas.openxmlformats.org/presentationml/2006/main" showMasterSp="0" preserve="1">
   <p:cSld name="Quote with Caption">
     <p:spTree>
       <p:nvGrpSpPr>
@@ -3430,16 +3439,6 @@
               </a:rPr>
               <a:t>“</a:t>
             </a:r>
-            <a:endParaRPr lang="en-US" sz="9600" b="0" i="0" dirty="0">
-              <a:solidFill>
-                <a:schemeClr val="accent1">
-                  <a:lumMod val="60000"/>
-                  <a:lumOff val="40000"/>
-                </a:schemeClr>
-              </a:solidFill>
-              <a:latin typeface="Arial" panose="020B0604020202020204"/>
-              <a:cs typeface="Arial" panose="020B0604020202020204"/>
-            </a:endParaRPr>
           </a:p>
         </p:txBody>
       </p:sp>
@@ -3479,16 +3478,6 @@
               </a:rPr>
               <a:t>”</a:t>
             </a:r>
-            <a:endParaRPr lang="en-US" sz="9600" b="0" i="0" dirty="0">
-              <a:solidFill>
-                <a:schemeClr val="accent1">
-                  <a:lumMod val="60000"/>
-                  <a:lumOff val="40000"/>
-                </a:schemeClr>
-              </a:solidFill>
-              <a:latin typeface="Arial" panose="020B0604020202020204"/>
-              <a:cs typeface="Arial" panose="020B0604020202020204"/>
-            </a:endParaRPr>
           </a:p>
         </p:txBody>
       </p:sp>
@@ -3517,7 +3506,7 @@
           </a:lstStyle>
           <a:p>
             <a:r>
-              <a:rPr lang="en-US" smtClean="0"/>
+              <a:rPr lang="en-US"/>
               <a:t>Click to edit Master title style</a:t>
             </a:r>
             <a:endParaRPr lang="en-US" dirty="0"/>
@@ -3594,10 +3583,9 @@
           <a:p>
             <a:pPr lvl="0"/>
             <a:r>
-              <a:rPr lang="en-US" smtClean="0"/>
+              <a:rPr lang="en-US"/>
               <a:t>Edit Master text styles</a:t>
             </a:r>
-            <a:endParaRPr lang="en-US" smtClean="0"/>
           </a:p>
         </p:txBody>
       </p:sp>
@@ -3662,10 +3650,9 @@
           <a:p>
             <a:pPr lvl="0"/>
             <a:r>
-              <a:rPr lang="en-US" smtClean="0"/>
+              <a:rPr lang="en-US"/>
               <a:t>Edit Master text styles</a:t>
             </a:r>
-            <a:endParaRPr lang="en-US" smtClean="0"/>
           </a:p>
         </p:txBody>
       </p:sp>
@@ -3686,6 +3673,7 @@
           <a:p>
             <a:fld id="{AAD9FF7F-6988-44CC-821B-644E70CD2F73}" type="datetimeFigureOut">
               <a:rPr lang="en-US" dirty="0"/>
+              <a:t>6/6/2019</a:t>
             </a:fld>
             <a:endParaRPr lang="en-US" dirty="0"/>
           </a:p>
@@ -3711,7 +3699,6 @@
               <a:t>
               </a:t>
             </a:r>
-            <a:endParaRPr lang="en-US" dirty="0"/>
           </a:p>
         </p:txBody>
       </p:sp>
@@ -3768,6 +3755,7 @@
           <a:p>
             <a:fld id="{D57F1E4F-1CFF-5643-939E-217C01CDF565}" type="slidenum">
               <a:rPr lang="en-US" dirty="0"/>
+              <a:t>‹#›</a:t>
             </a:fld>
             <a:endParaRPr lang="en-US" dirty="0"/>
           </a:p>
@@ -3782,7 +3770,7 @@
 </file>
 
 <file path=ppt/slideLayouts/slideLayout13.xml><?xml version="1.0" encoding="utf-8"?>
-<p:sldLayout xmlns:a="http://schemas.openxmlformats.org/drawingml/2006/main" xmlns:r="http://schemas.openxmlformats.org/officeDocument/2006/relationships" xmlns:p="http://schemas.openxmlformats.org/presentationml/2006/main" preserve="1" showMasterSp="0">
+<p:sldLayout xmlns:a="http://schemas.openxmlformats.org/drawingml/2006/main" xmlns:r="http://schemas.openxmlformats.org/officeDocument/2006/relationships" xmlns:p="http://schemas.openxmlformats.org/presentationml/2006/main" showMasterSp="0" preserve="1">
   <p:cSld name="Name Card">
     <p:spTree>
       <p:nvGrpSpPr>
@@ -4573,7 +4561,7 @@
           </a:lstStyle>
           <a:p>
             <a:r>
-              <a:rPr lang="en-US" smtClean="0"/>
+              <a:rPr lang="en-US"/>
               <a:t>Click to edit Master title style</a:t>
             </a:r>
             <a:endParaRPr lang="en-US" dirty="0"/>
@@ -4694,10 +4682,9 @@
           <a:p>
             <a:pPr lvl="0"/>
             <a:r>
-              <a:rPr lang="en-US" smtClean="0"/>
+              <a:rPr lang="en-US"/>
               <a:t>Edit Master text styles</a:t>
             </a:r>
-            <a:endParaRPr lang="en-US" smtClean="0"/>
           </a:p>
         </p:txBody>
       </p:sp>
@@ -4718,6 +4705,7 @@
           <a:p>
             <a:fld id="{5C12C299-16B2-4475-990D-751901EACC14}" type="datetimeFigureOut">
               <a:rPr lang="en-US" dirty="0"/>
+              <a:t>6/6/2019</a:t>
             </a:fld>
             <a:endParaRPr lang="en-US" dirty="0"/>
           </a:p>
@@ -4743,7 +4731,6 @@
               <a:t>
               </a:t>
             </a:r>
-            <a:endParaRPr lang="en-US" dirty="0"/>
           </a:p>
         </p:txBody>
       </p:sp>
@@ -4800,6 +4787,7 @@
           <a:p>
             <a:fld id="{D57F1E4F-1CFF-5643-939E-217C01CDF565}" type="slidenum">
               <a:rPr lang="en-US" dirty="0"/>
+              <a:t>‹#›</a:t>
             </a:fld>
             <a:endParaRPr lang="en-US" dirty="0"/>
           </a:p>
@@ -4855,7 +4843,7 @@
           </a:lstStyle>
           <a:p>
             <a:r>
-              <a:rPr lang="en-US" smtClean="0"/>
+              <a:rPr lang="en-US"/>
               <a:t>Click to edit Master title style</a:t>
             </a:r>
             <a:endParaRPr lang="en-US" dirty="0"/>
@@ -4930,10 +4918,9 @@
           <a:p>
             <a:pPr lvl="0"/>
             <a:r>
-              <a:rPr lang="en-US" smtClean="0"/>
+              <a:rPr lang="en-US"/>
               <a:t>Edit Master text styles</a:t>
             </a:r>
-            <a:endParaRPr lang="en-US" smtClean="0"/>
           </a:p>
         </p:txBody>
       </p:sp>
@@ -4998,10 +4985,9 @@
           <a:p>
             <a:pPr lvl="0"/>
             <a:r>
-              <a:rPr lang="en-US" smtClean="0"/>
+              <a:rPr lang="en-US"/>
               <a:t>Edit Master text styles</a:t>
             </a:r>
-            <a:endParaRPr lang="en-US" smtClean="0"/>
           </a:p>
         </p:txBody>
       </p:sp>
@@ -5073,10 +5059,9 @@
           <a:p>
             <a:pPr lvl="0"/>
             <a:r>
-              <a:rPr lang="en-US" smtClean="0"/>
+              <a:rPr lang="en-US"/>
               <a:t>Edit Master text styles</a:t>
             </a:r>
-            <a:endParaRPr lang="en-US" smtClean="0"/>
           </a:p>
         </p:txBody>
       </p:sp>
@@ -5141,10 +5126,9 @@
           <a:p>
             <a:pPr lvl="0"/>
             <a:r>
-              <a:rPr lang="en-US" smtClean="0"/>
+              <a:rPr lang="en-US"/>
               <a:t>Edit Master text styles</a:t>
             </a:r>
-            <a:endParaRPr lang="en-US" smtClean="0"/>
           </a:p>
         </p:txBody>
       </p:sp>
@@ -5216,10 +5200,9 @@
           <a:p>
             <a:pPr lvl="0"/>
             <a:r>
-              <a:rPr lang="en-US" smtClean="0"/>
+              <a:rPr lang="en-US"/>
               <a:t>Edit Master text styles</a:t>
             </a:r>
-            <a:endParaRPr lang="en-US" smtClean="0"/>
           </a:p>
         </p:txBody>
       </p:sp>
@@ -5284,10 +5267,9 @@
           <a:p>
             <a:pPr lvl="0"/>
             <a:r>
-              <a:rPr lang="en-US" smtClean="0"/>
+              <a:rPr lang="en-US"/>
               <a:t>Edit Master text styles</a:t>
             </a:r>
-            <a:endParaRPr lang="en-US" smtClean="0"/>
           </a:p>
         </p:txBody>
       </p:sp>
@@ -5382,6 +5364,7 @@
           <a:p>
             <a:fld id="{9FE86839-B9D8-4651-8783-F325ECE74E65}" type="datetimeFigureOut">
               <a:rPr lang="en-US" dirty="0"/>
+              <a:t>6/6/2019</a:t>
             </a:fld>
             <a:endParaRPr lang="en-US" dirty="0"/>
           </a:p>
@@ -5407,7 +5390,6 @@
               <a:t>
               </a:t>
             </a:r>
-            <a:endParaRPr lang="en-US" dirty="0"/>
           </a:p>
         </p:txBody>
       </p:sp>
@@ -5428,6 +5410,7 @@
           <a:p>
             <a:fld id="{D57F1E4F-1CFF-5643-939E-217C01CDF565}" type="slidenum">
               <a:rPr lang="en-US" dirty="0"/>
+              <a:t>‹#›</a:t>
             </a:fld>
             <a:endParaRPr lang="en-US" dirty="0"/>
           </a:p>
@@ -5483,7 +5466,7 @@
           </a:lstStyle>
           <a:p>
             <a:r>
-              <a:rPr lang="en-US" smtClean="0"/>
+              <a:rPr lang="en-US"/>
               <a:t>Click to edit Master title style</a:t>
             </a:r>
             <a:endParaRPr lang="en-US" dirty="0"/>
@@ -5558,10 +5541,9 @@
           <a:p>
             <a:pPr lvl="0"/>
             <a:r>
-              <a:rPr lang="en-US" smtClean="0"/>
+              <a:rPr lang="en-US"/>
               <a:t>Edit Master text styles</a:t>
             </a:r>
-            <a:endParaRPr lang="en-US" smtClean="0"/>
           </a:p>
         </p:txBody>
       </p:sp>
@@ -5637,7 +5619,7 @@
           </a:lstStyle>
           <a:p>
             <a:r>
-              <a:rPr lang="en-US" smtClean="0"/>
+              <a:rPr lang="en-US"/>
               <a:t>Click icon to add picture</a:t>
             </a:r>
             <a:endParaRPr lang="en-US" dirty="0"/>
@@ -5705,10 +5687,9 @@
           <a:p>
             <a:pPr lvl="0"/>
             <a:r>
-              <a:rPr lang="en-US" smtClean="0"/>
+              <a:rPr lang="en-US"/>
               <a:t>Edit Master text styles</a:t>
             </a:r>
-            <a:endParaRPr lang="en-US" smtClean="0"/>
           </a:p>
         </p:txBody>
       </p:sp>
@@ -5780,10 +5761,9 @@
           <a:p>
             <a:pPr lvl="0"/>
             <a:r>
-              <a:rPr lang="en-US" smtClean="0"/>
+              <a:rPr lang="en-US"/>
               <a:t>Edit Master text styles</a:t>
             </a:r>
-            <a:endParaRPr lang="en-US" smtClean="0"/>
           </a:p>
         </p:txBody>
       </p:sp>
@@ -5859,7 +5839,7 @@
           </a:lstStyle>
           <a:p>
             <a:r>
-              <a:rPr lang="en-US" smtClean="0"/>
+              <a:rPr lang="en-US"/>
               <a:t>Click icon to add picture</a:t>
             </a:r>
             <a:endParaRPr lang="en-US" dirty="0"/>
@@ -5927,10 +5907,9 @@
           <a:p>
             <a:pPr lvl="0"/>
             <a:r>
-              <a:rPr lang="en-US" smtClean="0"/>
+              <a:rPr lang="en-US"/>
               <a:t>Edit Master text styles</a:t>
             </a:r>
-            <a:endParaRPr lang="en-US" smtClean="0"/>
           </a:p>
         </p:txBody>
       </p:sp>
@@ -6002,10 +5981,9 @@
           <a:p>
             <a:pPr lvl="0"/>
             <a:r>
-              <a:rPr lang="en-US" smtClean="0"/>
+              <a:rPr lang="en-US"/>
               <a:t>Edit Master text styles</a:t>
             </a:r>
-            <a:endParaRPr lang="en-US" smtClean="0"/>
           </a:p>
         </p:txBody>
       </p:sp>
@@ -6081,7 +6059,7 @@
           </a:lstStyle>
           <a:p>
             <a:r>
-              <a:rPr lang="en-US" smtClean="0"/>
+              <a:rPr lang="en-US"/>
               <a:t>Click icon to add picture</a:t>
             </a:r>
             <a:endParaRPr lang="en-US" dirty="0"/>
@@ -6149,10 +6127,9 @@
           <a:p>
             <a:pPr lvl="0"/>
             <a:r>
-              <a:rPr lang="en-US" smtClean="0"/>
+              <a:rPr lang="en-US"/>
               <a:t>Edit Master text styles</a:t>
             </a:r>
-            <a:endParaRPr lang="en-US" smtClean="0"/>
           </a:p>
         </p:txBody>
       </p:sp>
@@ -6247,6 +6224,7 @@
           <a:p>
             <a:fld id="{FD484F64-32F6-45C5-931F-ADC1662401D0}" type="datetimeFigureOut">
               <a:rPr lang="en-US" dirty="0"/>
+              <a:t>6/6/2019</a:t>
             </a:fld>
             <a:endParaRPr lang="en-US" dirty="0"/>
           </a:p>
@@ -6277,7 +6255,6 @@
               <a:t>
               </a:t>
             </a:r>
-            <a:endParaRPr lang="en-US" dirty="0"/>
           </a:p>
         </p:txBody>
       </p:sp>
@@ -6298,6 +6275,7 @@
           <a:p>
             <a:fld id="{D57F1E4F-1CFF-5643-939E-217C01CDF565}" type="slidenum">
               <a:rPr lang="en-US" dirty="0"/>
+              <a:t>‹#›</a:t>
             </a:fld>
             <a:endParaRPr lang="en-US" dirty="0"/>
           </a:p>
@@ -6349,7 +6327,7 @@
           <a:lstStyle/>
           <a:p>
             <a:r>
-              <a:rPr lang="en-US" smtClean="0"/>
+              <a:rPr lang="en-US"/>
               <a:t>Click to edit Master title style</a:t>
             </a:r>
             <a:endParaRPr lang="en-US" dirty="0"/>
@@ -6378,39 +6356,35 @@
           <a:p>
             <a:pPr lvl="0"/>
             <a:r>
-              <a:rPr lang="en-US" smtClean="0"/>
+              <a:rPr lang="en-US"/>
               <a:t>Edit Master text styles</a:t>
             </a:r>
-            <a:endParaRPr lang="en-US" smtClean="0"/>
           </a:p>
           <a:p>
             <a:pPr lvl="1"/>
             <a:r>
-              <a:rPr lang="en-US" smtClean="0"/>
+              <a:rPr lang="en-US"/>
               <a:t>Second level</a:t>
             </a:r>
-            <a:endParaRPr lang="en-US" smtClean="0"/>
           </a:p>
           <a:p>
             <a:pPr lvl="2"/>
             <a:r>
-              <a:rPr lang="en-US" smtClean="0"/>
+              <a:rPr lang="en-US"/>
               <a:t>Third level</a:t>
             </a:r>
-            <a:endParaRPr lang="en-US" smtClean="0"/>
           </a:p>
           <a:p>
             <a:pPr lvl="3"/>
             <a:r>
-              <a:rPr lang="en-US" smtClean="0"/>
+              <a:rPr lang="en-US"/>
               <a:t>Fourth level</a:t>
             </a:r>
-            <a:endParaRPr lang="en-US" smtClean="0"/>
           </a:p>
           <a:p>
             <a:pPr lvl="4"/>
             <a:r>
-              <a:rPr lang="en-US" smtClean="0"/>
+              <a:rPr lang="en-US"/>
               <a:t>Fifth level</a:t>
             </a:r>
             <a:endParaRPr lang="en-US" dirty="0"/>
@@ -6439,6 +6413,7 @@
           <a:p>
             <a:fld id="{53086D93-FCAC-47E0-A2EE-787E62CA814C}" type="datetimeFigureOut">
               <a:rPr lang="en-US" dirty="0"/>
+              <a:t>6/6/2019</a:t>
             </a:fld>
             <a:endParaRPr lang="en-US" dirty="0"/>
           </a:p>
@@ -6464,7 +6439,6 @@
               <a:t>
               </a:t>
             </a:r>
-            <a:endParaRPr lang="en-US" dirty="0"/>
           </a:p>
         </p:txBody>
       </p:sp>
@@ -6485,6 +6459,7 @@
           <a:p>
             <a:fld id="{D57F1E4F-1CFF-5643-939E-217C01CDF565}" type="slidenum">
               <a:rPr lang="en-US" dirty="0"/>
+              <a:t>‹#›</a:t>
             </a:fld>
             <a:endParaRPr lang="en-US" dirty="0"/>
           </a:p>
@@ -6499,7 +6474,7 @@
 </file>
 
 <file path=ppt/slideLayouts/slideLayout17.xml><?xml version="1.0" encoding="utf-8"?>
-<p:sldLayout xmlns:a="http://schemas.openxmlformats.org/drawingml/2006/main" xmlns:r="http://schemas.openxmlformats.org/officeDocument/2006/relationships" xmlns:p="http://schemas.openxmlformats.org/presentationml/2006/main" type="vertTitleAndTx" preserve="1" showMasterSp="0">
+<p:sldLayout xmlns:a="http://schemas.openxmlformats.org/drawingml/2006/main" xmlns:r="http://schemas.openxmlformats.org/officeDocument/2006/relationships" xmlns:p="http://schemas.openxmlformats.org/presentationml/2006/main" showMasterSp="0" type="vertTitleAndTx" preserve="1">
   <p:cSld name="Vertical Title and Text">
     <p:spTree>
       <p:nvGrpSpPr>
@@ -7323,7 +7298,7 @@
           <a:lstStyle/>
           <a:p>
             <a:r>
-              <a:rPr lang="en-US" smtClean="0"/>
+              <a:rPr lang="en-US"/>
               <a:t>Click to edit Master title style</a:t>
             </a:r>
             <a:endParaRPr lang="en-US" dirty="0"/>
@@ -7352,39 +7327,35 @@
           <a:p>
             <a:pPr lvl="0"/>
             <a:r>
-              <a:rPr lang="en-US" smtClean="0"/>
+              <a:rPr lang="en-US"/>
               <a:t>Edit Master text styles</a:t>
             </a:r>
-            <a:endParaRPr lang="en-US" smtClean="0"/>
           </a:p>
           <a:p>
             <a:pPr lvl="1"/>
             <a:r>
-              <a:rPr lang="en-US" smtClean="0"/>
+              <a:rPr lang="en-US"/>
               <a:t>Second level</a:t>
             </a:r>
-            <a:endParaRPr lang="en-US" smtClean="0"/>
           </a:p>
           <a:p>
             <a:pPr lvl="2"/>
             <a:r>
-              <a:rPr lang="en-US" smtClean="0"/>
+              <a:rPr lang="en-US"/>
               <a:t>Third level</a:t>
             </a:r>
-            <a:endParaRPr lang="en-US" smtClean="0"/>
           </a:p>
           <a:p>
             <a:pPr lvl="3"/>
             <a:r>
-              <a:rPr lang="en-US" smtClean="0"/>
+              <a:rPr lang="en-US"/>
               <a:t>Fourth level</a:t>
             </a:r>
-            <a:endParaRPr lang="en-US" smtClean="0"/>
           </a:p>
           <a:p>
             <a:pPr lvl="4"/>
             <a:r>
-              <a:rPr lang="en-US" smtClean="0"/>
+              <a:rPr lang="en-US"/>
               <a:t>Fifth level</a:t>
             </a:r>
             <a:endParaRPr lang="en-US" dirty="0"/>
@@ -7413,6 +7384,7 @@
           <a:p>
             <a:fld id="{CDA879A6-0FD0-4734-A311-86BFCA472E6E}" type="datetimeFigureOut">
               <a:rPr lang="en-US" dirty="0"/>
+              <a:t>6/6/2019</a:t>
             </a:fld>
             <a:endParaRPr lang="en-US" dirty="0"/>
           </a:p>
@@ -7438,7 +7410,6 @@
               <a:t>
               </a:t>
             </a:r>
-            <a:endParaRPr lang="en-US" dirty="0"/>
           </a:p>
         </p:txBody>
       </p:sp>
@@ -7495,6 +7466,7 @@
           <a:p>
             <a:fld id="{D57F1E4F-1CFF-5643-939E-217C01CDF565}" type="slidenum">
               <a:rPr lang="en-US" dirty="0"/>
+              <a:t>‹#›</a:t>
             </a:fld>
             <a:endParaRPr lang="en-US" dirty="0"/>
           </a:p>
@@ -7541,7 +7513,7 @@
           <a:lstStyle/>
           <a:p>
             <a:r>
-              <a:rPr lang="en-US" smtClean="0"/>
+              <a:rPr lang="en-US"/>
               <a:t>Click to edit Master title style</a:t>
             </a:r>
             <a:endParaRPr lang="en-US" dirty="0"/>
@@ -7570,39 +7542,35 @@
           <a:p>
             <a:pPr lvl="0"/>
             <a:r>
-              <a:rPr lang="en-US" smtClean="0"/>
+              <a:rPr lang="en-US"/>
               <a:t>Edit Master text styles</a:t>
             </a:r>
-            <a:endParaRPr lang="en-US" smtClean="0"/>
           </a:p>
           <a:p>
             <a:pPr lvl="1"/>
             <a:r>
-              <a:rPr lang="en-US" smtClean="0"/>
+              <a:rPr lang="en-US"/>
               <a:t>Second level</a:t>
             </a:r>
-            <a:endParaRPr lang="en-US" smtClean="0"/>
           </a:p>
           <a:p>
             <a:pPr lvl="2"/>
             <a:r>
-              <a:rPr lang="en-US" smtClean="0"/>
+              <a:rPr lang="en-US"/>
               <a:t>Third level</a:t>
             </a:r>
-            <a:endParaRPr lang="en-US" smtClean="0"/>
           </a:p>
           <a:p>
             <a:pPr lvl="3"/>
             <a:r>
-              <a:rPr lang="en-US" smtClean="0"/>
+              <a:rPr lang="en-US"/>
               <a:t>Fourth level</a:t>
             </a:r>
-            <a:endParaRPr lang="en-US" smtClean="0"/>
           </a:p>
           <a:p>
             <a:pPr lvl="4"/>
             <a:r>
-              <a:rPr lang="en-US" smtClean="0"/>
+              <a:rPr lang="en-US"/>
               <a:t>Fifth level</a:t>
             </a:r>
             <a:endParaRPr lang="en-US" dirty="0"/>
@@ -7626,6 +7594,7 @@
           <a:p>
             <a:fld id="{19C9CA7B-DFD4-44B5-8C60-D14B8CD1FB59}" type="datetimeFigureOut">
               <a:rPr lang="en-US" dirty="0"/>
+              <a:t>6/6/2019</a:t>
             </a:fld>
             <a:endParaRPr lang="en-US" dirty="0"/>
           </a:p>
@@ -7651,7 +7620,6 @@
               <a:t>
               </a:t>
             </a:r>
-            <a:endParaRPr lang="en-US" dirty="0"/>
           </a:p>
         </p:txBody>
       </p:sp>
@@ -7672,6 +7640,7 @@
           <a:p>
             <a:fld id="{D57F1E4F-1CFF-5643-939E-217C01CDF565}" type="slidenum">
               <a:rPr lang="en-US" dirty="0"/>
+              <a:t>‹#›</a:t>
             </a:fld>
             <a:endParaRPr lang="en-US" dirty="0"/>
           </a:p>
@@ -7686,7 +7655,7 @@
 </file>
 
 <file path=ppt/slideLayouts/slideLayout3.xml><?xml version="1.0" encoding="utf-8"?>
-<p:sldLayout xmlns:a="http://schemas.openxmlformats.org/drawingml/2006/main" xmlns:r="http://schemas.openxmlformats.org/officeDocument/2006/relationships" xmlns:p="http://schemas.openxmlformats.org/presentationml/2006/main" type="secHead" preserve="1" showMasterSp="0">
+<p:sldLayout xmlns:a="http://schemas.openxmlformats.org/drawingml/2006/main" xmlns:r="http://schemas.openxmlformats.org/officeDocument/2006/relationships" xmlns:p="http://schemas.openxmlformats.org/presentationml/2006/main" showMasterSp="0" type="secHead" preserve="1">
   <p:cSld name="Section Header">
     <p:spTree>
       <p:nvGrpSpPr>
@@ -8514,7 +8483,7 @@
           </a:lstStyle>
           <a:p>
             <a:r>
-              <a:rPr lang="en-US" smtClean="0"/>
+              <a:rPr lang="en-US"/>
               <a:t>Click to edit Master title style</a:t>
             </a:r>
             <a:endParaRPr lang="en-US" dirty="0"/>
@@ -8635,10 +8604,9 @@
           <a:p>
             <a:pPr lvl="0"/>
             <a:r>
-              <a:rPr lang="en-US" smtClean="0"/>
+              <a:rPr lang="en-US"/>
               <a:t>Edit Master text styles</a:t>
             </a:r>
-            <a:endParaRPr lang="en-US" smtClean="0"/>
           </a:p>
         </p:txBody>
       </p:sp>
@@ -8659,6 +8627,7 @@
           <a:p>
             <a:fld id="{F34E6425-0181-43F2-84FC-787E803FD2F8}" type="datetimeFigureOut">
               <a:rPr lang="en-US" dirty="0"/>
+              <a:t>6/6/2019</a:t>
             </a:fld>
             <a:endParaRPr lang="en-US" dirty="0"/>
           </a:p>
@@ -8684,7 +8653,6 @@
               <a:t>
               </a:t>
             </a:r>
-            <a:endParaRPr lang="en-US" dirty="0"/>
           </a:p>
         </p:txBody>
       </p:sp>
@@ -8741,6 +8709,7 @@
           <a:p>
             <a:fld id="{D57F1E4F-1CFF-5643-939E-217C01CDF565}" type="slidenum">
               <a:rPr lang="en-US" dirty="0"/>
+              <a:t>‹#›</a:t>
             </a:fld>
             <a:endParaRPr lang="en-US" dirty="0"/>
           </a:p>
@@ -8787,7 +8756,7 @@
           <a:lstStyle/>
           <a:p>
             <a:r>
-              <a:rPr lang="en-US" smtClean="0"/>
+              <a:rPr lang="en-US"/>
               <a:t>Click to edit Master title style</a:t>
             </a:r>
             <a:endParaRPr lang="en-US" dirty="0"/>
@@ -8818,39 +8787,35 @@
           <a:p>
             <a:pPr lvl="0"/>
             <a:r>
-              <a:rPr lang="en-US" smtClean="0"/>
+              <a:rPr lang="en-US"/>
               <a:t>Edit Master text styles</a:t>
             </a:r>
-            <a:endParaRPr lang="en-US" smtClean="0"/>
           </a:p>
           <a:p>
             <a:pPr lvl="1"/>
             <a:r>
-              <a:rPr lang="en-US" smtClean="0"/>
+              <a:rPr lang="en-US"/>
               <a:t>Second level</a:t>
             </a:r>
-            <a:endParaRPr lang="en-US" smtClean="0"/>
           </a:p>
           <a:p>
             <a:pPr lvl="2"/>
             <a:r>
-              <a:rPr lang="en-US" smtClean="0"/>
+              <a:rPr lang="en-US"/>
               <a:t>Third level</a:t>
             </a:r>
-            <a:endParaRPr lang="en-US" smtClean="0"/>
           </a:p>
           <a:p>
             <a:pPr lvl="3"/>
             <a:r>
-              <a:rPr lang="en-US" smtClean="0"/>
+              <a:rPr lang="en-US"/>
               <a:t>Fourth level</a:t>
             </a:r>
-            <a:endParaRPr lang="en-US" smtClean="0"/>
           </a:p>
           <a:p>
             <a:pPr lvl="4"/>
             <a:r>
-              <a:rPr lang="en-US" smtClean="0"/>
+              <a:rPr lang="en-US"/>
               <a:t>Fifth level</a:t>
             </a:r>
             <a:endParaRPr lang="en-US" dirty="0"/>
@@ -8881,39 +8846,35 @@
           <a:p>
             <a:pPr lvl="0"/>
             <a:r>
-              <a:rPr lang="en-US" smtClean="0"/>
+              <a:rPr lang="en-US"/>
               <a:t>Edit Master text styles</a:t>
             </a:r>
-            <a:endParaRPr lang="en-US" smtClean="0"/>
           </a:p>
           <a:p>
             <a:pPr lvl="1"/>
             <a:r>
-              <a:rPr lang="en-US" smtClean="0"/>
+              <a:rPr lang="en-US"/>
               <a:t>Second level</a:t>
             </a:r>
-            <a:endParaRPr lang="en-US" smtClean="0"/>
           </a:p>
           <a:p>
             <a:pPr lvl="2"/>
             <a:r>
-              <a:rPr lang="en-US" smtClean="0"/>
+              <a:rPr lang="en-US"/>
               <a:t>Third level</a:t>
             </a:r>
-            <a:endParaRPr lang="en-US" smtClean="0"/>
           </a:p>
           <a:p>
             <a:pPr lvl="3"/>
             <a:r>
-              <a:rPr lang="en-US" smtClean="0"/>
+              <a:rPr lang="en-US"/>
               <a:t>Fourth level</a:t>
             </a:r>
-            <a:endParaRPr lang="en-US" smtClean="0"/>
           </a:p>
           <a:p>
             <a:pPr lvl="4"/>
             <a:r>
-              <a:rPr lang="en-US" smtClean="0"/>
+              <a:rPr lang="en-US"/>
               <a:t>Fifth level</a:t>
             </a:r>
             <a:endParaRPr lang="en-US" dirty="0"/>
@@ -8937,6 +8898,7 @@
           <a:p>
             <a:fld id="{3BDB8791-F1B0-41E7-B7FD-A781E65C4266}" type="datetimeFigureOut">
               <a:rPr lang="en-US" dirty="0"/>
+              <a:t>6/6/2019</a:t>
             </a:fld>
             <a:endParaRPr lang="en-US" dirty="0"/>
           </a:p>
@@ -8962,7 +8924,6 @@
               <a:t>
               </a:t>
             </a:r>
-            <a:endParaRPr lang="en-US" dirty="0"/>
           </a:p>
         </p:txBody>
       </p:sp>
@@ -8983,6 +8944,7 @@
           <a:p>
             <a:fld id="{D57F1E4F-1CFF-5643-939E-217C01CDF565}" type="slidenum">
               <a:rPr lang="en-US" dirty="0"/>
+              <a:t>‹#›</a:t>
             </a:fld>
             <a:endParaRPr lang="en-US" dirty="0"/>
           </a:p>
@@ -9033,7 +8995,7 @@
           </a:lstStyle>
           <a:p>
             <a:r>
-              <a:rPr lang="en-US" smtClean="0"/>
+              <a:rPr lang="en-US"/>
               <a:t>Click to edit Master title style</a:t>
             </a:r>
             <a:endParaRPr lang="en-US" dirty="0"/>
@@ -9105,10 +9067,9 @@
           <a:p>
             <a:pPr lvl="0"/>
             <a:r>
-              <a:rPr lang="en-US" smtClean="0"/>
+              <a:rPr lang="en-US"/>
               <a:t>Edit Master text styles</a:t>
             </a:r>
-            <a:endParaRPr lang="en-US" smtClean="0"/>
           </a:p>
         </p:txBody>
       </p:sp>
@@ -9136,39 +9097,35 @@
           <a:p>
             <a:pPr lvl="0"/>
             <a:r>
-              <a:rPr lang="en-US" smtClean="0"/>
+              <a:rPr lang="en-US"/>
               <a:t>Edit Master text styles</a:t>
             </a:r>
-            <a:endParaRPr lang="en-US" smtClean="0"/>
           </a:p>
           <a:p>
             <a:pPr lvl="1"/>
             <a:r>
-              <a:rPr lang="en-US" smtClean="0"/>
+              <a:rPr lang="en-US"/>
               <a:t>Second level</a:t>
             </a:r>
-            <a:endParaRPr lang="en-US" smtClean="0"/>
           </a:p>
           <a:p>
             <a:pPr lvl="2"/>
             <a:r>
-              <a:rPr lang="en-US" smtClean="0"/>
+              <a:rPr lang="en-US"/>
               <a:t>Third level</a:t>
             </a:r>
-            <a:endParaRPr lang="en-US" smtClean="0"/>
           </a:p>
           <a:p>
             <a:pPr lvl="3"/>
             <a:r>
-              <a:rPr lang="en-US" smtClean="0"/>
+              <a:rPr lang="en-US"/>
               <a:t>Fourth level</a:t>
             </a:r>
-            <a:endParaRPr lang="en-US" smtClean="0"/>
           </a:p>
           <a:p>
             <a:pPr lvl="4"/>
             <a:r>
-              <a:rPr lang="en-US" smtClean="0"/>
+              <a:rPr lang="en-US"/>
               <a:t>Fifth level</a:t>
             </a:r>
             <a:endParaRPr lang="en-US" dirty="0"/>
@@ -9240,10 +9197,9 @@
           <a:p>
             <a:pPr lvl="0"/>
             <a:r>
-              <a:rPr lang="en-US" smtClean="0"/>
+              <a:rPr lang="en-US"/>
               <a:t>Edit Master text styles</a:t>
             </a:r>
-            <a:endParaRPr lang="en-US" smtClean="0"/>
           </a:p>
         </p:txBody>
       </p:sp>
@@ -9299,39 +9255,35 @@
           <a:p>
             <a:pPr lvl="0"/>
             <a:r>
-              <a:rPr lang="en-US" smtClean="0"/>
+              <a:rPr lang="en-US"/>
               <a:t>Edit Master text styles</a:t>
             </a:r>
-            <a:endParaRPr lang="en-US" smtClean="0"/>
           </a:p>
           <a:p>
             <a:pPr lvl="1"/>
             <a:r>
-              <a:rPr lang="en-US" smtClean="0"/>
+              <a:rPr lang="en-US"/>
               <a:t>Second level</a:t>
             </a:r>
-            <a:endParaRPr lang="en-US" smtClean="0"/>
           </a:p>
           <a:p>
             <a:pPr lvl="2"/>
             <a:r>
-              <a:rPr lang="en-US" smtClean="0"/>
+              <a:rPr lang="en-US"/>
               <a:t>Third level</a:t>
             </a:r>
-            <a:endParaRPr lang="en-US" smtClean="0"/>
           </a:p>
           <a:p>
             <a:pPr lvl="3"/>
             <a:r>
-              <a:rPr lang="en-US" smtClean="0"/>
+              <a:rPr lang="en-US"/>
               <a:t>Fourth level</a:t>
             </a:r>
-            <a:endParaRPr lang="en-US" smtClean="0"/>
           </a:p>
           <a:p>
             <a:pPr lvl="4"/>
             <a:r>
-              <a:rPr lang="en-US" smtClean="0"/>
+              <a:rPr lang="en-US"/>
               <a:t>Fifth level</a:t>
             </a:r>
             <a:endParaRPr lang="en-US" dirty="0"/>
@@ -9355,6 +9307,7 @@
           <a:p>
             <a:fld id="{5FDD63B2-E120-4ED8-B27B-C685F510A5FE}" type="datetimeFigureOut">
               <a:rPr lang="en-US" dirty="0"/>
+              <a:t>6/6/2019</a:t>
             </a:fld>
             <a:endParaRPr lang="en-US" dirty="0"/>
           </a:p>
@@ -9380,7 +9333,6 @@
               <a:t>
               </a:t>
             </a:r>
-            <a:endParaRPr lang="en-US" dirty="0"/>
           </a:p>
         </p:txBody>
       </p:sp>
@@ -9401,6 +9353,7 @@
           <a:p>
             <a:fld id="{D57F1E4F-1CFF-5643-939E-217C01CDF565}" type="slidenum">
               <a:rPr lang="en-US" dirty="0"/>
+              <a:t>‹#›</a:t>
             </a:fld>
             <a:endParaRPr lang="en-US" dirty="0"/>
           </a:p>
@@ -9456,7 +9409,7 @@
           </a:lstStyle>
           <a:p>
             <a:r>
-              <a:rPr lang="en-US" smtClean="0"/>
+              <a:rPr lang="en-US"/>
               <a:t>Click to edit Master title style</a:t>
             </a:r>
             <a:endParaRPr lang="en-US" dirty="0"/>
@@ -9480,6 +9433,7 @@
           <a:p>
             <a:fld id="{7AA18ACC-A947-437B-A130-35BD54FDF1E9}" type="datetimeFigureOut">
               <a:rPr lang="en-US" dirty="0"/>
+              <a:t>6/6/2019</a:t>
             </a:fld>
             <a:endParaRPr lang="en-US" dirty="0"/>
           </a:p>
@@ -9505,7 +9459,6 @@
               <a:t>
               </a:t>
             </a:r>
-            <a:endParaRPr lang="en-US" dirty="0"/>
           </a:p>
         </p:txBody>
       </p:sp>
@@ -9526,6 +9479,7 @@
           <a:p>
             <a:fld id="{D57F1E4F-1CFF-5643-939E-217C01CDF565}" type="slidenum">
               <a:rPr lang="en-US" dirty="0"/>
+              <a:t>‹#›</a:t>
             </a:fld>
             <a:endParaRPr lang="en-US" dirty="0"/>
           </a:p>
@@ -9540,7 +9494,7 @@
 </file>
 
 <file path=ppt/slideLayouts/slideLayout7.xml><?xml version="1.0" encoding="utf-8"?>
-<p:sldLayout xmlns:a="http://schemas.openxmlformats.org/drawingml/2006/main" xmlns:r="http://schemas.openxmlformats.org/officeDocument/2006/relationships" xmlns:p="http://schemas.openxmlformats.org/presentationml/2006/main" type="blank" preserve="1" showMasterSp="0">
+<p:sldLayout xmlns:a="http://schemas.openxmlformats.org/drawingml/2006/main" xmlns:r="http://schemas.openxmlformats.org/officeDocument/2006/relationships" xmlns:p="http://schemas.openxmlformats.org/presentationml/2006/main" showMasterSp="0" type="blank" preserve="1">
   <p:cSld name="Blank">
     <p:spTree>
       <p:nvGrpSpPr>
@@ -9573,6 +9527,7 @@
           <a:p>
             <a:fld id="{7C8D7E02-BCB8-4D50-A234-369438C08659}" type="datetimeFigureOut">
               <a:rPr lang="en-US" dirty="0"/>
+              <a:t>6/6/2019</a:t>
             </a:fld>
             <a:endParaRPr lang="en-US" dirty="0"/>
           </a:p>
@@ -9598,7 +9553,6 @@
               <a:t>
               </a:t>
             </a:r>
-            <a:endParaRPr lang="en-US" dirty="0"/>
           </a:p>
         </p:txBody>
       </p:sp>
@@ -9655,6 +9609,7 @@
           <a:p>
             <a:fld id="{D57F1E4F-1CFF-5643-939E-217C01CDF565}" type="slidenum">
               <a:rPr lang="en-US" dirty="0"/>
+              <a:t>‹#›</a:t>
             </a:fld>
             <a:endParaRPr lang="en-US" dirty="0"/>
           </a:p>
@@ -9669,7 +9624,7 @@
 </file>
 
 <file path=ppt/slideLayouts/slideLayout8.xml><?xml version="1.0" encoding="utf-8"?>
-<p:sldLayout xmlns:a="http://schemas.openxmlformats.org/drawingml/2006/main" xmlns:r="http://schemas.openxmlformats.org/officeDocument/2006/relationships" xmlns:p="http://schemas.openxmlformats.org/presentationml/2006/main" type="objTx" preserve="1" showMasterSp="0">
+<p:sldLayout xmlns:a="http://schemas.openxmlformats.org/drawingml/2006/main" xmlns:r="http://schemas.openxmlformats.org/officeDocument/2006/relationships" xmlns:p="http://schemas.openxmlformats.org/presentationml/2006/main" showMasterSp="0" type="objTx" preserve="1">
   <p:cSld name="Content with Caption">
     <p:spTree>
       <p:nvGrpSpPr>
@@ -10497,7 +10452,7 @@
           </a:lstStyle>
           <a:p>
             <a:r>
-              <a:rPr lang="en-US" smtClean="0"/>
+              <a:rPr lang="en-US"/>
               <a:t>Click to edit Master title style</a:t>
             </a:r>
             <a:endParaRPr lang="en-US" dirty="0"/>
@@ -10528,39 +10483,35 @@
           <a:p>
             <a:pPr lvl="0"/>
             <a:r>
-              <a:rPr lang="en-US" smtClean="0"/>
+              <a:rPr lang="en-US"/>
               <a:t>Edit Master text styles</a:t>
             </a:r>
-            <a:endParaRPr lang="en-US" smtClean="0"/>
           </a:p>
           <a:p>
             <a:pPr lvl="1"/>
             <a:r>
-              <a:rPr lang="en-US" smtClean="0"/>
+              <a:rPr lang="en-US"/>
               <a:t>Second level</a:t>
             </a:r>
-            <a:endParaRPr lang="en-US" smtClean="0"/>
           </a:p>
           <a:p>
             <a:pPr lvl="2"/>
             <a:r>
-              <a:rPr lang="en-US" smtClean="0"/>
+              <a:rPr lang="en-US"/>
               <a:t>Third level</a:t>
             </a:r>
-            <a:endParaRPr lang="en-US" smtClean="0"/>
           </a:p>
           <a:p>
             <a:pPr lvl="3"/>
             <a:r>
-              <a:rPr lang="en-US" smtClean="0"/>
+              <a:rPr lang="en-US"/>
               <a:t>Fourth level</a:t>
             </a:r>
-            <a:endParaRPr lang="en-US" smtClean="0"/>
           </a:p>
           <a:p>
             <a:pPr lvl="4"/>
             <a:r>
-              <a:rPr lang="en-US" smtClean="0"/>
+              <a:rPr lang="en-US"/>
               <a:t>Fifth level</a:t>
             </a:r>
             <a:endParaRPr lang="en-US" dirty="0"/>
@@ -10633,10 +10584,9 @@
           <a:p>
             <a:pPr lvl="0"/>
             <a:r>
-              <a:rPr lang="en-US" smtClean="0"/>
+              <a:rPr lang="en-US"/>
               <a:t>Edit Master text styles</a:t>
             </a:r>
-            <a:endParaRPr lang="en-US" smtClean="0"/>
           </a:p>
         </p:txBody>
       </p:sp>
@@ -10657,6 +10607,7 @@
           <a:p>
             <a:fld id="{76E86A4C-8E40-4F87-A4F0-01A0687C5742}" type="datetimeFigureOut">
               <a:rPr lang="en-US" dirty="0"/>
+              <a:t>6/6/2019</a:t>
             </a:fld>
             <a:endParaRPr lang="en-US" dirty="0"/>
           </a:p>
@@ -10682,7 +10633,6 @@
               <a:t>
               </a:t>
             </a:r>
-            <a:endParaRPr lang="en-US" dirty="0"/>
           </a:p>
         </p:txBody>
       </p:sp>
@@ -10739,6 +10689,7 @@
           <a:p>
             <a:fld id="{D57F1E4F-1CFF-5643-939E-217C01CDF565}" type="slidenum">
               <a:rPr lang="en-US" dirty="0"/>
+              <a:t>‹#›</a:t>
             </a:fld>
             <a:endParaRPr lang="en-US" dirty="0"/>
           </a:p>
@@ -10753,7 +10704,7 @@
 </file>
 
 <file path=ppt/slideLayouts/slideLayout9.xml><?xml version="1.0" encoding="utf-8"?>
-<p:sldLayout xmlns:a="http://schemas.openxmlformats.org/drawingml/2006/main" xmlns:r="http://schemas.openxmlformats.org/officeDocument/2006/relationships" xmlns:p="http://schemas.openxmlformats.org/presentationml/2006/main" type="picTx" preserve="1" showMasterSp="0">
+<p:sldLayout xmlns:a="http://schemas.openxmlformats.org/drawingml/2006/main" xmlns:r="http://schemas.openxmlformats.org/officeDocument/2006/relationships" xmlns:p="http://schemas.openxmlformats.org/presentationml/2006/main" showMasterSp="0" type="picTx" preserve="1">
   <p:cSld name="Picture with Caption">
     <p:spTree>
       <p:nvGrpSpPr>
@@ -11583,7 +11534,7 @@
           </a:lstStyle>
           <a:p>
             <a:r>
-              <a:rPr lang="en-US" smtClean="0"/>
+              <a:rPr lang="en-US"/>
               <a:t>Click to edit Master title style</a:t>
             </a:r>
             <a:endParaRPr lang="en-US" dirty="0"/>
@@ -11665,7 +11616,7 @@
               <a:buNone/>
             </a:pPr>
             <a:r>
-              <a:rPr lang="en-US" smtClean="0"/>
+              <a:rPr lang="en-US"/>
               <a:t>Click icon to add picture</a:t>
             </a:r>
             <a:endParaRPr lang="en-US" dirty="0"/>
@@ -11740,10 +11691,9 @@
           <a:p>
             <a:pPr lvl="0"/>
             <a:r>
-              <a:rPr lang="en-US" smtClean="0"/>
+              <a:rPr lang="en-US"/>
               <a:t>Edit Master text styles</a:t>
             </a:r>
-            <a:endParaRPr lang="en-US" smtClean="0"/>
           </a:p>
         </p:txBody>
       </p:sp>
@@ -11764,6 +11714,7 @@
           <a:p>
             <a:fld id="{35E72C73-2D91-4E12-BA25-F0AA0C03599B}" type="datetimeFigureOut">
               <a:rPr lang="en-US" dirty="0"/>
+              <a:t>6/6/2019</a:t>
             </a:fld>
             <a:endParaRPr lang="en-US" dirty="0"/>
           </a:p>
@@ -11789,7 +11740,6 @@
               <a:t>
               </a:t>
             </a:r>
-            <a:endParaRPr lang="en-US" dirty="0"/>
           </a:p>
         </p:txBody>
       </p:sp>
@@ -11846,6 +11796,7 @@
           <a:p>
             <a:fld id="{D57F1E4F-1CFF-5643-939E-217C01CDF565}" type="slidenum">
               <a:rPr lang="en-US" dirty="0"/>
+              <a:t>‹#›</a:t>
             </a:fld>
             <a:endParaRPr lang="en-US" dirty="0"/>
           </a:p>
@@ -11910,7 +11861,7 @@
               <a:avLst/>
             </a:prstGeom>
             <a:blipFill>
-              <a:blip r:embed="rId18">
+              <a:blip r:embed="rId19">
                 <a:duotone>
                   <a:schemeClr val="dk2">
                     <a:shade val="69000"/>
@@ -12657,7 +12608,7 @@
           <a:lstStyle/>
           <a:p>
             <a:r>
-              <a:rPr lang="en-US" smtClean="0"/>
+              <a:rPr lang="en-US"/>
               <a:t>Click to edit Master title style</a:t>
             </a:r>
             <a:endParaRPr lang="en-US" dirty="0"/>
@@ -12691,39 +12642,35 @@
           <a:p>
             <a:pPr lvl="0"/>
             <a:r>
-              <a:rPr lang="en-US" smtClean="0"/>
+              <a:rPr lang="en-US"/>
               <a:t>Edit Master text styles</a:t>
             </a:r>
-            <a:endParaRPr lang="en-US" smtClean="0"/>
           </a:p>
           <a:p>
             <a:pPr lvl="1"/>
             <a:r>
-              <a:rPr lang="en-US" smtClean="0"/>
+              <a:rPr lang="en-US"/>
               <a:t>Second level</a:t>
             </a:r>
-            <a:endParaRPr lang="en-US" smtClean="0"/>
           </a:p>
           <a:p>
             <a:pPr lvl="2"/>
             <a:r>
-              <a:rPr lang="en-US" smtClean="0"/>
+              <a:rPr lang="en-US"/>
               <a:t>Third level</a:t>
             </a:r>
-            <a:endParaRPr lang="en-US" smtClean="0"/>
           </a:p>
           <a:p>
             <a:pPr lvl="3"/>
             <a:r>
-              <a:rPr lang="en-US" smtClean="0"/>
+              <a:rPr lang="en-US"/>
               <a:t>Fourth level</a:t>
             </a:r>
-            <a:endParaRPr lang="en-US" smtClean="0"/>
           </a:p>
           <a:p>
             <a:pPr lvl="4"/>
             <a:r>
-              <a:rPr lang="en-US" smtClean="0"/>
+              <a:rPr lang="en-US"/>
               <a:t>Fifth level</a:t>
             </a:r>
             <a:endParaRPr lang="en-US" dirty="0"/>
@@ -12763,6 +12710,7 @@
           <a:p>
             <a:fld id="{2BE451C3-0FF4-47C4-B829-773ADF60F88C}" type="datetimeFigureOut">
               <a:rPr lang="en-US" dirty="0"/>
+              <a:t>6/6/2019</a:t>
             </a:fld>
             <a:endParaRPr lang="en-US" dirty="0"/>
           </a:p>
@@ -12804,7 +12752,6 @@
               <a:t>
               </a:t>
             </a:r>
-            <a:endParaRPr lang="en-US" dirty="0"/>
           </a:p>
         </p:txBody>
       </p:sp>
@@ -12877,6 +12824,7 @@
           <a:p>
             <a:fld id="{D57F1E4F-1CFF-5643-939E-217C01CDF565}" type="slidenum">
               <a:rPr lang="en-US" dirty="0"/>
+              <a:t>‹#›</a:t>
             </a:fld>
             <a:endParaRPr lang="en-US" dirty="0"/>
           </a:p>
@@ -13342,7 +13290,7 @@
           <a:lstStyle/>
           <a:p>
             <a:r>
-              <a:rPr lang="en-US" sz="8000" b="1" dirty="0" smtClean="0"/>
+              <a:rPr lang="en-US" sz="8000" b="1" dirty="0"/>
               <a:t>GROUP PROJECT</a:t>
             </a:r>
             <a:br>
@@ -13350,40 +13298,35 @@
             </a:br>
             <a:r>
               <a:rPr lang="en-US" sz="3200" b="1" dirty="0"/>
-              <a:t>C</a:t>
+              <a:t>Course</a:t>
             </a:r>
             <a:r>
-              <a:rPr lang="en-US" sz="3200" b="1" dirty="0" smtClean="0"/>
-              <a:t>ourse</a:t>
-            </a:r>
-            <a:r>
-              <a:rPr lang="en-US" sz="3200" dirty="0" smtClean="0"/>
+              <a:rPr lang="en-US" sz="3200" dirty="0"/>
               <a:t>: Data Structures &amp; Algorithms</a:t>
             </a:r>
             <a:br>
-              <a:rPr lang="en-US" sz="3200" dirty="0" smtClean="0"/>
+              <a:rPr lang="en-US" sz="3200" dirty="0"/>
             </a:br>
             <a:r>
-              <a:rPr lang="en-US" sz="3200" dirty="0" smtClean="0"/>
+              <a:rPr lang="en-US" sz="3200" dirty="0"/>
               <a:t>				</a:t>
             </a:r>
             <a:r>
-              <a:rPr lang="en-US" sz="3200" dirty="0" err="1" smtClean="0"/>
+              <a:rPr lang="en-US" sz="3200" dirty="0" err="1"/>
               <a:t>Dr</a:t>
             </a:r>
             <a:r>
-              <a:rPr lang="en-US" sz="3200" dirty="0" smtClean="0"/>
+              <a:rPr lang="en-US" sz="3200" dirty="0"/>
               <a:t>: Tran </a:t>
             </a:r>
             <a:r>
-              <a:rPr lang="en-US" sz="3200" dirty="0" err="1" smtClean="0"/>
+              <a:rPr lang="en-US" sz="3200" dirty="0" err="1"/>
               <a:t>Thanh</a:t>
             </a:r>
             <a:r>
-              <a:rPr lang="en-US" sz="3200" dirty="0" smtClean="0"/>
+              <a:rPr lang="en-US" sz="3200" dirty="0"/>
               <a:t> Tung</a:t>
             </a:r>
-            <a:endParaRPr lang="en-US" sz="3200" dirty="0"/>
           </a:p>
         </p:txBody>
       </p:sp>
@@ -13410,7 +13353,7 @@
           <a:lstStyle/>
           <a:p>
             <a:r>
-              <a:rPr lang="en-US" sz="2400" dirty="0" smtClean="0">
+              <a:rPr lang="en-US" sz="2400" dirty="0">
                 <a:solidFill>
                   <a:schemeClr val="bg1">
                     <a:lumMod val="95000"/>
@@ -13419,7 +13362,101 @@
               </a:rPr>
               <a:t>Member:</a:t>
             </a:r>
-            <a:endParaRPr lang="en-US" sz="2400" dirty="0" smtClean="0">
+          </a:p>
+          <a:p>
+            <a:r>
+              <a:rPr lang="en-US" sz="2400" dirty="0" err="1">
+                <a:solidFill>
+                  <a:schemeClr val="bg1">
+                    <a:lumMod val="95000"/>
+                  </a:schemeClr>
+                </a:solidFill>
+              </a:rPr>
+              <a:t>mai</a:t>
+            </a:r>
+            <a:r>
+              <a:rPr lang="en-US" sz="2400" dirty="0">
+                <a:solidFill>
+                  <a:schemeClr val="bg1">
+                    <a:lumMod val="95000"/>
+                  </a:schemeClr>
+                </a:solidFill>
+              </a:rPr>
+              <a:t> </a:t>
+            </a:r>
+            <a:r>
+              <a:rPr lang="en-US" sz="2400" dirty="0" err="1">
+                <a:solidFill>
+                  <a:schemeClr val="bg1">
+                    <a:lumMod val="95000"/>
+                  </a:schemeClr>
+                </a:solidFill>
+              </a:rPr>
+              <a:t>hoàng</a:t>
+            </a:r>
+            <a:r>
+              <a:rPr lang="en-US" sz="2400" dirty="0">
+                <a:solidFill>
+                  <a:schemeClr val="bg1">
+                    <a:lumMod val="95000"/>
+                  </a:schemeClr>
+                </a:solidFill>
+              </a:rPr>
+              <a:t> long	</a:t>
+            </a:r>
+          </a:p>
+          <a:p>
+            <a:r>
+              <a:rPr lang="en-US" sz="2400" dirty="0" err="1">
+                <a:solidFill>
+                  <a:schemeClr val="bg1">
+                    <a:lumMod val="95000"/>
+                  </a:schemeClr>
+                </a:solidFill>
+              </a:rPr>
+              <a:t>đặng</a:t>
+            </a:r>
+            <a:r>
+              <a:rPr lang="en-US" sz="2400" dirty="0">
+                <a:solidFill>
+                  <a:schemeClr val="bg1">
+                    <a:lumMod val="95000"/>
+                  </a:schemeClr>
+                </a:solidFill>
+              </a:rPr>
+              <a:t> </a:t>
+            </a:r>
+            <a:r>
+              <a:rPr lang="en-US" sz="2400" dirty="0" err="1">
+                <a:solidFill>
+                  <a:schemeClr val="bg1">
+                    <a:lumMod val="95000"/>
+                  </a:schemeClr>
+                </a:solidFill>
+              </a:rPr>
+              <a:t>quốc</a:t>
+            </a:r>
+            <a:r>
+              <a:rPr lang="en-US" sz="2400" dirty="0">
+                <a:solidFill>
+                  <a:schemeClr val="bg1">
+                    <a:lumMod val="95000"/>
+                  </a:schemeClr>
+                </a:solidFill>
+              </a:rPr>
+              <a:t> </a:t>
+            </a:r>
+            <a:r>
+              <a:rPr lang="en-US" sz="2400" dirty="0" err="1">
+                <a:solidFill>
+                  <a:schemeClr val="bg1">
+                    <a:lumMod val="95000"/>
+                  </a:schemeClr>
+                </a:solidFill>
+              </a:rPr>
+              <a:t>cường</a:t>
+            </a:r>
+            <a:endParaRPr lang="en-US" sz="2400" dirty="0">
               <a:solidFill>
                 <a:schemeClr val="bg1">
                   <a:lumMod val="95000"/>
@@ -13429,27 +13466,17 @@
           </a:p>
           <a:p>
             <a:r>
-              <a:rPr lang="en-US" sz="2400" dirty="0" smtClean="0">
+              <a:rPr lang="en-US" sz="2400" dirty="0" err="1">
                 <a:solidFill>
                   <a:schemeClr val="bg1">
                     <a:lumMod val="95000"/>
                   </a:schemeClr>
                 </a:solidFill>
               </a:rPr>
-              <a:t>	</a:t>
+              <a:t>nguyễn</a:t>
             </a:r>
             <a:r>
-              <a:rPr lang="en-US" sz="2400" dirty="0" err="1" smtClean="0">
-                <a:solidFill>
-                  <a:schemeClr val="bg1">
-                    <a:lumMod val="95000"/>
-                  </a:schemeClr>
-                </a:solidFill>
-              </a:rPr>
-              <a:t>đặng</a:t>
-            </a:r>
-            <a:r>
-              <a:rPr lang="en-US" sz="2400" dirty="0" smtClean="0">
+              <a:rPr lang="en-US" sz="2400" dirty="0">
                 <a:solidFill>
                   <a:schemeClr val="bg1">
                     <a:lumMod val="95000"/>
@@ -13459,36 +13486,16 @@
               <a:t> </a:t>
             </a:r>
             <a:r>
-              <a:rPr lang="en-US" sz="2400" dirty="0" err="1" smtClean="0">
+              <a:rPr lang="en-US" sz="2400" dirty="0" err="1">
                 <a:solidFill>
                   <a:schemeClr val="bg1">
                     <a:lumMod val="95000"/>
                   </a:schemeClr>
                 </a:solidFill>
               </a:rPr>
-              <a:t>quốc</a:t>
+              <a:t>lộc</a:t>
             </a:r>
-            <a:r>
-              <a:rPr lang="en-US" sz="2400" dirty="0" smtClean="0">
-                <a:solidFill>
-                  <a:schemeClr val="bg1">
-                    <a:lumMod val="95000"/>
-                  </a:schemeClr>
-                </a:solidFill>
-              </a:rPr>
-              <a:t> </a:t>
-            </a:r>
-            <a:r>
-              <a:rPr lang="en-US" sz="2400" dirty="0" err="1" smtClean="0">
-                <a:solidFill>
-                  <a:schemeClr val="bg1">
-                    <a:lumMod val="95000"/>
-                  </a:schemeClr>
-                </a:solidFill>
-              </a:rPr>
-              <a:t>cường</a:t>
-            </a:r>
-            <a:endParaRPr lang="en-US" sz="2400" dirty="0" smtClean="0">
+            <a:endParaRPr lang="en-US" sz="2400" dirty="0">
               <a:solidFill>
                 <a:schemeClr val="bg1">
                   <a:lumMod val="95000"/>
@@ -13498,27 +13505,17 @@
           </a:p>
           <a:p>
             <a:r>
-              <a:rPr lang="en-US" sz="2400" dirty="0" smtClean="0">
+              <a:rPr lang="en-US" sz="2400" dirty="0" err="1">
                 <a:solidFill>
                   <a:schemeClr val="bg1">
                     <a:lumMod val="95000"/>
                   </a:schemeClr>
                 </a:solidFill>
               </a:rPr>
-              <a:t>	</a:t>
+              <a:t>nguyễn</a:t>
             </a:r>
             <a:r>
-              <a:rPr lang="en-US" sz="2400" dirty="0" err="1" smtClean="0">
-                <a:solidFill>
-                  <a:schemeClr val="bg1">
-                    <a:lumMod val="95000"/>
-                  </a:schemeClr>
-                </a:solidFill>
-              </a:rPr>
-              <a:t>mai</a:t>
-            </a:r>
-            <a:r>
-              <a:rPr lang="en-US" sz="2400" dirty="0" smtClean="0">
+              <a:rPr lang="en-US" sz="2400" dirty="0">
                 <a:solidFill>
                   <a:schemeClr val="bg1">
                     <a:lumMod val="95000"/>
@@ -13528,56 +13525,17 @@
               <a:t> </a:t>
             </a:r>
             <a:r>
-              <a:rPr lang="en-US" sz="2400" dirty="0" err="1" smtClean="0">
+              <a:rPr lang="en-US" sz="2400" dirty="0" err="1">
                 <a:solidFill>
                   <a:schemeClr val="bg1">
                     <a:lumMod val="95000"/>
                   </a:schemeClr>
                 </a:solidFill>
               </a:rPr>
-              <a:t>hoàng</a:t>
+              <a:t>tiến</a:t>
             </a:r>
             <a:r>
-              <a:rPr lang="en-US" sz="2400" dirty="0" smtClean="0">
-                <a:solidFill>
-                  <a:schemeClr val="bg1">
-                    <a:lumMod val="95000"/>
-                  </a:schemeClr>
-                </a:solidFill>
-              </a:rPr>
-              <a:t> long</a:t>
-            </a:r>
-            <a:endParaRPr lang="en-US" sz="2400" dirty="0" smtClean="0">
-              <a:solidFill>
-                <a:schemeClr val="bg1">
-                  <a:lumMod val="95000"/>
-                </a:schemeClr>
-              </a:solidFill>
-            </a:endParaRPr>
-          </a:p>
-          <a:p>
-            <a:r>
-              <a:rPr lang="en-US" sz="2400" dirty="0" smtClean="0">
-                <a:solidFill>
-                  <a:schemeClr val="bg1">
-                    <a:lumMod val="95000"/>
-                  </a:schemeClr>
-                </a:solidFill>
-              </a:rPr>
-              <a:t>	</a:t>
-            </a:r>
-            <a:r>
-              <a:rPr lang="en-US" sz="2400" dirty="0" err="1" smtClean="0">
-                <a:solidFill>
-                  <a:schemeClr val="bg1">
-                    <a:lumMod val="95000"/>
-                  </a:schemeClr>
-                </a:solidFill>
-              </a:rPr>
-              <a:t>nguyễn</a:t>
-            </a:r>
-            <a:r>
-              <a:rPr lang="en-US" sz="2400" dirty="0" smtClean="0">
+              <a:rPr lang="en-US" sz="2400" dirty="0">
                 <a:solidFill>
                   <a:schemeClr val="bg1">
                     <a:lumMod val="95000"/>
@@ -13587,76 +13545,7 @@
               <a:t> </a:t>
             </a:r>
             <a:r>
-              <a:rPr lang="en-US" sz="2400" dirty="0" err="1" smtClean="0">
-                <a:solidFill>
-                  <a:schemeClr val="bg1">
-                    <a:lumMod val="95000"/>
-                  </a:schemeClr>
-                </a:solidFill>
-              </a:rPr>
-              <a:t>lộc</a:t>
-            </a:r>
-            <a:endParaRPr lang="en-US" sz="2400" dirty="0" smtClean="0">
-              <a:solidFill>
-                <a:schemeClr val="bg1">
-                  <a:lumMod val="95000"/>
-                </a:schemeClr>
-              </a:solidFill>
-            </a:endParaRPr>
-          </a:p>
-          <a:p>
-            <a:r>
-              <a:rPr lang="en-US" sz="2400" dirty="0" smtClean="0">
-                <a:solidFill>
-                  <a:schemeClr val="bg1">
-                    <a:lumMod val="95000"/>
-                  </a:schemeClr>
-                </a:solidFill>
-              </a:rPr>
-              <a:t>	</a:t>
-            </a:r>
-            <a:r>
-              <a:rPr lang="en-US" sz="2400" dirty="0" err="1" smtClean="0">
-                <a:solidFill>
-                  <a:schemeClr val="bg1">
-                    <a:lumMod val="95000"/>
-                  </a:schemeClr>
-                </a:solidFill>
-              </a:rPr>
-              <a:t>nguyễn</a:t>
-            </a:r>
-            <a:r>
-              <a:rPr lang="en-US" sz="2400" dirty="0" smtClean="0">
-                <a:solidFill>
-                  <a:schemeClr val="bg1">
-                    <a:lumMod val="95000"/>
-                  </a:schemeClr>
-                </a:solidFill>
-              </a:rPr>
-              <a:t> </a:t>
-            </a:r>
-            <a:r>
-              <a:rPr lang="en-US" sz="2400" dirty="0" err="1" smtClean="0">
-                <a:solidFill>
-                  <a:schemeClr val="bg1">
-                    <a:lumMod val="95000"/>
-                  </a:schemeClr>
-                </a:solidFill>
-              </a:rPr>
-              <a:t>tiến</a:t>
-            </a:r>
-            <a:r>
-              <a:rPr lang="en-US" sz="2400" dirty="0" smtClean="0">
-                <a:solidFill>
-                  <a:schemeClr val="bg1">
-                    <a:lumMod val="95000"/>
-                  </a:schemeClr>
-                </a:solidFill>
-              </a:rPr>
-              <a:t> </a:t>
-            </a:r>
-            <a:r>
-              <a:rPr lang="en-US" sz="2400" dirty="0" err="1" smtClean="0">
+              <a:rPr lang="en-US" sz="2400" dirty="0" err="1">
                 <a:solidFill>
                   <a:schemeClr val="bg1">
                     <a:lumMod val="95000"/>
@@ -13665,7 +13554,7 @@
               </a:rPr>
               <a:t>dũng</a:t>
             </a:r>
-            <a:endParaRPr lang="en-US" sz="2400" dirty="0" smtClean="0">
+            <a:endParaRPr lang="en-US" sz="2400" dirty="0">
               <a:solidFill>
                 <a:schemeClr val="bg1">
                   <a:lumMod val="95000"/>
@@ -14262,10 +14151,9 @@
           <a:lstStyle/>
           <a:p>
             <a:r>
-              <a:rPr lang="en-US" sz="9600" b="1" dirty="0" smtClean="0"/>
+              <a:rPr lang="en-US" sz="9600" b="1" dirty="0"/>
               <a:t>GAME</a:t>
             </a:r>
-            <a:endParaRPr lang="en-US" sz="9600" b="1" dirty="0"/>
           </a:p>
         </p:txBody>
       </p:sp>
@@ -14280,7 +14168,7 @@
           </p:nvPr>
         </p:nvPicPr>
         <p:blipFill>
-          <a:blip r:embed="rId1">
+          <a:blip r:embed="rId2">
             <a:extLst>
               <a:ext uri="{28A0092B-C50C-407E-A947-70E740481C1C}">
                 <a14:useLocalDpi xmlns:a14="http://schemas.microsoft.com/office/drawing/2010/main" val="0"/>
@@ -14303,13 +14191,13 @@
   <p:clrMapOvr>
     <a:masterClrMapping/>
   </p:clrMapOvr>
-  <mc:AlternateContent xmlns:mc="http://schemas.openxmlformats.org/markup-compatibility/2006">
-    <mc:Choice xmlns:p14="http://schemas.microsoft.com/office/powerpoint/2010/main" Requires="p14">
+  <mc:AlternateContent xmlns:mc="http://schemas.openxmlformats.org/markup-compatibility/2006" xmlns:p14="http://schemas.microsoft.com/office/powerpoint/2010/main">
+    <mc:Choice Requires="p14">
       <p:transition spd="slow" p14:dur="1500">
         <p:split orient="vert"/>
       </p:transition>
     </mc:Choice>
-    <mc:Fallback>
+    <mc:Fallback xmlns="">
       <p:transition spd="slow">
         <p:split orient="vert"/>
       </p:transition>
@@ -14525,10 +14413,9 @@
           <a:lstStyle/>
           <a:p>
             <a:r>
-              <a:rPr lang="en-US" sz="9600" b="1" dirty="0" smtClean="0"/>
+              <a:rPr lang="en-US" sz="9600" b="1" dirty="0"/>
               <a:t>GAME PLAY </a:t>
             </a:r>
-            <a:endParaRPr lang="en-US" sz="9600" b="1" dirty="0"/>
           </a:p>
         </p:txBody>
       </p:sp>
@@ -14558,103 +14445,45 @@
             </a:r>
             <a:r>
               <a:rPr lang="en-US" dirty="0"/>
-              <a:t> is played on a gray 4×4 grid, with numbered tiles that slide smoothly when a player moves them using the four arrow keys</a:t>
+              <a:t> is played on a gray 4×4 grid, with numbered tiles that slide smoothly when a player moves them using the four arrow keys. Every turn, a new tile will randomly appear in an empty spot on the board with a value of either 2 or 4. Tiles slide as far as possible in the chosen direction until they are stopped by either another tile or the edge of the grid. If two tiles of the same number collide while moving, they will merge into a tile with the total value of the two tiles that collided.</a:t>
             </a:r>
             <a:r>
-              <a:rPr lang="en-US" dirty="0" smtClean="0"/>
-              <a:t>.</a:t>
+              <a:rPr lang="en-US" baseline="30000" dirty="0"/>
+              <a:t>[</a:t>
             </a:r>
             <a:r>
               <a:rPr lang="en-US" dirty="0"/>
-              <a:t> Every turn, a new tile will randomly appear in an empty spot on the board with a value of either 2 or 4</a:t>
+              <a:t>The resulting tile cannot merge with another tile again in the same move. Higher-scoring tiles emit a soft glow.</a:t>
+            </a:r>
+            <a:endParaRPr lang="en-US" baseline="30000" dirty="0"/>
+          </a:p>
+          <a:p>
+            <a:r>
+              <a:rPr lang="en-US" dirty="0"/>
+              <a:t> A scoreboard on the upper-right keeps track of the user's score. The user's score starts at zero, and is incremented whenever two tiles combine, by the value of the new </a:t>
             </a:r>
             <a:r>
-              <a:rPr lang="en-US" dirty="0" smtClean="0"/>
-              <a:t>.</a:t>
+              <a:rPr lang="en-US" dirty="0" err="1"/>
+              <a:t>tile.As</a:t>
             </a:r>
             <a:r>
               <a:rPr lang="en-US" dirty="0"/>
-              <a:t> Tiles slide as far as possible in the chosen direction until they are stopped by either another tile or the edge of the grid. If two tiles of the same number collide while moving, they will merge into a tile with the total value of the two tiles that collided</a:t>
+              <a:t> with many arcade games, the user's best score is shown alongside the current score.</a:t>
+            </a:r>
+          </a:p>
+          <a:p>
+            <a:r>
+              <a:rPr lang="en-US" dirty="0"/>
+              <a:t>The game is won when a tile with a value of 2048 appears on the board, hence the name of the game. After reaching the 2048 tile, players can continue to play (beyond the 2048 tile) to reach higher scores.</a:t>
             </a:r>
             <a:r>
-              <a:rPr lang="en-US" dirty="0" smtClean="0"/>
-              <a:t>.</a:t>
-            </a:r>
-            <a:r>
-              <a:rPr lang="en-US" baseline="30000" dirty="0" smtClean="0"/>
+              <a:rPr lang="en-US" baseline="30000" dirty="0"/>
               <a:t>[</a:t>
             </a:r>
             <a:r>
-              <a:rPr lang="en-US" dirty="0" smtClean="0"/>
-              <a:t>The </a:t>
+              <a:rPr lang="en-US" dirty="0"/>
+              <a:t>When the player has no legal moves (there are no empty spaces and no adjacent tiles with the same value), the game ends.</a:t>
             </a:r>
-            <a:r>
-              <a:rPr lang="en-US" dirty="0"/>
-              <a:t>resulting tile cannot merge with another tile again in the same move. Higher-scoring tiles emit a soft glow</a:t>
-            </a:r>
-            <a:r>
-              <a:rPr lang="en-US" dirty="0" smtClean="0"/>
-              <a:t>.</a:t>
-            </a:r>
-            <a:endParaRPr lang="en-US" baseline="30000" dirty="0"/>
-          </a:p>
-          <a:p>
-            <a:r>
-              <a:rPr lang="en-US" dirty="0" smtClean="0"/>
-              <a:t> </a:t>
-            </a:r>
-            <a:r>
-              <a:rPr lang="en-US" dirty="0"/>
-              <a:t>A scoreboard on the upper-right keeps track of the user's score. The user's score starts at zero, and is incremented whenever two tiles combine, by the value of the new </a:t>
-            </a:r>
-            <a:r>
-              <a:rPr lang="en-US" dirty="0" err="1" smtClean="0"/>
-              <a:t>tile.As</a:t>
-            </a:r>
-            <a:r>
-              <a:rPr lang="en-US" dirty="0" smtClean="0"/>
-              <a:t> </a:t>
-            </a:r>
-            <a:r>
-              <a:rPr lang="en-US" dirty="0"/>
-              <a:t>with many arcade games, the user's best score is shown alongside the </a:t>
-            </a:r>
-            <a:r>
-              <a:rPr lang="en-US" dirty="0" smtClean="0"/>
-              <a:t>current </a:t>
-            </a:r>
-            <a:r>
-              <a:rPr lang="en-US" dirty="0"/>
-              <a:t>score</a:t>
-            </a:r>
-            <a:r>
-              <a:rPr lang="en-US" dirty="0" smtClean="0"/>
-              <a:t>.</a:t>
-            </a:r>
-            <a:endParaRPr lang="en-US" dirty="0" smtClean="0"/>
-          </a:p>
-          <a:p>
-            <a:r>
-              <a:rPr lang="en-US" dirty="0"/>
-              <a:t>The game is won when a tile with a value of 2048 appears on the board, hence the name of the game. After reaching the 2048 tile, players can continue to play (beyond the 2048 tile) to reach higher scores</a:t>
-            </a:r>
-            <a:r>
-              <a:rPr lang="en-US" dirty="0" smtClean="0"/>
-              <a:t>.</a:t>
-            </a:r>
-            <a:r>
-              <a:rPr lang="en-US" baseline="30000" dirty="0" smtClean="0"/>
-              <a:t>[</a:t>
-            </a:r>
-            <a:r>
-              <a:rPr lang="en-US" dirty="0" smtClean="0"/>
-              <a:t>When </a:t>
-            </a:r>
-            <a:r>
-              <a:rPr lang="en-US" dirty="0"/>
-              <a:t>the player has no legal moves (there are no empty spaces and no adjacent tiles with the same value), the game ends.</a:t>
-            </a:r>
-            <a:endParaRPr lang="en-US" dirty="0"/>
           </a:p>
         </p:txBody>
       </p:sp>
@@ -15149,10 +14978,9 @@
           <a:lstStyle/>
           <a:p>
             <a:r>
-              <a:rPr lang="en-US" sz="9600" b="1" dirty="0" smtClean="0"/>
+              <a:rPr lang="en-US" sz="9600" b="1" dirty="0"/>
               <a:t>GAME PLAY </a:t>
             </a:r>
-            <a:endParaRPr lang="en-US" sz="9600" b="1" dirty="0"/>
           </a:p>
         </p:txBody>
       </p:sp>
@@ -15167,7 +14995,7 @@
           </p:nvPr>
         </p:nvPicPr>
         <p:blipFill>
-          <a:blip r:embed="rId1"/>
+          <a:blip r:embed="rId2"/>
           <a:stretch>
             <a:fillRect/>
           </a:stretch>
@@ -15188,7 +15016,7 @@
           <p:nvPr/>
         </p:nvPicPr>
         <p:blipFill>
-          <a:blip r:embed="rId2"/>
+          <a:blip r:embed="rId3"/>
           <a:stretch>
             <a:fillRect/>
           </a:stretch>
@@ -15208,13 +15036,13 @@
   <p:clrMapOvr>
     <a:masterClrMapping/>
   </p:clrMapOvr>
-  <mc:AlternateContent xmlns:mc="http://schemas.openxmlformats.org/markup-compatibility/2006">
-    <mc:Choice xmlns:p14="http://schemas.microsoft.com/office/powerpoint/2010/main" Requires="p14">
+  <mc:AlternateContent xmlns:mc="http://schemas.openxmlformats.org/markup-compatibility/2006" xmlns:p14="http://schemas.microsoft.com/office/powerpoint/2010/main">
+    <mc:Choice Requires="p14">
       <p:transition spd="med" p14:dur="700">
         <p:fade/>
       </p:transition>
     </mc:Choice>
-    <mc:Fallback>
+    <mc:Fallback xmlns="">
       <p:transition spd="med">
         <p:fade/>
       </p:transition>
@@ -15426,10 +15254,23 @@
         <p:cNvGrpSpPr/>
         <p:nvPr/>
       </p:nvGrpSpPr>
-      <p:grpSpPr/>
+      <p:grpSpPr>
+        <a:xfrm>
+          <a:off x="0" y="0"/>
+          <a:ext cx="0" cy="0"/>
+          <a:chOff x="0" y="0"/>
+          <a:chExt cx="0" cy="0"/>
+        </a:xfrm>
+      </p:grpSpPr>
       <p:sp>
         <p:nvSpPr>
-          <p:cNvPr id="2" name="Title 1"/>
+          <p:cNvPr id="2" name="Title 1">
+            <a:extLst>
+              <a:ext uri="{FF2B5EF4-FFF2-40B4-BE49-F238E27FC236}">
+                <a16:creationId xmlns:a16="http://schemas.microsoft.com/office/drawing/2014/main" id="{155B97B0-AB75-47E5-AAA6-692437DE0420}"/>
+              </a:ext>
+            </a:extLst>
+          </p:cNvPr>
           <p:cNvSpPr>
             <a:spLocks noGrp="1"/>
           </p:cNvSpPr>
@@ -15437,46 +15278,573 @@
             <p:ph type="title"/>
           </p:nvPr>
         </p:nvSpPr>
+        <p:spPr/>
+        <p:txBody>
+          <a:bodyPr/>
+          <a:lstStyle/>
+          <a:p>
+            <a:r>
+              <a:rPr lang="en-US" dirty="0"/>
+              <a:t>Design	</a:t>
+            </a:r>
+            <a:endParaRPr lang="en-GB" dirty="0"/>
+          </a:p>
+        </p:txBody>
+      </p:sp>
+      <p:sp>
+        <p:nvSpPr>
+          <p:cNvPr id="4" name="Rectangle 3">
+            <a:extLst>
+              <a:ext uri="{FF2B5EF4-FFF2-40B4-BE49-F238E27FC236}">
+                <a16:creationId xmlns:a16="http://schemas.microsoft.com/office/drawing/2014/main" id="{06F95679-F803-4DF1-9D6A-57565BA5FA15}"/>
+              </a:ext>
+            </a:extLst>
+          </p:cNvPr>
+          <p:cNvSpPr/>
+          <p:nvPr/>
+        </p:nvSpPr>
         <p:spPr>
           <a:xfrm>
-            <a:off x="3426984" y="2563708"/>
-            <a:ext cx="8761413" cy="706964"/>
-          </a:xfrm>
-        </p:spPr>
-        <p:txBody>
-          <a:bodyPr/>
-          <a:p>
-            <a:endParaRPr lang="en-US"/>
-          </a:p>
-        </p:txBody>
-      </p:sp>
-      <p:pic>
-        <p:nvPicPr>
-          <p:cNvPr id="4" name="Content Placeholder 3" descr="Untitled"/>
-          <p:cNvPicPr>
-            <a:picLocks noChangeAspect="1"/>
-          </p:cNvPicPr>
-          <p:nvPr>
-            <p:ph idx="1"/>
-          </p:nvPr>
-        </p:nvPicPr>
-        <p:blipFill>
-          <a:blip r:embed="rId1"/>
-          <a:stretch>
-            <a:fillRect/>
-          </a:stretch>
-        </p:blipFill>
-        <p:spPr>
-          <a:xfrm>
-            <a:off x="1684655" y="2324735"/>
-            <a:ext cx="7751445" cy="4503420"/>
+            <a:off x="1154954" y="2180491"/>
+            <a:ext cx="3249637" cy="4276579"/>
           </a:xfrm>
           <a:prstGeom prst="rect">
             <a:avLst/>
           </a:prstGeom>
         </p:spPr>
-      </p:pic>
+        <p:style>
+          <a:lnRef idx="2">
+            <a:schemeClr val="accent6"/>
+          </a:lnRef>
+          <a:fillRef idx="1">
+            <a:schemeClr val="lt1"/>
+          </a:fillRef>
+          <a:effectRef idx="0">
+            <a:schemeClr val="accent6"/>
+          </a:effectRef>
+          <a:fontRef idx="minor">
+            <a:schemeClr val="dk1"/>
+          </a:fontRef>
+        </p:style>
+        <p:txBody>
+          <a:bodyPr rtlCol="0" anchor="ctr"/>
+          <a:lstStyle/>
+          <a:p>
+            <a:pPr algn="ctr"/>
+            <a:endParaRPr lang="en-GB" dirty="0"/>
+          </a:p>
+        </p:txBody>
+      </p:sp>
+      <p:sp>
+        <p:nvSpPr>
+          <p:cNvPr id="5" name="Rectangle 4">
+            <a:extLst>
+              <a:ext uri="{FF2B5EF4-FFF2-40B4-BE49-F238E27FC236}">
+                <a16:creationId xmlns:a16="http://schemas.microsoft.com/office/drawing/2014/main" id="{6F32E85C-4A43-4A88-9F72-91A87CD3D4E6}"/>
+              </a:ext>
+            </a:extLst>
+          </p:cNvPr>
+          <p:cNvSpPr/>
+          <p:nvPr/>
+        </p:nvSpPr>
+        <p:spPr>
+          <a:xfrm>
+            <a:off x="6496928" y="2180491"/>
+            <a:ext cx="3249637" cy="4276579"/>
+          </a:xfrm>
+          <a:prstGeom prst="rect">
+            <a:avLst/>
+          </a:prstGeom>
+        </p:spPr>
+        <p:style>
+          <a:lnRef idx="2">
+            <a:schemeClr val="accent6"/>
+          </a:lnRef>
+          <a:fillRef idx="1">
+            <a:schemeClr val="lt1"/>
+          </a:fillRef>
+          <a:effectRef idx="0">
+            <a:schemeClr val="accent6"/>
+          </a:effectRef>
+          <a:fontRef idx="minor">
+            <a:schemeClr val="dk1"/>
+          </a:fontRef>
+        </p:style>
+        <p:txBody>
+          <a:bodyPr rtlCol="0" anchor="ctr"/>
+          <a:lstStyle/>
+          <a:p>
+            <a:pPr algn="ctr"/>
+            <a:endParaRPr lang="en-GB" dirty="0"/>
+          </a:p>
+        </p:txBody>
+      </p:sp>
+      <p:sp>
+        <p:nvSpPr>
+          <p:cNvPr id="6" name="Rectangle 5">
+            <a:extLst>
+              <a:ext uri="{FF2B5EF4-FFF2-40B4-BE49-F238E27FC236}">
+                <a16:creationId xmlns:a16="http://schemas.microsoft.com/office/drawing/2014/main" id="{11F7BBF1-D7FC-4152-91AD-57B8C6228444}"/>
+              </a:ext>
+            </a:extLst>
+          </p:cNvPr>
+          <p:cNvSpPr/>
+          <p:nvPr/>
+        </p:nvSpPr>
+        <p:spPr>
+          <a:xfrm>
+            <a:off x="1921203" y="2348356"/>
+            <a:ext cx="1717138" cy="923330"/>
+          </a:xfrm>
+          <a:prstGeom prst="rect">
+            <a:avLst/>
+          </a:prstGeom>
+          <a:noFill/>
+        </p:spPr>
+        <p:txBody>
+          <a:bodyPr wrap="none" lIns="91440" tIns="45720" rIns="91440" bIns="45720">
+            <a:spAutoFit/>
+          </a:bodyPr>
+          <a:lstStyle/>
+          <a:p>
+            <a:pPr algn="ctr"/>
+            <a:r>
+              <a:rPr lang="en-US" sz="5400" b="0" cap="none" spc="0" dirty="0">
+                <a:ln w="0"/>
+                <a:solidFill>
+                  <a:schemeClr val="tx1"/>
+                </a:solidFill>
+                <a:effectLst>
+                  <a:outerShdw blurRad="38100" dist="19050" dir="2700000" algn="tl" rotWithShape="0">
+                    <a:schemeClr val="dk1">
+                      <a:alpha val="40000"/>
+                    </a:schemeClr>
+                  </a:outerShdw>
+                </a:effectLst>
+              </a:rPr>
+              <a:t>2048</a:t>
+            </a:r>
+          </a:p>
+        </p:txBody>
+      </p:sp>
+      <p:sp>
+        <p:nvSpPr>
+          <p:cNvPr id="7" name="Rectangle 6">
+            <a:extLst>
+              <a:ext uri="{FF2B5EF4-FFF2-40B4-BE49-F238E27FC236}">
+                <a16:creationId xmlns:a16="http://schemas.microsoft.com/office/drawing/2014/main" id="{ED7938C6-CBAA-40B3-9D0D-978B71208C89}"/>
+              </a:ext>
+            </a:extLst>
+          </p:cNvPr>
+          <p:cNvSpPr/>
+          <p:nvPr/>
+        </p:nvSpPr>
+        <p:spPr>
+          <a:xfrm>
+            <a:off x="1645920" y="3530991"/>
+            <a:ext cx="2349305" cy="464234"/>
+          </a:xfrm>
+          <a:prstGeom prst="rect">
+            <a:avLst/>
+          </a:prstGeom>
+        </p:spPr>
+        <p:style>
+          <a:lnRef idx="2">
+            <a:schemeClr val="accent6"/>
+          </a:lnRef>
+          <a:fillRef idx="1">
+            <a:schemeClr val="lt1"/>
+          </a:fillRef>
+          <a:effectRef idx="0">
+            <a:schemeClr val="accent6"/>
+          </a:effectRef>
+          <a:fontRef idx="minor">
+            <a:schemeClr val="dk1"/>
+          </a:fontRef>
+        </p:style>
+        <p:txBody>
+          <a:bodyPr rtlCol="0" anchor="ctr"/>
+          <a:lstStyle/>
+          <a:p>
+            <a:pPr algn="ctr"/>
+            <a:endParaRPr lang="en-GB"/>
+          </a:p>
+        </p:txBody>
+      </p:sp>
+      <p:sp>
+        <p:nvSpPr>
+          <p:cNvPr id="8" name="Rectangle 7">
+            <a:extLst>
+              <a:ext uri="{FF2B5EF4-FFF2-40B4-BE49-F238E27FC236}">
+                <a16:creationId xmlns:a16="http://schemas.microsoft.com/office/drawing/2014/main" id="{3E43D3A9-B9E2-40AB-A4AA-D0DF43A83DCF}"/>
+              </a:ext>
+            </a:extLst>
+          </p:cNvPr>
+          <p:cNvSpPr/>
+          <p:nvPr/>
+        </p:nvSpPr>
+        <p:spPr>
+          <a:xfrm>
+            <a:off x="1645919" y="4254530"/>
+            <a:ext cx="2349305" cy="464234"/>
+          </a:xfrm>
+          <a:prstGeom prst="rect">
+            <a:avLst/>
+          </a:prstGeom>
+        </p:spPr>
+        <p:style>
+          <a:lnRef idx="2">
+            <a:schemeClr val="accent6"/>
+          </a:lnRef>
+          <a:fillRef idx="1">
+            <a:schemeClr val="lt1"/>
+          </a:fillRef>
+          <a:effectRef idx="0">
+            <a:schemeClr val="accent6"/>
+          </a:effectRef>
+          <a:fontRef idx="minor">
+            <a:schemeClr val="dk1"/>
+          </a:fontRef>
+        </p:style>
+        <p:txBody>
+          <a:bodyPr rtlCol="0" anchor="ctr"/>
+          <a:lstStyle/>
+          <a:p>
+            <a:pPr algn="ctr"/>
+            <a:r>
+              <a:rPr lang="en-US" sz="2800" dirty="0">
+                <a:ln w="0"/>
+                <a:solidFill>
+                  <a:schemeClr val="tx1"/>
+                </a:solidFill>
+                <a:effectLst>
+                  <a:outerShdw blurRad="38100" dist="19050" dir="2700000" algn="tl" rotWithShape="0">
+                    <a:schemeClr val="dk1">
+                      <a:alpha val="40000"/>
+                    </a:schemeClr>
+                  </a:outerShdw>
+                </a:effectLst>
+              </a:rPr>
+              <a:t>How To Play</a:t>
+            </a:r>
+          </a:p>
+        </p:txBody>
+      </p:sp>
+      <p:sp>
+        <p:nvSpPr>
+          <p:cNvPr id="9" name="Rectangle 8">
+            <a:extLst>
+              <a:ext uri="{FF2B5EF4-FFF2-40B4-BE49-F238E27FC236}">
+                <a16:creationId xmlns:a16="http://schemas.microsoft.com/office/drawing/2014/main" id="{D19D069D-205E-4336-ABCD-342ADFC2A33D}"/>
+              </a:ext>
+            </a:extLst>
+          </p:cNvPr>
+          <p:cNvSpPr/>
+          <p:nvPr/>
+        </p:nvSpPr>
+        <p:spPr>
+          <a:xfrm>
+            <a:off x="1645919" y="4994030"/>
+            <a:ext cx="2349305" cy="464234"/>
+          </a:xfrm>
+          <a:prstGeom prst="rect">
+            <a:avLst/>
+          </a:prstGeom>
+        </p:spPr>
+        <p:style>
+          <a:lnRef idx="2">
+            <a:schemeClr val="accent6"/>
+          </a:lnRef>
+          <a:fillRef idx="1">
+            <a:schemeClr val="lt1"/>
+          </a:fillRef>
+          <a:effectRef idx="0">
+            <a:schemeClr val="accent6"/>
+          </a:effectRef>
+          <a:fontRef idx="minor">
+            <a:schemeClr val="dk1"/>
+          </a:fontRef>
+        </p:style>
+        <p:txBody>
+          <a:bodyPr rtlCol="0" anchor="ctr"/>
+          <a:lstStyle/>
+          <a:p>
+            <a:pPr algn="ctr"/>
+            <a:r>
+              <a:rPr lang="en-US" sz="2800" dirty="0">
+                <a:ln w="0"/>
+                <a:solidFill>
+                  <a:schemeClr val="tx1"/>
+                </a:solidFill>
+                <a:effectLst>
+                  <a:outerShdw blurRad="38100" dist="19050" dir="2700000" algn="tl" rotWithShape="0">
+                    <a:schemeClr val="dk1">
+                      <a:alpha val="40000"/>
+                    </a:schemeClr>
+                  </a:outerShdw>
+                </a:effectLst>
+              </a:rPr>
+              <a:t>Contributors</a:t>
+            </a:r>
+          </a:p>
+        </p:txBody>
+      </p:sp>
+      <p:sp>
+        <p:nvSpPr>
+          <p:cNvPr id="10" name="Rectangle 9">
+            <a:extLst>
+              <a:ext uri="{FF2B5EF4-FFF2-40B4-BE49-F238E27FC236}">
+                <a16:creationId xmlns:a16="http://schemas.microsoft.com/office/drawing/2014/main" id="{C92D8FDB-78D5-4F40-B938-0B6496AF7A67}"/>
+              </a:ext>
+            </a:extLst>
+          </p:cNvPr>
+          <p:cNvSpPr/>
+          <p:nvPr/>
+        </p:nvSpPr>
+        <p:spPr>
+          <a:xfrm>
+            <a:off x="1645918" y="5837147"/>
+            <a:ext cx="2349305" cy="464234"/>
+          </a:xfrm>
+          <a:prstGeom prst="rect">
+            <a:avLst/>
+          </a:prstGeom>
+        </p:spPr>
+        <p:style>
+          <a:lnRef idx="2">
+            <a:schemeClr val="accent6"/>
+          </a:lnRef>
+          <a:fillRef idx="1">
+            <a:schemeClr val="lt1"/>
+          </a:fillRef>
+          <a:effectRef idx="0">
+            <a:schemeClr val="accent6"/>
+          </a:effectRef>
+          <a:fontRef idx="minor">
+            <a:schemeClr val="dk1"/>
+          </a:fontRef>
+        </p:style>
+        <p:txBody>
+          <a:bodyPr rtlCol="0" anchor="ctr"/>
+          <a:lstStyle/>
+          <a:p>
+            <a:pPr algn="ctr"/>
+            <a:r>
+              <a:rPr lang="en-US" sz="2800" dirty="0"/>
+              <a:t>Exit Game</a:t>
+            </a:r>
+            <a:endParaRPr lang="en-GB" sz="2800" dirty="0"/>
+          </a:p>
+        </p:txBody>
+      </p:sp>
+      <p:sp>
+        <p:nvSpPr>
+          <p:cNvPr id="11" name="Rectangle 10">
+            <a:extLst>
+              <a:ext uri="{FF2B5EF4-FFF2-40B4-BE49-F238E27FC236}">
+                <a16:creationId xmlns:a16="http://schemas.microsoft.com/office/drawing/2014/main" id="{B9ABB518-73CE-4989-8E30-919861757DAE}"/>
+              </a:ext>
+            </a:extLst>
+          </p:cNvPr>
+          <p:cNvSpPr/>
+          <p:nvPr/>
+        </p:nvSpPr>
+        <p:spPr>
+          <a:xfrm>
+            <a:off x="1752810" y="3501498"/>
+            <a:ext cx="2135520" cy="523220"/>
+          </a:xfrm>
+          <a:prstGeom prst="rect">
+            <a:avLst/>
+          </a:prstGeom>
+          <a:noFill/>
+        </p:spPr>
+        <p:txBody>
+          <a:bodyPr wrap="none" lIns="91440" tIns="45720" rIns="91440" bIns="45720">
+            <a:spAutoFit/>
+          </a:bodyPr>
+          <a:lstStyle/>
+          <a:p>
+            <a:pPr algn="ctr"/>
+            <a:r>
+              <a:rPr lang="en-US" sz="2800" b="0" cap="none" spc="0" dirty="0">
+                <a:ln w="0"/>
+                <a:solidFill>
+                  <a:schemeClr val="tx1"/>
+                </a:solidFill>
+                <a:effectLst>
+                  <a:outerShdw blurRad="38100" dist="19050" dir="2700000" algn="tl" rotWithShape="0">
+                    <a:schemeClr val="dk1">
+                      <a:alpha val="40000"/>
+                    </a:schemeClr>
+                  </a:outerShdw>
+                </a:effectLst>
+              </a:rPr>
+              <a:t>Play Game</a:t>
+            </a:r>
+          </a:p>
+        </p:txBody>
+      </p:sp>
+      <p:sp>
+        <p:nvSpPr>
+          <p:cNvPr id="12" name="Rectangle 11">
+            <a:extLst>
+              <a:ext uri="{FF2B5EF4-FFF2-40B4-BE49-F238E27FC236}">
+                <a16:creationId xmlns:a16="http://schemas.microsoft.com/office/drawing/2014/main" id="{A9B1C134-263B-456A-8EF0-D7A5270B1577}"/>
+              </a:ext>
+            </a:extLst>
+          </p:cNvPr>
+          <p:cNvSpPr/>
+          <p:nvPr/>
+        </p:nvSpPr>
+        <p:spPr>
+          <a:xfrm>
+            <a:off x="6605144" y="2234027"/>
+            <a:ext cx="3033203" cy="646331"/>
+          </a:xfrm>
+          <a:prstGeom prst="rect">
+            <a:avLst/>
+          </a:prstGeom>
+          <a:noFill/>
+        </p:spPr>
+        <p:txBody>
+          <a:bodyPr wrap="none" lIns="91440" tIns="45720" rIns="91440" bIns="45720">
+            <a:spAutoFit/>
+          </a:bodyPr>
+          <a:lstStyle/>
+          <a:p>
+            <a:pPr algn="ctr"/>
+            <a:r>
+              <a:rPr lang="en-US" sz="3600" dirty="0">
+                <a:ln w="0"/>
+                <a:effectLst>
+                  <a:outerShdw blurRad="38100" dist="19050" dir="2700000" algn="tl" rotWithShape="0">
+                    <a:schemeClr val="dk1">
+                      <a:alpha val="40000"/>
+                    </a:schemeClr>
+                  </a:outerShdw>
+                </a:effectLst>
+              </a:rPr>
+              <a:t>Select Mode</a:t>
+            </a:r>
+            <a:endParaRPr lang="en-GB" sz="3600" b="0" cap="none" spc="0" dirty="0">
+              <a:ln w="0"/>
+              <a:solidFill>
+                <a:schemeClr val="tx1"/>
+              </a:solidFill>
+              <a:effectLst>
+                <a:outerShdw blurRad="38100" dist="19050" dir="2700000" algn="tl" rotWithShape="0">
+                  <a:schemeClr val="dk1">
+                    <a:alpha val="40000"/>
+                  </a:schemeClr>
+                </a:outerShdw>
+              </a:effectLst>
+            </a:endParaRPr>
+          </a:p>
+        </p:txBody>
+      </p:sp>
+      <p:sp>
+        <p:nvSpPr>
+          <p:cNvPr id="13" name="Rectangle 12">
+            <a:extLst>
+              <a:ext uri="{FF2B5EF4-FFF2-40B4-BE49-F238E27FC236}">
+                <a16:creationId xmlns:a16="http://schemas.microsoft.com/office/drawing/2014/main" id="{8B1CF2C7-DD4D-4DDF-AE33-9DC08EE64AE4}"/>
+              </a:ext>
+            </a:extLst>
+          </p:cNvPr>
+          <p:cNvSpPr/>
+          <p:nvPr/>
+        </p:nvSpPr>
+        <p:spPr>
+          <a:xfrm>
+            <a:off x="6947092" y="3560484"/>
+            <a:ext cx="2349305" cy="464234"/>
+          </a:xfrm>
+          <a:prstGeom prst="rect">
+            <a:avLst/>
+          </a:prstGeom>
+        </p:spPr>
+        <p:style>
+          <a:lnRef idx="2">
+            <a:schemeClr val="accent6"/>
+          </a:lnRef>
+          <a:fillRef idx="1">
+            <a:schemeClr val="lt1"/>
+          </a:fillRef>
+          <a:effectRef idx="0">
+            <a:schemeClr val="accent6"/>
+          </a:effectRef>
+          <a:fontRef idx="minor">
+            <a:schemeClr val="dk1"/>
+          </a:fontRef>
+        </p:style>
+        <p:txBody>
+          <a:bodyPr rtlCol="0" anchor="ctr"/>
+          <a:lstStyle/>
+          <a:p>
+            <a:pPr algn="ctr"/>
+            <a:r>
+              <a:rPr lang="en-US" sz="2800" dirty="0"/>
+              <a:t>Mode 1</a:t>
+            </a:r>
+            <a:endParaRPr lang="en-GB" sz="2800" dirty="0"/>
+          </a:p>
+        </p:txBody>
+      </p:sp>
+      <p:sp>
+        <p:nvSpPr>
+          <p:cNvPr id="14" name="Rectangle 13">
+            <a:extLst>
+              <a:ext uri="{FF2B5EF4-FFF2-40B4-BE49-F238E27FC236}">
+                <a16:creationId xmlns:a16="http://schemas.microsoft.com/office/drawing/2014/main" id="{23F3B1D6-A456-4785-9095-E95D559F97E3}"/>
+              </a:ext>
+            </a:extLst>
+          </p:cNvPr>
+          <p:cNvSpPr/>
+          <p:nvPr/>
+        </p:nvSpPr>
+        <p:spPr>
+          <a:xfrm>
+            <a:off x="6947091" y="4320877"/>
+            <a:ext cx="2349305" cy="464234"/>
+          </a:xfrm>
+          <a:prstGeom prst="rect">
+            <a:avLst/>
+          </a:prstGeom>
+        </p:spPr>
+        <p:style>
+          <a:lnRef idx="2">
+            <a:schemeClr val="accent6"/>
+          </a:lnRef>
+          <a:fillRef idx="1">
+            <a:schemeClr val="lt1"/>
+          </a:fillRef>
+          <a:effectRef idx="0">
+            <a:schemeClr val="accent6"/>
+          </a:effectRef>
+          <a:fontRef idx="minor">
+            <a:schemeClr val="dk1"/>
+          </a:fontRef>
+        </p:style>
+        <p:txBody>
+          <a:bodyPr rtlCol="0" anchor="ctr"/>
+          <a:lstStyle/>
+          <a:p>
+            <a:pPr algn="ctr"/>
+            <a:r>
+              <a:rPr lang="en-US" sz="2800" dirty="0"/>
+              <a:t>Mode 2</a:t>
+            </a:r>
+            <a:endParaRPr lang="en-GB" sz="2800" dirty="0"/>
+          </a:p>
+        </p:txBody>
+      </p:sp>
     </p:spTree>
+    <p:extLst>
+      <p:ext uri="{BB962C8B-B14F-4D97-AF65-F5344CB8AC3E}">
+        <p14:creationId xmlns:p14="http://schemas.microsoft.com/office/powerpoint/2010/main" val="3292126217"/>
+      </p:ext>
+    </p:extLst>
   </p:cSld>
   <p:clrMapOvr>
     <a:masterClrMapping/>
@@ -15485,6 +15853,583 @@
 </file>
 
 <file path=ppt/slides/slide6.xml><?xml version="1.0" encoding="utf-8"?>
+<p:sld xmlns:a="http://schemas.openxmlformats.org/drawingml/2006/main" xmlns:r="http://schemas.openxmlformats.org/officeDocument/2006/relationships" xmlns:p="http://schemas.openxmlformats.org/presentationml/2006/main">
+  <p:cSld>
+    <p:spTree>
+      <p:nvGrpSpPr>
+        <p:cNvPr id="1" name=""/>
+        <p:cNvGrpSpPr/>
+        <p:nvPr/>
+      </p:nvGrpSpPr>
+      <p:grpSpPr>
+        <a:xfrm>
+          <a:off x="0" y="0"/>
+          <a:ext cx="0" cy="0"/>
+          <a:chOff x="0" y="0"/>
+          <a:chExt cx="0" cy="0"/>
+        </a:xfrm>
+      </p:grpSpPr>
+      <p:sp>
+        <p:nvSpPr>
+          <p:cNvPr id="2" name="Title 1">
+            <a:extLst>
+              <a:ext uri="{FF2B5EF4-FFF2-40B4-BE49-F238E27FC236}">
+                <a16:creationId xmlns:a16="http://schemas.microsoft.com/office/drawing/2014/main" id="{A55B8425-DD15-43FD-8B8C-E479CD606109}"/>
+              </a:ext>
+            </a:extLst>
+          </p:cNvPr>
+          <p:cNvSpPr>
+            <a:spLocks noGrp="1"/>
+          </p:cNvSpPr>
+          <p:nvPr>
+            <p:ph type="title"/>
+          </p:nvPr>
+        </p:nvSpPr>
+        <p:spPr/>
+        <p:txBody>
+          <a:bodyPr/>
+          <a:lstStyle/>
+          <a:p>
+            <a:r>
+              <a:rPr lang="en-US" dirty="0"/>
+              <a:t>Design</a:t>
+            </a:r>
+            <a:endParaRPr lang="en-GB" dirty="0"/>
+          </a:p>
+        </p:txBody>
+      </p:sp>
+      <p:sp>
+        <p:nvSpPr>
+          <p:cNvPr id="4" name="Rectangle 3">
+            <a:extLst>
+              <a:ext uri="{FF2B5EF4-FFF2-40B4-BE49-F238E27FC236}">
+                <a16:creationId xmlns:a16="http://schemas.microsoft.com/office/drawing/2014/main" id="{5058E676-9484-49F1-975B-920E070BA510}"/>
+              </a:ext>
+            </a:extLst>
+          </p:cNvPr>
+          <p:cNvSpPr/>
+          <p:nvPr/>
+        </p:nvSpPr>
+        <p:spPr>
+          <a:xfrm>
+            <a:off x="1154954" y="2110154"/>
+            <a:ext cx="3249637" cy="4276579"/>
+          </a:xfrm>
+          <a:prstGeom prst="rect">
+            <a:avLst/>
+          </a:prstGeom>
+        </p:spPr>
+        <p:style>
+          <a:lnRef idx="2">
+            <a:schemeClr val="accent6"/>
+          </a:lnRef>
+          <a:fillRef idx="1">
+            <a:schemeClr val="lt1"/>
+          </a:fillRef>
+          <a:effectRef idx="0">
+            <a:schemeClr val="accent6"/>
+          </a:effectRef>
+          <a:fontRef idx="minor">
+            <a:schemeClr val="dk1"/>
+          </a:fontRef>
+        </p:style>
+        <p:txBody>
+          <a:bodyPr rtlCol="0" anchor="ctr"/>
+          <a:lstStyle/>
+          <a:p>
+            <a:pPr algn="ctr"/>
+            <a:r>
+              <a:rPr lang="en-US" dirty="0"/>
+              <a:t>Content for tutorial here</a:t>
+            </a:r>
+            <a:endParaRPr lang="en-GB" dirty="0"/>
+          </a:p>
+        </p:txBody>
+      </p:sp>
+      <p:sp>
+        <p:nvSpPr>
+          <p:cNvPr id="5" name="Rectangle 4">
+            <a:extLst>
+              <a:ext uri="{FF2B5EF4-FFF2-40B4-BE49-F238E27FC236}">
+                <a16:creationId xmlns:a16="http://schemas.microsoft.com/office/drawing/2014/main" id="{EE0899AE-41CB-4196-85A0-9AA6BCC13EAA}"/>
+              </a:ext>
+            </a:extLst>
+          </p:cNvPr>
+          <p:cNvSpPr/>
+          <p:nvPr/>
+        </p:nvSpPr>
+        <p:spPr>
+          <a:xfrm>
+            <a:off x="6542420" y="2110153"/>
+            <a:ext cx="3249637" cy="4276579"/>
+          </a:xfrm>
+          <a:prstGeom prst="rect">
+            <a:avLst/>
+          </a:prstGeom>
+        </p:spPr>
+        <p:style>
+          <a:lnRef idx="2">
+            <a:schemeClr val="accent6"/>
+          </a:lnRef>
+          <a:fillRef idx="1">
+            <a:schemeClr val="lt1"/>
+          </a:fillRef>
+          <a:effectRef idx="0">
+            <a:schemeClr val="accent6"/>
+          </a:effectRef>
+          <a:fontRef idx="minor">
+            <a:schemeClr val="dk1"/>
+          </a:fontRef>
+        </p:style>
+        <p:txBody>
+          <a:bodyPr rtlCol="0" anchor="ctr"/>
+          <a:lstStyle/>
+          <a:p>
+            <a:pPr algn="ctr"/>
+            <a:r>
+              <a:rPr lang="en-US" dirty="0">
+                <a:ln w="0"/>
+                <a:solidFill>
+                  <a:schemeClr val="tx1"/>
+                </a:solidFill>
+                <a:effectLst>
+                  <a:outerShdw blurRad="38100" dist="19050" dir="2700000" algn="tl" rotWithShape="0">
+                    <a:schemeClr val="dk1">
+                      <a:alpha val="40000"/>
+                    </a:schemeClr>
+                  </a:outerShdw>
+                </a:effectLst>
+              </a:rPr>
+              <a:t>Content for contributors here</a:t>
+            </a:r>
+          </a:p>
+        </p:txBody>
+      </p:sp>
+      <p:sp>
+        <p:nvSpPr>
+          <p:cNvPr id="6" name="Rectangle 5">
+            <a:extLst>
+              <a:ext uri="{FF2B5EF4-FFF2-40B4-BE49-F238E27FC236}">
+                <a16:creationId xmlns:a16="http://schemas.microsoft.com/office/drawing/2014/main" id="{236ABFFA-2033-4A58-B415-5D7F87B3C8AC}"/>
+              </a:ext>
+            </a:extLst>
+          </p:cNvPr>
+          <p:cNvSpPr/>
+          <p:nvPr/>
+        </p:nvSpPr>
+        <p:spPr>
+          <a:xfrm>
+            <a:off x="2119174" y="2222694"/>
+            <a:ext cx="1321195" cy="707886"/>
+          </a:xfrm>
+          <a:prstGeom prst="rect">
+            <a:avLst/>
+          </a:prstGeom>
+          <a:noFill/>
+        </p:spPr>
+        <p:txBody>
+          <a:bodyPr wrap="none" lIns="91440" tIns="45720" rIns="91440" bIns="45720">
+            <a:spAutoFit/>
+          </a:bodyPr>
+          <a:lstStyle/>
+          <a:p>
+            <a:pPr algn="ctr"/>
+            <a:r>
+              <a:rPr lang="en-US" sz="4000" b="0" cap="none" spc="0" dirty="0">
+                <a:ln w="0"/>
+                <a:solidFill>
+                  <a:schemeClr val="tx1"/>
+                </a:solidFill>
+                <a:effectLst>
+                  <a:outerShdw blurRad="38100" dist="19050" dir="2700000" algn="tl" rotWithShape="0">
+                    <a:schemeClr val="dk1">
+                      <a:alpha val="40000"/>
+                    </a:schemeClr>
+                  </a:outerShdw>
+                </a:effectLst>
+              </a:rPr>
+              <a:t>Help</a:t>
+            </a:r>
+            <a:endParaRPr lang="en-US" sz="5400" b="0" cap="none" spc="0" dirty="0">
+              <a:ln w="0"/>
+              <a:solidFill>
+                <a:schemeClr val="tx1"/>
+              </a:solidFill>
+              <a:effectLst>
+                <a:outerShdw blurRad="38100" dist="19050" dir="2700000" algn="tl" rotWithShape="0">
+                  <a:schemeClr val="dk1">
+                    <a:alpha val="40000"/>
+                  </a:schemeClr>
+                </a:outerShdw>
+              </a:effectLst>
+            </a:endParaRPr>
+          </a:p>
+        </p:txBody>
+      </p:sp>
+      <p:sp>
+        <p:nvSpPr>
+          <p:cNvPr id="7" name="Rectangle 6">
+            <a:extLst>
+              <a:ext uri="{FF2B5EF4-FFF2-40B4-BE49-F238E27FC236}">
+                <a16:creationId xmlns:a16="http://schemas.microsoft.com/office/drawing/2014/main" id="{35954D8D-22EA-40F8-8A98-DB0111520DAA}"/>
+              </a:ext>
+            </a:extLst>
+          </p:cNvPr>
+          <p:cNvSpPr/>
+          <p:nvPr/>
+        </p:nvSpPr>
+        <p:spPr>
+          <a:xfrm>
+            <a:off x="6542420" y="2222694"/>
+            <a:ext cx="3204723" cy="707886"/>
+          </a:xfrm>
+          <a:prstGeom prst="rect">
+            <a:avLst/>
+          </a:prstGeom>
+          <a:noFill/>
+        </p:spPr>
+        <p:txBody>
+          <a:bodyPr wrap="none" lIns="91440" tIns="45720" rIns="91440" bIns="45720">
+            <a:spAutoFit/>
+          </a:bodyPr>
+          <a:lstStyle/>
+          <a:p>
+            <a:pPr algn="ctr"/>
+            <a:r>
+              <a:rPr lang="en-US" sz="4000" b="0" cap="none" spc="0" dirty="0">
+                <a:ln w="0"/>
+                <a:solidFill>
+                  <a:schemeClr val="tx1"/>
+                </a:solidFill>
+                <a:effectLst>
+                  <a:outerShdw blurRad="38100" dist="19050" dir="2700000" algn="tl" rotWithShape="0">
+                    <a:schemeClr val="dk1">
+                      <a:alpha val="40000"/>
+                    </a:schemeClr>
+                  </a:outerShdw>
+                </a:effectLst>
+              </a:rPr>
+              <a:t>Contributors</a:t>
+            </a:r>
+          </a:p>
+        </p:txBody>
+      </p:sp>
+    </p:spTree>
+    <p:extLst>
+      <p:ext uri="{BB962C8B-B14F-4D97-AF65-F5344CB8AC3E}">
+        <p14:creationId xmlns:p14="http://schemas.microsoft.com/office/powerpoint/2010/main" val="1126817307"/>
+      </p:ext>
+    </p:extLst>
+  </p:cSld>
+  <p:clrMapOvr>
+    <a:masterClrMapping/>
+  </p:clrMapOvr>
+</p:sld>
+</file>
+
+<file path=ppt/slides/slide7.xml><?xml version="1.0" encoding="utf-8"?>
+<p:sld xmlns:a="http://schemas.openxmlformats.org/drawingml/2006/main" xmlns:r="http://schemas.openxmlformats.org/officeDocument/2006/relationships" xmlns:p="http://schemas.openxmlformats.org/presentationml/2006/main">
+  <p:cSld>
+    <p:spTree>
+      <p:nvGrpSpPr>
+        <p:cNvPr id="1" name=""/>
+        <p:cNvGrpSpPr/>
+        <p:nvPr/>
+      </p:nvGrpSpPr>
+      <p:grpSpPr>
+        <a:xfrm>
+          <a:off x="0" y="0"/>
+          <a:ext cx="0" cy="0"/>
+          <a:chOff x="0" y="0"/>
+          <a:chExt cx="0" cy="0"/>
+        </a:xfrm>
+      </p:grpSpPr>
+      <p:sp>
+        <p:nvSpPr>
+          <p:cNvPr id="2" name="Title 1">
+            <a:extLst>
+              <a:ext uri="{FF2B5EF4-FFF2-40B4-BE49-F238E27FC236}">
+                <a16:creationId xmlns:a16="http://schemas.microsoft.com/office/drawing/2014/main" id="{FBE084E7-45E9-4231-A836-8C5DB2C9AB1D}"/>
+              </a:ext>
+            </a:extLst>
+          </p:cNvPr>
+          <p:cNvSpPr>
+            <a:spLocks noGrp="1"/>
+          </p:cNvSpPr>
+          <p:nvPr>
+            <p:ph type="title"/>
+          </p:nvPr>
+        </p:nvSpPr>
+        <p:spPr/>
+        <p:txBody>
+          <a:bodyPr/>
+          <a:lstStyle/>
+          <a:p>
+            <a:r>
+              <a:rPr lang="en-US" dirty="0"/>
+              <a:t>Design</a:t>
+            </a:r>
+            <a:endParaRPr lang="en-GB" dirty="0"/>
+          </a:p>
+        </p:txBody>
+      </p:sp>
+      <p:sp>
+        <p:nvSpPr>
+          <p:cNvPr id="4" name="Rectangle 3">
+            <a:extLst>
+              <a:ext uri="{FF2B5EF4-FFF2-40B4-BE49-F238E27FC236}">
+                <a16:creationId xmlns:a16="http://schemas.microsoft.com/office/drawing/2014/main" id="{A5C66D7F-AA0F-4AF1-9658-88D752D8FB32}"/>
+              </a:ext>
+            </a:extLst>
+          </p:cNvPr>
+          <p:cNvSpPr/>
+          <p:nvPr/>
+        </p:nvSpPr>
+        <p:spPr>
+          <a:xfrm>
+            <a:off x="1154954" y="2180491"/>
+            <a:ext cx="3249637" cy="4276579"/>
+          </a:xfrm>
+          <a:prstGeom prst="rect">
+            <a:avLst/>
+          </a:prstGeom>
+        </p:spPr>
+        <p:style>
+          <a:lnRef idx="2">
+            <a:schemeClr val="accent6"/>
+          </a:lnRef>
+          <a:fillRef idx="1">
+            <a:schemeClr val="lt1"/>
+          </a:fillRef>
+          <a:effectRef idx="0">
+            <a:schemeClr val="accent6"/>
+          </a:effectRef>
+          <a:fontRef idx="minor">
+            <a:schemeClr val="dk1"/>
+          </a:fontRef>
+        </p:style>
+        <p:txBody>
+          <a:bodyPr rtlCol="0" anchor="ctr"/>
+          <a:lstStyle/>
+          <a:p>
+            <a:pPr algn="ctr"/>
+            <a:endParaRPr lang="en-GB" dirty="0"/>
+          </a:p>
+        </p:txBody>
+      </p:sp>
+      <p:sp>
+        <p:nvSpPr>
+          <p:cNvPr id="5" name="Rectangle 4">
+            <a:extLst>
+              <a:ext uri="{FF2B5EF4-FFF2-40B4-BE49-F238E27FC236}">
+                <a16:creationId xmlns:a16="http://schemas.microsoft.com/office/drawing/2014/main" id="{39944049-AE54-436D-AEAF-2B2BB4D4DA43}"/>
+              </a:ext>
+            </a:extLst>
+          </p:cNvPr>
+          <p:cNvSpPr/>
+          <p:nvPr/>
+        </p:nvSpPr>
+        <p:spPr>
+          <a:xfrm>
+            <a:off x="6482861" y="2180491"/>
+            <a:ext cx="3249637" cy="4276579"/>
+          </a:xfrm>
+          <a:prstGeom prst="rect">
+            <a:avLst/>
+          </a:prstGeom>
+        </p:spPr>
+        <p:style>
+          <a:lnRef idx="2">
+            <a:schemeClr val="accent6"/>
+          </a:lnRef>
+          <a:fillRef idx="1">
+            <a:schemeClr val="lt1"/>
+          </a:fillRef>
+          <a:effectRef idx="0">
+            <a:schemeClr val="accent6"/>
+          </a:effectRef>
+          <a:fontRef idx="minor">
+            <a:schemeClr val="dk1"/>
+          </a:fontRef>
+        </p:style>
+        <p:txBody>
+          <a:bodyPr rtlCol="0" anchor="ctr"/>
+          <a:lstStyle/>
+          <a:p>
+            <a:pPr algn="ctr"/>
+            <a:endParaRPr lang="en-GB"/>
+          </a:p>
+        </p:txBody>
+      </p:sp>
+      <p:sp>
+        <p:nvSpPr>
+          <p:cNvPr id="7" name="Rectangle 6">
+            <a:extLst>
+              <a:ext uri="{FF2B5EF4-FFF2-40B4-BE49-F238E27FC236}">
+                <a16:creationId xmlns:a16="http://schemas.microsoft.com/office/drawing/2014/main" id="{F5C9C8A9-9DFB-4E7A-A9EF-5F204F296C82}"/>
+              </a:ext>
+            </a:extLst>
+          </p:cNvPr>
+          <p:cNvSpPr/>
+          <p:nvPr/>
+        </p:nvSpPr>
+        <p:spPr>
+          <a:xfrm>
+            <a:off x="1392212" y="2180491"/>
+            <a:ext cx="2775119" cy="923330"/>
+          </a:xfrm>
+          <a:prstGeom prst="rect">
+            <a:avLst/>
+          </a:prstGeom>
+          <a:noFill/>
+        </p:spPr>
+        <p:txBody>
+          <a:bodyPr wrap="none" lIns="91440" tIns="45720" rIns="91440" bIns="45720">
+            <a:spAutoFit/>
+          </a:bodyPr>
+          <a:lstStyle/>
+          <a:p>
+            <a:pPr algn="ctr"/>
+            <a:r>
+              <a:rPr lang="en-US" sz="5400" b="0" cap="none" spc="0" dirty="0">
+                <a:ln w="0"/>
+                <a:solidFill>
+                  <a:schemeClr val="tx1"/>
+                </a:solidFill>
+                <a:effectLst>
+                  <a:outerShdw blurRad="38100" dist="19050" dir="2700000" algn="tl" rotWithShape="0">
+                    <a:schemeClr val="dk1">
+                      <a:alpha val="40000"/>
+                    </a:schemeClr>
+                  </a:outerShdw>
+                </a:effectLst>
+              </a:rPr>
+              <a:t>Mode 1</a:t>
+            </a:r>
+          </a:p>
+        </p:txBody>
+      </p:sp>
+      <p:sp>
+        <p:nvSpPr>
+          <p:cNvPr id="8" name="Rectangle 7">
+            <a:extLst>
+              <a:ext uri="{FF2B5EF4-FFF2-40B4-BE49-F238E27FC236}">
+                <a16:creationId xmlns:a16="http://schemas.microsoft.com/office/drawing/2014/main" id="{20568529-FB20-4086-9EE6-739D1DBB8590}"/>
+              </a:ext>
+            </a:extLst>
+          </p:cNvPr>
+          <p:cNvSpPr/>
+          <p:nvPr/>
+        </p:nvSpPr>
+        <p:spPr>
+          <a:xfrm>
+            <a:off x="6720119" y="2180491"/>
+            <a:ext cx="2775119" cy="923330"/>
+          </a:xfrm>
+          <a:prstGeom prst="rect">
+            <a:avLst/>
+          </a:prstGeom>
+          <a:noFill/>
+        </p:spPr>
+        <p:txBody>
+          <a:bodyPr wrap="none" lIns="91440" tIns="45720" rIns="91440" bIns="45720">
+            <a:spAutoFit/>
+          </a:bodyPr>
+          <a:lstStyle/>
+          <a:p>
+            <a:pPr algn="ctr"/>
+            <a:r>
+              <a:rPr lang="en-US" sz="5400" b="0" cap="none" spc="0" dirty="0">
+                <a:ln w="0"/>
+                <a:solidFill>
+                  <a:schemeClr val="tx1"/>
+                </a:solidFill>
+                <a:effectLst>
+                  <a:outerShdw blurRad="38100" dist="19050" dir="2700000" algn="tl" rotWithShape="0">
+                    <a:schemeClr val="dk1">
+                      <a:alpha val="40000"/>
+                    </a:schemeClr>
+                  </a:outerShdw>
+                </a:effectLst>
+              </a:rPr>
+              <a:t>Mode 2</a:t>
+            </a:r>
+          </a:p>
+        </p:txBody>
+      </p:sp>
+    </p:spTree>
+    <p:extLst>
+      <p:ext uri="{BB962C8B-B14F-4D97-AF65-F5344CB8AC3E}">
+        <p14:creationId xmlns:p14="http://schemas.microsoft.com/office/powerpoint/2010/main" val="2407423641"/>
+      </p:ext>
+    </p:extLst>
+  </p:cSld>
+  <p:clrMapOvr>
+    <a:masterClrMapping/>
+  </p:clrMapOvr>
+</p:sld>
+</file>
+
+<file path=ppt/slides/slide8.xml><?xml version="1.0" encoding="utf-8"?>
+<p:sld xmlns:a="http://schemas.openxmlformats.org/drawingml/2006/main" xmlns:r="http://schemas.openxmlformats.org/officeDocument/2006/relationships" xmlns:p="http://schemas.openxmlformats.org/presentationml/2006/main">
+  <p:cSld>
+    <p:spTree>
+      <p:nvGrpSpPr>
+        <p:cNvPr id="1" name=""/>
+        <p:cNvGrpSpPr/>
+        <p:nvPr/>
+      </p:nvGrpSpPr>
+      <p:grpSpPr>
+        <a:xfrm>
+          <a:off x="0" y="0"/>
+          <a:ext cx="0" cy="0"/>
+          <a:chOff x="0" y="0"/>
+          <a:chExt cx="0" cy="0"/>
+        </a:xfrm>
+      </p:grpSpPr>
+      <p:sp>
+        <p:nvSpPr>
+          <p:cNvPr id="2" name="Title 1">
+            <a:extLst>
+              <a:ext uri="{FF2B5EF4-FFF2-40B4-BE49-F238E27FC236}">
+                <a16:creationId xmlns:a16="http://schemas.microsoft.com/office/drawing/2014/main" id="{6BFFF3D1-45B5-49F8-8C83-51224A9FAFE4}"/>
+              </a:ext>
+            </a:extLst>
+          </p:cNvPr>
+          <p:cNvSpPr>
+            <a:spLocks noGrp="1"/>
+          </p:cNvSpPr>
+          <p:nvPr>
+            <p:ph type="title"/>
+          </p:nvPr>
+        </p:nvSpPr>
+        <p:spPr/>
+        <p:txBody>
+          <a:bodyPr/>
+          <a:lstStyle/>
+          <a:p>
+            <a:r>
+              <a:rPr lang="en-US" dirty="0"/>
+              <a:t>Install Game</a:t>
+            </a:r>
+            <a:endParaRPr lang="en-GB" dirty="0"/>
+          </a:p>
+        </p:txBody>
+      </p:sp>
+    </p:spTree>
+    <p:extLst>
+      <p:ext uri="{BB962C8B-B14F-4D97-AF65-F5344CB8AC3E}">
+        <p14:creationId xmlns:p14="http://schemas.microsoft.com/office/powerpoint/2010/main" val="2885535101"/>
+      </p:ext>
+    </p:extLst>
+  </p:cSld>
+  <p:clrMapOvr>
+    <a:masterClrMapping/>
+  </p:clrMapOvr>
+</p:sld>
+</file>
+
+<file path=ppt/slides/slide9.xml><?xml version="1.0" encoding="utf-8"?>
 <p:sld xmlns:a="http://schemas.openxmlformats.org/drawingml/2006/main" xmlns:r="http://schemas.openxmlformats.org/officeDocument/2006/relationships" xmlns:p="http://schemas.openxmlformats.org/presentationml/2006/main">
   <p:cSld>
     <p:spTree>
@@ -15531,7 +16476,7 @@
           </p:nvPr>
         </p:nvPicPr>
         <p:blipFill>
-          <a:blip r:embed="rId1">
+          <a:blip r:embed="rId2">
             <a:extLst>
               <a:ext uri="{28A0092B-C50C-407E-A947-70E740481C1C}">
                 <a14:useLocalDpi xmlns:a14="http://schemas.microsoft.com/office/drawing/2010/main" val="0"/>
@@ -15554,13 +16499,6 @@
   <p:clrMapOvr>
     <a:masterClrMapping/>
   </p:clrMapOvr>
-  <p:timing>
-    <p:tnLst>
-      <p:par>
-        <p:cTn id="1" dur="indefinite" restart="never" nodeType="tmRoot"/>
-      </p:par>
-    </p:tnLst>
-  </p:timing>
 </p:sld>
 </file>
 
@@ -15820,6 +16758,8 @@
       </a:bgFillStyleLst>
     </a:fmtScheme>
   </a:themeElements>
+  <a:objectDefaults/>
+  <a:extraClrSchemeLst/>
   <a:extLst>
     <a:ext uri="{05A4C25C-085E-4340-85A3-A5531E510DB2}">
       <thm15:themeFamily xmlns:thm15="http://schemas.microsoft.com/office/thememl/2012/main" name="Office Theme" id="{62F939B6-93AF-4DB8-9C6B-D6C7DFDC589F}" vid="{4A3C46E8-61CC-4603-A589-7422A47A8E4A}"/>

</xml_diff>